<commit_message>
Power pin and resistor added
</commit_message>
<xml_diff>
--- a/Meeting/PMOD2BNC.pptx
+++ b/Meeting/PMOD2BNC.pptx
@@ -13,8 +13,11 @@
     <p:sldId id="261" r:id="rId7"/>
     <p:sldId id="262" r:id="rId8"/>
     <p:sldId id="263" r:id="rId9"/>
-    <p:sldId id="264" r:id="rId10"/>
-    <p:sldId id="265" r:id="rId11"/>
+    <p:sldId id="267" r:id="rId10"/>
+    <p:sldId id="269" r:id="rId11"/>
+    <p:sldId id="268" r:id="rId12"/>
+    <p:sldId id="265" r:id="rId13"/>
+    <p:sldId id="266" r:id="rId14"/>
   </p:sldIdLst>
   <p:sldSz cx="12192000" cy="6858000"/>
   <p:notesSz cx="6858000" cy="9144000"/>
@@ -268,7 +271,7 @@
           <a:p>
             <a:fld id="{0B49B01E-FC7D-42C9-BEBD-6EBDB349EAEF}" type="datetimeFigureOut">
               <a:rPr lang="ko-KR" altLang="en-US" smtClean="0"/>
-              <a:t>2023-06-21</a:t>
+              <a:t>2023-06-22</a:t>
             </a:fld>
             <a:endParaRPr lang="ko-KR" altLang="en-US"/>
           </a:p>
@@ -466,7 +469,7 @@
           <a:p>
             <a:fld id="{0B49B01E-FC7D-42C9-BEBD-6EBDB349EAEF}" type="datetimeFigureOut">
               <a:rPr lang="ko-KR" altLang="en-US" smtClean="0"/>
-              <a:t>2023-06-21</a:t>
+              <a:t>2023-06-22</a:t>
             </a:fld>
             <a:endParaRPr lang="ko-KR" altLang="en-US"/>
           </a:p>
@@ -674,7 +677,7 @@
           <a:p>
             <a:fld id="{0B49B01E-FC7D-42C9-BEBD-6EBDB349EAEF}" type="datetimeFigureOut">
               <a:rPr lang="ko-KR" altLang="en-US" smtClean="0"/>
-              <a:t>2023-06-21</a:t>
+              <a:t>2023-06-22</a:t>
             </a:fld>
             <a:endParaRPr lang="ko-KR" altLang="en-US"/>
           </a:p>
@@ -872,7 +875,7 @@
           <a:p>
             <a:fld id="{0B49B01E-FC7D-42C9-BEBD-6EBDB349EAEF}" type="datetimeFigureOut">
               <a:rPr lang="ko-KR" altLang="en-US" smtClean="0"/>
-              <a:t>2023-06-21</a:t>
+              <a:t>2023-06-22</a:t>
             </a:fld>
             <a:endParaRPr lang="ko-KR" altLang="en-US"/>
           </a:p>
@@ -1147,7 +1150,7 @@
           <a:p>
             <a:fld id="{0B49B01E-FC7D-42C9-BEBD-6EBDB349EAEF}" type="datetimeFigureOut">
               <a:rPr lang="ko-KR" altLang="en-US" smtClean="0"/>
-              <a:t>2023-06-21</a:t>
+              <a:t>2023-06-22</a:t>
             </a:fld>
             <a:endParaRPr lang="ko-KR" altLang="en-US"/>
           </a:p>
@@ -1412,7 +1415,7 @@
           <a:p>
             <a:fld id="{0B49B01E-FC7D-42C9-BEBD-6EBDB349EAEF}" type="datetimeFigureOut">
               <a:rPr lang="ko-KR" altLang="en-US" smtClean="0"/>
-              <a:t>2023-06-21</a:t>
+              <a:t>2023-06-22</a:t>
             </a:fld>
             <a:endParaRPr lang="ko-KR" altLang="en-US"/>
           </a:p>
@@ -1824,7 +1827,7 @@
           <a:p>
             <a:fld id="{0B49B01E-FC7D-42C9-BEBD-6EBDB349EAEF}" type="datetimeFigureOut">
               <a:rPr lang="ko-KR" altLang="en-US" smtClean="0"/>
-              <a:t>2023-06-21</a:t>
+              <a:t>2023-06-22</a:t>
             </a:fld>
             <a:endParaRPr lang="ko-KR" altLang="en-US"/>
           </a:p>
@@ -1965,7 +1968,7 @@
           <a:p>
             <a:fld id="{0B49B01E-FC7D-42C9-BEBD-6EBDB349EAEF}" type="datetimeFigureOut">
               <a:rPr lang="ko-KR" altLang="en-US" smtClean="0"/>
-              <a:t>2023-06-21</a:t>
+              <a:t>2023-06-22</a:t>
             </a:fld>
             <a:endParaRPr lang="ko-KR" altLang="en-US"/>
           </a:p>
@@ -2078,7 +2081,7 @@
           <a:p>
             <a:fld id="{0B49B01E-FC7D-42C9-BEBD-6EBDB349EAEF}" type="datetimeFigureOut">
               <a:rPr lang="ko-KR" altLang="en-US" smtClean="0"/>
-              <a:t>2023-06-21</a:t>
+              <a:t>2023-06-22</a:t>
             </a:fld>
             <a:endParaRPr lang="ko-KR" altLang="en-US"/>
           </a:p>
@@ -2389,7 +2392,7 @@
           <a:p>
             <a:fld id="{0B49B01E-FC7D-42C9-BEBD-6EBDB349EAEF}" type="datetimeFigureOut">
               <a:rPr lang="ko-KR" altLang="en-US" smtClean="0"/>
-              <a:t>2023-06-21</a:t>
+              <a:t>2023-06-22</a:t>
             </a:fld>
             <a:endParaRPr lang="ko-KR" altLang="en-US"/>
           </a:p>
@@ -2677,7 +2680,7 @@
           <a:p>
             <a:fld id="{0B49B01E-FC7D-42C9-BEBD-6EBDB349EAEF}" type="datetimeFigureOut">
               <a:rPr lang="ko-KR" altLang="en-US" smtClean="0"/>
-              <a:t>2023-06-21</a:t>
+              <a:t>2023-06-22</a:t>
             </a:fld>
             <a:endParaRPr lang="ko-KR" altLang="en-US"/>
           </a:p>
@@ -2918,7 +2921,7 @@
           <a:p>
             <a:fld id="{0B49B01E-FC7D-42C9-BEBD-6EBDB349EAEF}" type="datetimeFigureOut">
               <a:rPr lang="ko-KR" altLang="en-US" smtClean="0"/>
-              <a:t>2023-06-21</a:t>
+              <a:t>2023-06-22</a:t>
             </a:fld>
             <a:endParaRPr lang="ko-KR" altLang="en-US"/>
           </a:p>
@@ -3394,6 +3397,138 @@
           <a:chExt cx="0" cy="0"/>
         </a:xfrm>
       </p:grpSpPr>
+      <p:pic>
+        <p:nvPicPr>
+          <p:cNvPr id="5" name="그림 4" descr="텍스트, 스크린샷, 폰트이(가) 표시된 사진&#10;&#10;자동 생성된 설명">
+            <a:extLst>
+              <a:ext uri="{FF2B5EF4-FFF2-40B4-BE49-F238E27FC236}">
+                <a16:creationId xmlns:a16="http://schemas.microsoft.com/office/drawing/2014/main" id="{F63CC589-ABC1-0087-21C9-5B2DB8A04A86}"/>
+              </a:ext>
+            </a:extLst>
+          </p:cNvPr>
+          <p:cNvPicPr>
+            <a:picLocks noChangeAspect="1"/>
+          </p:cNvPicPr>
+          <p:nvPr/>
+        </p:nvPicPr>
+        <p:blipFill>
+          <a:blip r:embed="rId2">
+            <a:extLst>
+              <a:ext uri="{28A0092B-C50C-407E-A947-70E740481C1C}">
+                <a14:useLocalDpi xmlns:a14="http://schemas.microsoft.com/office/drawing/2010/main" val="0"/>
+              </a:ext>
+            </a:extLst>
+          </a:blip>
+          <a:stretch>
+            <a:fillRect/>
+          </a:stretch>
+        </p:blipFill>
+        <p:spPr>
+          <a:xfrm>
+            <a:off x="2006390" y="2254189"/>
+            <a:ext cx="8179220" cy="2349621"/>
+          </a:xfrm>
+          <a:prstGeom prst="rect">
+            <a:avLst/>
+          </a:prstGeom>
+        </p:spPr>
+      </p:pic>
+    </p:spTree>
+    <p:extLst>
+      <p:ext uri="{BB962C8B-B14F-4D97-AF65-F5344CB8AC3E}">
+        <p14:creationId xmlns:p14="http://schemas.microsoft.com/office/powerpoint/2010/main" val="951425643"/>
+      </p:ext>
+    </p:extLst>
+  </p:cSld>
+  <p:clrMapOvr>
+    <a:masterClrMapping/>
+  </p:clrMapOvr>
+</p:sld>
+</file>
+
+<file path=ppt/slides/slide11.xml><?xml version="1.0" encoding="utf-8"?>
+<p:sld xmlns:a="http://schemas.openxmlformats.org/drawingml/2006/main" xmlns:r="http://schemas.openxmlformats.org/officeDocument/2006/relationships" xmlns:p="http://schemas.openxmlformats.org/presentationml/2006/main">
+  <p:cSld>
+    <p:spTree>
+      <p:nvGrpSpPr>
+        <p:cNvPr id="1" name=""/>
+        <p:cNvGrpSpPr/>
+        <p:nvPr/>
+      </p:nvGrpSpPr>
+      <p:grpSpPr>
+        <a:xfrm>
+          <a:off x="0" y="0"/>
+          <a:ext cx="0" cy="0"/>
+          <a:chOff x="0" y="0"/>
+          <a:chExt cx="0" cy="0"/>
+        </a:xfrm>
+      </p:grpSpPr>
+      <p:pic>
+        <p:nvPicPr>
+          <p:cNvPr id="5" name="그림 4" descr="텍스트, 스크린샷, 웹 페이지, 소프트웨어이(가) 표시된 사진&#10;&#10;자동 생성된 설명">
+            <a:extLst>
+              <a:ext uri="{FF2B5EF4-FFF2-40B4-BE49-F238E27FC236}">
+                <a16:creationId xmlns:a16="http://schemas.microsoft.com/office/drawing/2014/main" id="{422F5E8C-EE2D-7B9E-2E18-CD0D48008408}"/>
+              </a:ext>
+            </a:extLst>
+          </p:cNvPr>
+          <p:cNvPicPr>
+            <a:picLocks noChangeAspect="1"/>
+          </p:cNvPicPr>
+          <p:nvPr/>
+        </p:nvPicPr>
+        <p:blipFill>
+          <a:blip r:embed="rId2">
+            <a:extLst>
+              <a:ext uri="{28A0092B-C50C-407E-A947-70E740481C1C}">
+                <a14:useLocalDpi xmlns:a14="http://schemas.microsoft.com/office/drawing/2010/main" val="0"/>
+              </a:ext>
+            </a:extLst>
+          </a:blip>
+          <a:stretch>
+            <a:fillRect/>
+          </a:stretch>
+        </p:blipFill>
+        <p:spPr>
+          <a:xfrm>
+            <a:off x="960269" y="0"/>
+            <a:ext cx="10271461" cy="6858000"/>
+          </a:xfrm>
+          <a:prstGeom prst="rect">
+            <a:avLst/>
+          </a:prstGeom>
+        </p:spPr>
+      </p:pic>
+    </p:spTree>
+    <p:extLst>
+      <p:ext uri="{BB962C8B-B14F-4D97-AF65-F5344CB8AC3E}">
+        <p14:creationId xmlns:p14="http://schemas.microsoft.com/office/powerpoint/2010/main" val="3189072490"/>
+      </p:ext>
+    </p:extLst>
+  </p:cSld>
+  <p:clrMapOvr>
+    <a:masterClrMapping/>
+  </p:clrMapOvr>
+</p:sld>
+</file>
+
+<file path=ppt/slides/slide12.xml><?xml version="1.0" encoding="utf-8"?>
+<p:sld xmlns:a="http://schemas.openxmlformats.org/drawingml/2006/main" xmlns:r="http://schemas.openxmlformats.org/officeDocument/2006/relationships" xmlns:p="http://schemas.openxmlformats.org/presentationml/2006/main">
+  <p:cSld>
+    <p:spTree>
+      <p:nvGrpSpPr>
+        <p:cNvPr id="1" name=""/>
+        <p:cNvGrpSpPr/>
+        <p:nvPr/>
+      </p:nvGrpSpPr>
+      <p:grpSpPr>
+        <a:xfrm>
+          <a:off x="0" y="0"/>
+          <a:ext cx="0" cy="0"/>
+          <a:chOff x="0" y="0"/>
+          <a:chExt cx="0" cy="0"/>
+        </a:xfrm>
+      </p:grpSpPr>
       <p:sp>
         <p:nvSpPr>
           <p:cNvPr id="5" name="직사각형 4">
@@ -4904,10 +5039,1883 @@
           </a:p>
         </p:txBody>
       </p:sp>
+      <p:sp>
+        <p:nvSpPr>
+          <p:cNvPr id="4" name="TextBox 3">
+            <a:extLst>
+              <a:ext uri="{FF2B5EF4-FFF2-40B4-BE49-F238E27FC236}">
+                <a16:creationId xmlns:a16="http://schemas.microsoft.com/office/drawing/2014/main" id="{51106236-ED71-D394-2569-7EA1FCA90113}"/>
+              </a:ext>
+            </a:extLst>
+          </p:cNvPr>
+          <p:cNvSpPr txBox="1"/>
+          <p:nvPr/>
+        </p:nvSpPr>
+        <p:spPr>
+          <a:xfrm>
+            <a:off x="3513942" y="2897218"/>
+            <a:ext cx="2078005" cy="646331"/>
+          </a:xfrm>
+          <a:prstGeom prst="rect">
+            <a:avLst/>
+          </a:prstGeom>
+          <a:noFill/>
+        </p:spPr>
+        <p:txBody>
+          <a:bodyPr wrap="none" rtlCol="0">
+            <a:spAutoFit/>
+          </a:bodyPr>
+          <a:lstStyle/>
+          <a:p>
+            <a:r>
+              <a:rPr lang="en-US" altLang="ko-KR"/>
+              <a:t>2.2+5.3+3.1+8.8</a:t>
+            </a:r>
+          </a:p>
+          <a:p>
+            <a:r>
+              <a:rPr lang="en-US" altLang="ko-KR"/>
+              <a:t>=19.4mA, 150mW</a:t>
+            </a:r>
+            <a:endParaRPr lang="ko-KR" altLang="en-US"/>
+          </a:p>
+        </p:txBody>
+      </p:sp>
+      <p:sp>
+        <p:nvSpPr>
+          <p:cNvPr id="21" name="TextBox 20">
+            <a:extLst>
+              <a:ext uri="{FF2B5EF4-FFF2-40B4-BE49-F238E27FC236}">
+                <a16:creationId xmlns:a16="http://schemas.microsoft.com/office/drawing/2014/main" id="{2E23F7EC-B0A5-D556-ADC8-F9DAB6BDA2B7}"/>
+              </a:ext>
+            </a:extLst>
+          </p:cNvPr>
+          <p:cNvSpPr txBox="1"/>
+          <p:nvPr/>
+        </p:nvSpPr>
+        <p:spPr>
+          <a:xfrm>
+            <a:off x="7302249" y="2897218"/>
+            <a:ext cx="1864806" cy="369332"/>
+          </a:xfrm>
+          <a:prstGeom prst="rect">
+            <a:avLst/>
+          </a:prstGeom>
+          <a:noFill/>
+        </p:spPr>
+        <p:txBody>
+          <a:bodyPr wrap="none" rtlCol="0">
+            <a:spAutoFit/>
+          </a:bodyPr>
+          <a:lstStyle/>
+          <a:p>
+            <a:r>
+              <a:rPr lang="en-US" altLang="ko-KR"/>
+              <a:t>100mA, 250mW</a:t>
+            </a:r>
+            <a:endParaRPr lang="ko-KR" altLang="en-US"/>
+          </a:p>
+        </p:txBody>
+      </p:sp>
+      <p:sp>
+        <p:nvSpPr>
+          <p:cNvPr id="22" name="TextBox 21">
+            <a:extLst>
+              <a:ext uri="{FF2B5EF4-FFF2-40B4-BE49-F238E27FC236}">
+                <a16:creationId xmlns:a16="http://schemas.microsoft.com/office/drawing/2014/main" id="{7BE07DBB-6C5D-B133-4A48-77FEA9F14135}"/>
+              </a:ext>
+            </a:extLst>
+          </p:cNvPr>
+          <p:cNvSpPr txBox="1"/>
+          <p:nvPr/>
+        </p:nvSpPr>
+        <p:spPr>
+          <a:xfrm>
+            <a:off x="208778" y="100308"/>
+            <a:ext cx="7490064" cy="369332"/>
+          </a:xfrm>
+          <a:prstGeom prst="rect">
+            <a:avLst/>
+          </a:prstGeom>
+          <a:noFill/>
+        </p:spPr>
+        <p:txBody>
+          <a:bodyPr wrap="none" rtlCol="0">
+            <a:spAutoFit/>
+          </a:bodyPr>
+          <a:lstStyle/>
+          <a:p>
+            <a:r>
+              <a:rPr lang="en-US" altLang="ko-KR" b="0" i="0">
+                <a:solidFill>
+                  <a:srgbClr val="374151"/>
+                </a:solidFill>
+                <a:effectLst/>
+                <a:latin typeface="Söhne"/>
+              </a:rPr>
+              <a:t>The maximum output current for the 3.3V output of the Arty S7 board is 2.2A.</a:t>
+            </a:r>
+            <a:endParaRPr lang="ko-KR" altLang="en-US"/>
+          </a:p>
+        </p:txBody>
+      </p:sp>
+      <p:sp>
+        <p:nvSpPr>
+          <p:cNvPr id="23" name="직사각형 22">
+            <a:extLst>
+              <a:ext uri="{FF2B5EF4-FFF2-40B4-BE49-F238E27FC236}">
+                <a16:creationId xmlns:a16="http://schemas.microsoft.com/office/drawing/2014/main" id="{0461A2F8-F2FF-760C-B5C6-912E5F11DF3A}"/>
+              </a:ext>
+            </a:extLst>
+          </p:cNvPr>
+          <p:cNvSpPr/>
+          <p:nvPr/>
+        </p:nvSpPr>
+        <p:spPr>
+          <a:xfrm>
+            <a:off x="1270000" y="1739900"/>
+            <a:ext cx="10797141" cy="5125992"/>
+          </a:xfrm>
+          <a:prstGeom prst="rect">
+            <a:avLst/>
+          </a:prstGeom>
+          <a:noFill/>
+          <a:ln w="38100">
+            <a:solidFill>
+              <a:schemeClr val="tx1"/>
+            </a:solidFill>
+            <a:prstDash val="lgDash"/>
+          </a:ln>
+        </p:spPr>
+        <p:style>
+          <a:lnRef idx="2">
+            <a:schemeClr val="accent1">
+              <a:shade val="15000"/>
+            </a:schemeClr>
+          </a:lnRef>
+          <a:fillRef idx="1">
+            <a:schemeClr val="accent1"/>
+          </a:fillRef>
+          <a:effectRef idx="0">
+            <a:schemeClr val="accent1"/>
+          </a:effectRef>
+          <a:fontRef idx="minor">
+            <a:schemeClr val="lt1"/>
+          </a:fontRef>
+        </p:style>
+        <p:txBody>
+          <a:bodyPr rtlCol="0" anchor="ctr"/>
+          <a:lstStyle/>
+          <a:p>
+            <a:pPr algn="ctr"/>
+            <a:endParaRPr lang="ko-KR" altLang="en-US"/>
+          </a:p>
+        </p:txBody>
+      </p:sp>
+      <p:sp>
+        <p:nvSpPr>
+          <p:cNvPr id="25" name="TextBox 24">
+            <a:extLst>
+              <a:ext uri="{FF2B5EF4-FFF2-40B4-BE49-F238E27FC236}">
+                <a16:creationId xmlns:a16="http://schemas.microsoft.com/office/drawing/2014/main" id="{068ECD4D-C14C-D266-16C9-C0DCFC069893}"/>
+              </a:ext>
+            </a:extLst>
+          </p:cNvPr>
+          <p:cNvSpPr txBox="1"/>
+          <p:nvPr/>
+        </p:nvSpPr>
+        <p:spPr>
+          <a:xfrm>
+            <a:off x="8718115" y="1163348"/>
+            <a:ext cx="450764" cy="369332"/>
+          </a:xfrm>
+          <a:prstGeom prst="rect">
+            <a:avLst/>
+          </a:prstGeom>
+          <a:noFill/>
+        </p:spPr>
+        <p:txBody>
+          <a:bodyPr wrap="none" rtlCol="0">
+            <a:spAutoFit/>
+          </a:bodyPr>
+          <a:lstStyle/>
+          <a:p>
+            <a:r>
+              <a:rPr lang="en-US" altLang="ko-KR"/>
+              <a:t>X2</a:t>
+            </a:r>
+            <a:endParaRPr lang="ko-KR" altLang="en-US"/>
+          </a:p>
+        </p:txBody>
+      </p:sp>
     </p:spTree>
     <p:extLst>
       <p:ext uri="{BB962C8B-B14F-4D97-AF65-F5344CB8AC3E}">
         <p14:creationId xmlns:p14="http://schemas.microsoft.com/office/powerpoint/2010/main" val="4165285276"/>
+      </p:ext>
+    </p:extLst>
+  </p:cSld>
+  <p:clrMapOvr>
+    <a:masterClrMapping/>
+  </p:clrMapOvr>
+</p:sld>
+</file>
+
+<file path=ppt/slides/slide13.xml><?xml version="1.0" encoding="utf-8"?>
+<p:sld xmlns:a="http://schemas.openxmlformats.org/drawingml/2006/main" xmlns:r="http://schemas.openxmlformats.org/officeDocument/2006/relationships" xmlns:p="http://schemas.openxmlformats.org/presentationml/2006/main">
+  <p:cSld>
+    <p:spTree>
+      <p:nvGrpSpPr>
+        <p:cNvPr id="1" name=""/>
+        <p:cNvGrpSpPr/>
+        <p:nvPr/>
+      </p:nvGrpSpPr>
+      <p:grpSpPr>
+        <a:xfrm>
+          <a:off x="0" y="0"/>
+          <a:ext cx="0" cy="0"/>
+          <a:chOff x="0" y="0"/>
+          <a:chExt cx="0" cy="0"/>
+        </a:xfrm>
+      </p:grpSpPr>
+      <p:sp>
+        <p:nvSpPr>
+          <p:cNvPr id="5" name="직사각형 4">
+            <a:extLst>
+              <a:ext uri="{FF2B5EF4-FFF2-40B4-BE49-F238E27FC236}">
+                <a16:creationId xmlns:a16="http://schemas.microsoft.com/office/drawing/2014/main" id="{8377CC41-5C44-30C2-E9AF-12A349012C29}"/>
+              </a:ext>
+            </a:extLst>
+          </p:cNvPr>
+          <p:cNvSpPr/>
+          <p:nvPr/>
+        </p:nvSpPr>
+        <p:spPr>
+          <a:xfrm>
+            <a:off x="1527859" y="3038358"/>
+            <a:ext cx="1886674" cy="860200"/>
+          </a:xfrm>
+          <a:prstGeom prst="rect">
+            <a:avLst/>
+          </a:prstGeom>
+        </p:spPr>
+        <p:style>
+          <a:lnRef idx="2">
+            <a:schemeClr val="accent1">
+              <a:shade val="15000"/>
+            </a:schemeClr>
+          </a:lnRef>
+          <a:fillRef idx="1">
+            <a:schemeClr val="accent1"/>
+          </a:fillRef>
+          <a:effectRef idx="0">
+            <a:schemeClr val="accent1"/>
+          </a:effectRef>
+          <a:fontRef idx="minor">
+            <a:schemeClr val="lt1"/>
+          </a:fontRef>
+        </p:style>
+        <p:txBody>
+          <a:bodyPr rtlCol="0" anchor="ctr"/>
+          <a:lstStyle/>
+          <a:p>
+            <a:pPr algn="ctr"/>
+            <a:r>
+              <a:rPr lang="en-US" altLang="ko-KR"/>
+              <a:t>Isolator</a:t>
+            </a:r>
+          </a:p>
+          <a:p>
+            <a:pPr algn="ctr"/>
+            <a:r>
+              <a:rPr lang="en-US" altLang="ko-KR"/>
+              <a:t>2-&gt;2</a:t>
+            </a:r>
+          </a:p>
+          <a:p>
+            <a:pPr algn="ctr"/>
+            <a:r>
+              <a:rPr lang="en-US" altLang="ko-KR"/>
+              <a:t>(SI8620BB-B-IS)</a:t>
+            </a:r>
+            <a:endParaRPr lang="ko-KR" altLang="en-US"/>
+          </a:p>
+        </p:txBody>
+      </p:sp>
+      <p:sp>
+        <p:nvSpPr>
+          <p:cNvPr id="8" name="직사각형 7">
+            <a:extLst>
+              <a:ext uri="{FF2B5EF4-FFF2-40B4-BE49-F238E27FC236}">
+                <a16:creationId xmlns:a16="http://schemas.microsoft.com/office/drawing/2014/main" id="{F88D2E9D-DFC2-AF14-E3EE-CAFD1316598E}"/>
+              </a:ext>
+            </a:extLst>
+          </p:cNvPr>
+          <p:cNvSpPr/>
+          <p:nvPr/>
+        </p:nvSpPr>
+        <p:spPr>
+          <a:xfrm>
+            <a:off x="3727040" y="862315"/>
+            <a:ext cx="1713055" cy="769715"/>
+          </a:xfrm>
+          <a:prstGeom prst="rect">
+            <a:avLst/>
+          </a:prstGeom>
+        </p:spPr>
+        <p:style>
+          <a:lnRef idx="2">
+            <a:schemeClr val="accent1">
+              <a:shade val="15000"/>
+            </a:schemeClr>
+          </a:lnRef>
+          <a:fillRef idx="1">
+            <a:schemeClr val="accent1"/>
+          </a:fillRef>
+          <a:effectRef idx="0">
+            <a:schemeClr val="accent1"/>
+          </a:effectRef>
+          <a:fontRef idx="minor">
+            <a:schemeClr val="lt1"/>
+          </a:fontRef>
+        </p:style>
+        <p:txBody>
+          <a:bodyPr rtlCol="0" anchor="ctr"/>
+          <a:lstStyle/>
+          <a:p>
+            <a:pPr algn="ctr"/>
+            <a:r>
+              <a:rPr lang="en-US" altLang="ko-KR"/>
+              <a:t>Regulator</a:t>
+            </a:r>
+            <a:endParaRPr lang="ko-KR" altLang="en-US"/>
+          </a:p>
+        </p:txBody>
+      </p:sp>
+      <p:sp>
+        <p:nvSpPr>
+          <p:cNvPr id="9" name="직사각형 8">
+            <a:extLst>
+              <a:ext uri="{FF2B5EF4-FFF2-40B4-BE49-F238E27FC236}">
+                <a16:creationId xmlns:a16="http://schemas.microsoft.com/office/drawing/2014/main" id="{CD1CFA86-85F9-95BA-6C95-ADF6A287087C}"/>
+              </a:ext>
+            </a:extLst>
+          </p:cNvPr>
+          <p:cNvSpPr/>
+          <p:nvPr/>
+        </p:nvSpPr>
+        <p:spPr>
+          <a:xfrm>
+            <a:off x="5694743" y="2961752"/>
+            <a:ext cx="1504710" cy="1785238"/>
+          </a:xfrm>
+          <a:prstGeom prst="rect">
+            <a:avLst/>
+          </a:prstGeom>
+        </p:spPr>
+        <p:style>
+          <a:lnRef idx="2">
+            <a:schemeClr val="accent1">
+              <a:shade val="15000"/>
+            </a:schemeClr>
+          </a:lnRef>
+          <a:fillRef idx="1">
+            <a:schemeClr val="accent1"/>
+          </a:fillRef>
+          <a:effectRef idx="0">
+            <a:schemeClr val="accent1"/>
+          </a:effectRef>
+          <a:fontRef idx="minor">
+            <a:schemeClr val="lt1"/>
+          </a:fontRef>
+        </p:style>
+        <p:txBody>
+          <a:bodyPr rtlCol="0" anchor="ctr"/>
+          <a:lstStyle/>
+          <a:p>
+            <a:pPr algn="ctr"/>
+            <a:r>
+              <a:rPr lang="en-US" altLang="ko-KR"/>
+              <a:t>Transciever</a:t>
+            </a:r>
+          </a:p>
+          <a:p>
+            <a:pPr algn="ctr"/>
+            <a:r>
+              <a:rPr lang="en-US" altLang="ko-KR"/>
+              <a:t>2&lt;-&gt;2</a:t>
+            </a:r>
+          </a:p>
+          <a:p>
+            <a:pPr algn="ctr"/>
+            <a:r>
+              <a:rPr lang="en-US" altLang="ko-KR"/>
+              <a:t>(74LVCH2T45DC-Q100H)</a:t>
+            </a:r>
+            <a:endParaRPr lang="ko-KR" altLang="en-US"/>
+          </a:p>
+        </p:txBody>
+      </p:sp>
+      <p:sp>
+        <p:nvSpPr>
+          <p:cNvPr id="11" name="직사각형 10">
+            <a:extLst>
+              <a:ext uri="{FF2B5EF4-FFF2-40B4-BE49-F238E27FC236}">
+                <a16:creationId xmlns:a16="http://schemas.microsoft.com/office/drawing/2014/main" id="{D6308E8B-2C6F-A68F-549A-61992A6E9999}"/>
+              </a:ext>
+            </a:extLst>
+          </p:cNvPr>
+          <p:cNvSpPr/>
+          <p:nvPr/>
+        </p:nvSpPr>
+        <p:spPr>
+          <a:xfrm>
+            <a:off x="8718116" y="5200087"/>
+            <a:ext cx="2368984" cy="578733"/>
+          </a:xfrm>
+          <a:prstGeom prst="rect">
+            <a:avLst/>
+          </a:prstGeom>
+        </p:spPr>
+        <p:style>
+          <a:lnRef idx="2">
+            <a:schemeClr val="accent1">
+              <a:shade val="15000"/>
+            </a:schemeClr>
+          </a:lnRef>
+          <a:fillRef idx="1">
+            <a:schemeClr val="accent1"/>
+          </a:fillRef>
+          <a:effectRef idx="0">
+            <a:schemeClr val="accent1"/>
+          </a:effectRef>
+          <a:fontRef idx="minor">
+            <a:schemeClr val="lt1"/>
+          </a:fontRef>
+        </p:style>
+        <p:txBody>
+          <a:bodyPr rtlCol="0" anchor="ctr"/>
+          <a:lstStyle/>
+          <a:p>
+            <a:pPr algn="ctr"/>
+            <a:r>
+              <a:rPr lang="en-US" altLang="ko-KR"/>
+              <a:t>73.33Ohm</a:t>
+            </a:r>
+          </a:p>
+          <a:p>
+            <a:pPr algn="ctr"/>
+            <a:r>
+              <a:rPr lang="en-US" altLang="ko-KR"/>
+              <a:t>(RP73PF2A73R2BTDF)</a:t>
+            </a:r>
+            <a:endParaRPr lang="ko-KR" altLang="en-US"/>
+          </a:p>
+        </p:txBody>
+      </p:sp>
+      <p:sp>
+        <p:nvSpPr>
+          <p:cNvPr id="12" name="직사각형 11">
+            <a:extLst>
+              <a:ext uri="{FF2B5EF4-FFF2-40B4-BE49-F238E27FC236}">
+                <a16:creationId xmlns:a16="http://schemas.microsoft.com/office/drawing/2014/main" id="{53300F5B-45AE-CD74-8110-BEFF911E2D1F}"/>
+              </a:ext>
+            </a:extLst>
+          </p:cNvPr>
+          <p:cNvSpPr/>
+          <p:nvPr/>
+        </p:nvSpPr>
+        <p:spPr>
+          <a:xfrm>
+            <a:off x="9039148" y="3907986"/>
+            <a:ext cx="2047951" cy="578733"/>
+          </a:xfrm>
+          <a:prstGeom prst="rect">
+            <a:avLst/>
+          </a:prstGeom>
+        </p:spPr>
+        <p:style>
+          <a:lnRef idx="2">
+            <a:schemeClr val="accent1">
+              <a:shade val="15000"/>
+            </a:schemeClr>
+          </a:lnRef>
+          <a:fillRef idx="1">
+            <a:schemeClr val="accent1"/>
+          </a:fillRef>
+          <a:effectRef idx="0">
+            <a:schemeClr val="accent1"/>
+          </a:effectRef>
+          <a:fontRef idx="minor">
+            <a:schemeClr val="lt1"/>
+          </a:fontRef>
+        </p:style>
+        <p:txBody>
+          <a:bodyPr rtlCol="0" anchor="ctr"/>
+          <a:lstStyle/>
+          <a:p>
+            <a:pPr algn="ctr"/>
+            <a:r>
+              <a:rPr lang="en-US" altLang="ko-KR"/>
+              <a:t>157.14Ohm</a:t>
+            </a:r>
+          </a:p>
+          <a:p>
+            <a:pPr algn="ctr"/>
+            <a:r>
+              <a:rPr lang="en-US" altLang="ko-KR"/>
+              <a:t>(ERA-8AEB1580V)</a:t>
+            </a:r>
+            <a:endParaRPr lang="ko-KR" altLang="en-US"/>
+          </a:p>
+        </p:txBody>
+      </p:sp>
+      <p:sp>
+        <p:nvSpPr>
+          <p:cNvPr id="13" name="직사각형 12">
+            <a:extLst>
+              <a:ext uri="{FF2B5EF4-FFF2-40B4-BE49-F238E27FC236}">
+                <a16:creationId xmlns:a16="http://schemas.microsoft.com/office/drawing/2014/main" id="{C106224A-EF28-AE89-5E21-A9065BBC0402}"/>
+              </a:ext>
+            </a:extLst>
+          </p:cNvPr>
+          <p:cNvSpPr/>
+          <p:nvPr/>
+        </p:nvSpPr>
+        <p:spPr>
+          <a:xfrm>
+            <a:off x="2569575" y="2019783"/>
+            <a:ext cx="1713055" cy="769715"/>
+          </a:xfrm>
+          <a:prstGeom prst="rect">
+            <a:avLst/>
+          </a:prstGeom>
+        </p:spPr>
+        <p:style>
+          <a:lnRef idx="2">
+            <a:schemeClr val="accent1">
+              <a:shade val="15000"/>
+            </a:schemeClr>
+          </a:lnRef>
+          <a:fillRef idx="1">
+            <a:schemeClr val="accent1"/>
+          </a:fillRef>
+          <a:effectRef idx="0">
+            <a:schemeClr val="accent1"/>
+          </a:effectRef>
+          <a:fontRef idx="minor">
+            <a:schemeClr val="lt1"/>
+          </a:fontRef>
+        </p:style>
+        <p:txBody>
+          <a:bodyPr rtlCol="0" anchor="ctr"/>
+          <a:lstStyle/>
+          <a:p>
+            <a:pPr algn="ctr"/>
+            <a:r>
+              <a:rPr lang="en-US" altLang="ko-KR"/>
+              <a:t>Voltage SPDT</a:t>
+            </a:r>
+            <a:endParaRPr lang="ko-KR" altLang="en-US"/>
+          </a:p>
+        </p:txBody>
+      </p:sp>
+      <p:sp>
+        <p:nvSpPr>
+          <p:cNvPr id="2" name="직사각형 1">
+            <a:extLst>
+              <a:ext uri="{FF2B5EF4-FFF2-40B4-BE49-F238E27FC236}">
+                <a16:creationId xmlns:a16="http://schemas.microsoft.com/office/drawing/2014/main" id="{038501E6-4575-ED4D-19EC-D5C8C76F9446}"/>
+              </a:ext>
+            </a:extLst>
+          </p:cNvPr>
+          <p:cNvSpPr/>
+          <p:nvPr/>
+        </p:nvSpPr>
+        <p:spPr>
+          <a:xfrm>
+            <a:off x="9039148" y="3275638"/>
+            <a:ext cx="2625881" cy="578733"/>
+          </a:xfrm>
+          <a:prstGeom prst="rect">
+            <a:avLst/>
+          </a:prstGeom>
+        </p:spPr>
+        <p:style>
+          <a:lnRef idx="2">
+            <a:schemeClr val="accent1">
+              <a:shade val="15000"/>
+            </a:schemeClr>
+          </a:lnRef>
+          <a:fillRef idx="1">
+            <a:schemeClr val="accent1"/>
+          </a:fillRef>
+          <a:effectRef idx="0">
+            <a:schemeClr val="accent1"/>
+          </a:effectRef>
+          <a:fontRef idx="minor">
+            <a:schemeClr val="lt1"/>
+          </a:fontRef>
+        </p:style>
+        <p:txBody>
+          <a:bodyPr rtlCol="0" anchor="ctr"/>
+          <a:lstStyle/>
+          <a:p>
+            <a:pPr algn="ctr"/>
+            <a:r>
+              <a:rPr lang="en-US" altLang="ko-KR"/>
+              <a:t>Transistor</a:t>
+            </a:r>
+          </a:p>
+          <a:p>
+            <a:pPr algn="ctr"/>
+            <a:r>
+              <a:rPr lang="en-US" altLang="ko-KR"/>
+              <a:t>(LIB_NTGD4167CT1G)</a:t>
+            </a:r>
+            <a:endParaRPr lang="ko-KR" altLang="en-US"/>
+          </a:p>
+        </p:txBody>
+      </p:sp>
+      <p:sp>
+        <p:nvSpPr>
+          <p:cNvPr id="3" name="직사각형 2">
+            <a:extLst>
+              <a:ext uri="{FF2B5EF4-FFF2-40B4-BE49-F238E27FC236}">
+                <a16:creationId xmlns:a16="http://schemas.microsoft.com/office/drawing/2014/main" id="{8DFB32CA-F80C-4378-8C5F-1BE0419ADEB8}"/>
+              </a:ext>
+            </a:extLst>
+          </p:cNvPr>
+          <p:cNvSpPr/>
+          <p:nvPr/>
+        </p:nvSpPr>
+        <p:spPr>
+          <a:xfrm>
+            <a:off x="9039148" y="5845215"/>
+            <a:ext cx="2625881" cy="578733"/>
+          </a:xfrm>
+          <a:prstGeom prst="rect">
+            <a:avLst/>
+          </a:prstGeom>
+        </p:spPr>
+        <p:style>
+          <a:lnRef idx="2">
+            <a:schemeClr val="accent1">
+              <a:shade val="15000"/>
+            </a:schemeClr>
+          </a:lnRef>
+          <a:fillRef idx="1">
+            <a:schemeClr val="accent1"/>
+          </a:fillRef>
+          <a:effectRef idx="0">
+            <a:schemeClr val="accent1"/>
+          </a:effectRef>
+          <a:fontRef idx="minor">
+            <a:schemeClr val="lt1"/>
+          </a:fontRef>
+        </p:style>
+        <p:txBody>
+          <a:bodyPr rtlCol="0" anchor="ctr"/>
+          <a:lstStyle/>
+          <a:p>
+            <a:pPr algn="ctr"/>
+            <a:r>
+              <a:rPr lang="en-US" altLang="ko-KR"/>
+              <a:t>Transistor</a:t>
+            </a:r>
+          </a:p>
+          <a:p>
+            <a:pPr algn="ctr"/>
+            <a:r>
+              <a:rPr lang="en-US" altLang="ko-KR"/>
+              <a:t>(LIB_NTGD4167CT1G)</a:t>
+            </a:r>
+            <a:endParaRPr lang="ko-KR" altLang="en-US"/>
+          </a:p>
+        </p:txBody>
+      </p:sp>
+      <p:sp>
+        <p:nvSpPr>
+          <p:cNvPr id="6" name="직사각형 5">
+            <a:extLst>
+              <a:ext uri="{FF2B5EF4-FFF2-40B4-BE49-F238E27FC236}">
+                <a16:creationId xmlns:a16="http://schemas.microsoft.com/office/drawing/2014/main" id="{3E766F9A-9FBD-5FC5-C330-1425C09744A1}"/>
+              </a:ext>
+            </a:extLst>
+          </p:cNvPr>
+          <p:cNvSpPr/>
+          <p:nvPr/>
+        </p:nvSpPr>
+        <p:spPr>
+          <a:xfrm flipV="1">
+            <a:off x="7354852" y="4791919"/>
+            <a:ext cx="3378236" cy="92600"/>
+          </a:xfrm>
+          <a:prstGeom prst="rect">
+            <a:avLst/>
+          </a:prstGeom>
+        </p:spPr>
+        <p:style>
+          <a:lnRef idx="2">
+            <a:schemeClr val="accent1">
+              <a:shade val="15000"/>
+            </a:schemeClr>
+          </a:lnRef>
+          <a:fillRef idx="1">
+            <a:schemeClr val="accent1"/>
+          </a:fillRef>
+          <a:effectRef idx="0">
+            <a:schemeClr val="accent1"/>
+          </a:effectRef>
+          <a:fontRef idx="minor">
+            <a:schemeClr val="lt1"/>
+          </a:fontRef>
+        </p:style>
+        <p:txBody>
+          <a:bodyPr rtlCol="0" anchor="ctr"/>
+          <a:lstStyle/>
+          <a:p>
+            <a:pPr algn="ctr"/>
+            <a:endParaRPr lang="ko-KR" altLang="en-US"/>
+          </a:p>
+        </p:txBody>
+      </p:sp>
+      <p:sp>
+        <p:nvSpPr>
+          <p:cNvPr id="15" name="직사각형 14">
+            <a:extLst>
+              <a:ext uri="{FF2B5EF4-FFF2-40B4-BE49-F238E27FC236}">
+                <a16:creationId xmlns:a16="http://schemas.microsoft.com/office/drawing/2014/main" id="{A0496A06-A3A9-9452-0BD4-3469213FD77C}"/>
+              </a:ext>
+            </a:extLst>
+          </p:cNvPr>
+          <p:cNvSpPr/>
+          <p:nvPr/>
+        </p:nvSpPr>
+        <p:spPr>
+          <a:xfrm>
+            <a:off x="4618294" y="2019783"/>
+            <a:ext cx="1713055" cy="769715"/>
+          </a:xfrm>
+          <a:prstGeom prst="rect">
+            <a:avLst/>
+          </a:prstGeom>
+        </p:spPr>
+        <p:style>
+          <a:lnRef idx="2">
+            <a:schemeClr val="accent1">
+              <a:shade val="15000"/>
+            </a:schemeClr>
+          </a:lnRef>
+          <a:fillRef idx="1">
+            <a:schemeClr val="accent1"/>
+          </a:fillRef>
+          <a:effectRef idx="0">
+            <a:schemeClr val="accent1"/>
+          </a:effectRef>
+          <a:fontRef idx="minor">
+            <a:schemeClr val="lt1"/>
+          </a:fontRef>
+        </p:style>
+        <p:txBody>
+          <a:bodyPr rtlCol="0" anchor="ctr"/>
+          <a:lstStyle/>
+          <a:p>
+            <a:pPr algn="ctr"/>
+            <a:r>
+              <a:rPr lang="en-US" altLang="ko-KR"/>
+              <a:t>IO SPDT</a:t>
+            </a:r>
+            <a:endParaRPr lang="ko-KR" altLang="en-US"/>
+          </a:p>
+        </p:txBody>
+      </p:sp>
+      <p:sp>
+        <p:nvSpPr>
+          <p:cNvPr id="16" name="직사각형 15">
+            <a:extLst>
+              <a:ext uri="{FF2B5EF4-FFF2-40B4-BE49-F238E27FC236}">
+                <a16:creationId xmlns:a16="http://schemas.microsoft.com/office/drawing/2014/main" id="{098103C6-86AF-5AA1-ECB4-6974E3CF5E45}"/>
+              </a:ext>
+            </a:extLst>
+          </p:cNvPr>
+          <p:cNvSpPr/>
+          <p:nvPr/>
+        </p:nvSpPr>
+        <p:spPr>
+          <a:xfrm>
+            <a:off x="8001962" y="2019783"/>
+            <a:ext cx="1713055" cy="769715"/>
+          </a:xfrm>
+          <a:prstGeom prst="rect">
+            <a:avLst/>
+          </a:prstGeom>
+        </p:spPr>
+        <p:style>
+          <a:lnRef idx="2">
+            <a:schemeClr val="accent1">
+              <a:shade val="15000"/>
+            </a:schemeClr>
+          </a:lnRef>
+          <a:fillRef idx="1">
+            <a:schemeClr val="accent1"/>
+          </a:fillRef>
+          <a:effectRef idx="0">
+            <a:schemeClr val="accent1"/>
+          </a:effectRef>
+          <a:fontRef idx="minor">
+            <a:schemeClr val="lt1"/>
+          </a:fontRef>
+        </p:style>
+        <p:txBody>
+          <a:bodyPr rtlCol="0" anchor="ctr"/>
+          <a:lstStyle/>
+          <a:p>
+            <a:pPr algn="ctr"/>
+            <a:r>
+              <a:rPr lang="en-US" altLang="ko-KR"/>
+              <a:t>Impedance SPDT</a:t>
+            </a:r>
+            <a:endParaRPr lang="ko-KR" altLang="en-US"/>
+          </a:p>
+        </p:txBody>
+      </p:sp>
+      <p:cxnSp>
+        <p:nvCxnSpPr>
+          <p:cNvPr id="18" name="연결선: 꺾임 17">
+            <a:extLst>
+              <a:ext uri="{FF2B5EF4-FFF2-40B4-BE49-F238E27FC236}">
+                <a16:creationId xmlns:a16="http://schemas.microsoft.com/office/drawing/2014/main" id="{6A552C85-19E3-5809-9555-1B8E5E7754C3}"/>
+              </a:ext>
+            </a:extLst>
+          </p:cNvPr>
+          <p:cNvCxnSpPr>
+            <a:cxnSpLocks/>
+            <a:stCxn id="5" idx="0"/>
+            <a:endCxn id="13" idx="2"/>
+          </p:cNvCxnSpPr>
+          <p:nvPr/>
+        </p:nvCxnSpPr>
+        <p:spPr>
+          <a:xfrm rot="5400000" flipH="1" flipV="1">
+            <a:off x="2824219" y="2436475"/>
+            <a:ext cx="248860" cy="954907"/>
+          </a:xfrm>
+          <a:prstGeom prst="bentConnector3">
+            <a:avLst/>
+          </a:prstGeom>
+        </p:spPr>
+        <p:style>
+          <a:lnRef idx="1">
+            <a:schemeClr val="accent1"/>
+          </a:lnRef>
+          <a:fillRef idx="0">
+            <a:schemeClr val="accent1"/>
+          </a:fillRef>
+          <a:effectRef idx="0">
+            <a:schemeClr val="accent1"/>
+          </a:effectRef>
+          <a:fontRef idx="minor">
+            <a:schemeClr val="tx1"/>
+          </a:fontRef>
+        </p:style>
+      </p:cxnSp>
+      <p:cxnSp>
+        <p:nvCxnSpPr>
+          <p:cNvPr id="20" name="연결선: 꺾임 19">
+            <a:extLst>
+              <a:ext uri="{FF2B5EF4-FFF2-40B4-BE49-F238E27FC236}">
+                <a16:creationId xmlns:a16="http://schemas.microsoft.com/office/drawing/2014/main" id="{4F039163-2642-A70E-D2FD-0C716A05ED5A}"/>
+              </a:ext>
+            </a:extLst>
+          </p:cNvPr>
+          <p:cNvCxnSpPr>
+            <a:cxnSpLocks/>
+            <a:stCxn id="5" idx="3"/>
+            <a:endCxn id="15" idx="2"/>
+          </p:cNvCxnSpPr>
+          <p:nvPr/>
+        </p:nvCxnSpPr>
+        <p:spPr>
+          <a:xfrm flipV="1">
+            <a:off x="3414533" y="2789498"/>
+            <a:ext cx="2060289" cy="678960"/>
+          </a:xfrm>
+          <a:prstGeom prst="bentConnector2">
+            <a:avLst/>
+          </a:prstGeom>
+        </p:spPr>
+        <p:style>
+          <a:lnRef idx="1">
+            <a:schemeClr val="accent1"/>
+          </a:lnRef>
+          <a:fillRef idx="0">
+            <a:schemeClr val="accent1"/>
+          </a:fillRef>
+          <a:effectRef idx="0">
+            <a:schemeClr val="accent1"/>
+          </a:effectRef>
+          <a:fontRef idx="minor">
+            <a:schemeClr val="tx1"/>
+          </a:fontRef>
+        </p:style>
+      </p:cxnSp>
+      <p:cxnSp>
+        <p:nvCxnSpPr>
+          <p:cNvPr id="24" name="연결선: 꺾임 23">
+            <a:extLst>
+              <a:ext uri="{FF2B5EF4-FFF2-40B4-BE49-F238E27FC236}">
+                <a16:creationId xmlns:a16="http://schemas.microsoft.com/office/drawing/2014/main" id="{BD51A0B4-E588-5EAB-67E6-7FE9E7F6B5D2}"/>
+              </a:ext>
+            </a:extLst>
+          </p:cNvPr>
+          <p:cNvCxnSpPr>
+            <a:cxnSpLocks/>
+            <a:stCxn id="29" idx="3"/>
+            <a:endCxn id="15" idx="2"/>
+          </p:cNvCxnSpPr>
+          <p:nvPr/>
+        </p:nvCxnSpPr>
+        <p:spPr>
+          <a:xfrm flipV="1">
+            <a:off x="3414533" y="2789498"/>
+            <a:ext cx="2060289" cy="3646294"/>
+          </a:xfrm>
+          <a:prstGeom prst="bentConnector2">
+            <a:avLst/>
+          </a:prstGeom>
+        </p:spPr>
+        <p:style>
+          <a:lnRef idx="1">
+            <a:schemeClr val="accent1"/>
+          </a:lnRef>
+          <a:fillRef idx="0">
+            <a:schemeClr val="accent1"/>
+          </a:fillRef>
+          <a:effectRef idx="0">
+            <a:schemeClr val="accent1"/>
+          </a:effectRef>
+          <a:fontRef idx="minor">
+            <a:schemeClr val="tx1"/>
+          </a:fontRef>
+        </p:style>
+      </p:cxnSp>
+      <p:cxnSp>
+        <p:nvCxnSpPr>
+          <p:cNvPr id="27" name="연결선: 꺾임 26">
+            <a:extLst>
+              <a:ext uri="{FF2B5EF4-FFF2-40B4-BE49-F238E27FC236}">
+                <a16:creationId xmlns:a16="http://schemas.microsoft.com/office/drawing/2014/main" id="{8C1FC465-4CD3-DF9C-A088-6030C9431C92}"/>
+              </a:ext>
+            </a:extLst>
+          </p:cNvPr>
+          <p:cNvCxnSpPr>
+            <a:cxnSpLocks/>
+            <a:stCxn id="2" idx="1"/>
+            <a:endCxn id="16" idx="2"/>
+          </p:cNvCxnSpPr>
+          <p:nvPr/>
+        </p:nvCxnSpPr>
+        <p:spPr>
+          <a:xfrm rot="10800000">
+            <a:off x="8858490" y="2789499"/>
+            <a:ext cx="180658" cy="775507"/>
+          </a:xfrm>
+          <a:prstGeom prst="bentConnector2">
+            <a:avLst/>
+          </a:prstGeom>
+        </p:spPr>
+        <p:style>
+          <a:lnRef idx="1">
+            <a:schemeClr val="accent1"/>
+          </a:lnRef>
+          <a:fillRef idx="0">
+            <a:schemeClr val="accent1"/>
+          </a:fillRef>
+          <a:effectRef idx="0">
+            <a:schemeClr val="accent1"/>
+          </a:effectRef>
+          <a:fontRef idx="minor">
+            <a:schemeClr val="tx1"/>
+          </a:fontRef>
+        </p:style>
+      </p:cxnSp>
+      <p:cxnSp>
+        <p:nvCxnSpPr>
+          <p:cNvPr id="30" name="연결선: 꺾임 29">
+            <a:extLst>
+              <a:ext uri="{FF2B5EF4-FFF2-40B4-BE49-F238E27FC236}">
+                <a16:creationId xmlns:a16="http://schemas.microsoft.com/office/drawing/2014/main" id="{BCA8E6DC-EDB6-2141-8B36-5C2D09F741AB}"/>
+              </a:ext>
+            </a:extLst>
+          </p:cNvPr>
+          <p:cNvCxnSpPr>
+            <a:cxnSpLocks/>
+            <a:stCxn id="47" idx="0"/>
+            <a:endCxn id="16" idx="2"/>
+          </p:cNvCxnSpPr>
+          <p:nvPr/>
+        </p:nvCxnSpPr>
+        <p:spPr>
+          <a:xfrm rot="5400000" flipH="1" flipV="1">
+            <a:off x="7029586" y="4016312"/>
+            <a:ext cx="3055717" cy="602091"/>
+          </a:xfrm>
+          <a:prstGeom prst="bentConnector3">
+            <a:avLst>
+              <a:gd name="adj1" fmla="val 50000"/>
+            </a:avLst>
+          </a:prstGeom>
+        </p:spPr>
+        <p:style>
+          <a:lnRef idx="1">
+            <a:schemeClr val="accent1"/>
+          </a:lnRef>
+          <a:fillRef idx="0">
+            <a:schemeClr val="accent1"/>
+          </a:fillRef>
+          <a:effectRef idx="0">
+            <a:schemeClr val="accent1"/>
+          </a:effectRef>
+          <a:fontRef idx="minor">
+            <a:schemeClr val="tx1"/>
+          </a:fontRef>
+        </p:style>
+      </p:cxnSp>
+      <p:sp>
+        <p:nvSpPr>
+          <p:cNvPr id="34" name="직사각형 33">
+            <a:extLst>
+              <a:ext uri="{FF2B5EF4-FFF2-40B4-BE49-F238E27FC236}">
+                <a16:creationId xmlns:a16="http://schemas.microsoft.com/office/drawing/2014/main" id="{8789338B-9781-3E12-A0FC-2E6BCBEB9593}"/>
+              </a:ext>
+            </a:extLst>
+          </p:cNvPr>
+          <p:cNvSpPr/>
+          <p:nvPr/>
+        </p:nvSpPr>
+        <p:spPr>
+          <a:xfrm rot="5400000">
+            <a:off x="-262892" y="4453360"/>
+            <a:ext cx="1713055" cy="769715"/>
+          </a:xfrm>
+          <a:prstGeom prst="rect">
+            <a:avLst/>
+          </a:prstGeom>
+        </p:spPr>
+        <p:style>
+          <a:lnRef idx="2">
+            <a:schemeClr val="accent1">
+              <a:shade val="15000"/>
+            </a:schemeClr>
+          </a:lnRef>
+          <a:fillRef idx="1">
+            <a:schemeClr val="accent1"/>
+          </a:fillRef>
+          <a:effectRef idx="0">
+            <a:schemeClr val="accent1"/>
+          </a:effectRef>
+          <a:fontRef idx="minor">
+            <a:schemeClr val="lt1"/>
+          </a:fontRef>
+        </p:style>
+        <p:txBody>
+          <a:bodyPr rtlCol="0" anchor="ctr"/>
+          <a:lstStyle/>
+          <a:p>
+            <a:pPr algn="ctr"/>
+            <a:r>
+              <a:rPr lang="en-US" altLang="ko-KR"/>
+              <a:t>Molex</a:t>
+            </a:r>
+          </a:p>
+          <a:p>
+            <a:pPr algn="ctr"/>
+            <a:r>
+              <a:rPr lang="en-US" altLang="ko-KR"/>
+              <a:t>Pin Header</a:t>
+            </a:r>
+          </a:p>
+          <a:p>
+            <a:pPr algn="ctr"/>
+            <a:r>
+              <a:rPr lang="en-US" altLang="ko-KR"/>
+              <a:t>(87911-1207)</a:t>
+            </a:r>
+            <a:endParaRPr lang="ko-KR" altLang="en-US"/>
+          </a:p>
+        </p:txBody>
+      </p:sp>
+      <p:sp>
+        <p:nvSpPr>
+          <p:cNvPr id="36" name="직사각형 35">
+            <a:extLst>
+              <a:ext uri="{FF2B5EF4-FFF2-40B4-BE49-F238E27FC236}">
+                <a16:creationId xmlns:a16="http://schemas.microsoft.com/office/drawing/2014/main" id="{06071E10-6C51-88D1-36BE-3AA2C13B4F82}"/>
+              </a:ext>
+            </a:extLst>
+          </p:cNvPr>
+          <p:cNvSpPr/>
+          <p:nvPr/>
+        </p:nvSpPr>
+        <p:spPr>
+          <a:xfrm rot="10800000" flipV="1">
+            <a:off x="10783540" y="4519917"/>
+            <a:ext cx="1241378" cy="636604"/>
+          </a:xfrm>
+          <a:prstGeom prst="rect">
+            <a:avLst/>
+          </a:prstGeom>
+        </p:spPr>
+        <p:style>
+          <a:lnRef idx="2">
+            <a:schemeClr val="accent1">
+              <a:shade val="15000"/>
+            </a:schemeClr>
+          </a:lnRef>
+          <a:fillRef idx="1">
+            <a:schemeClr val="accent1"/>
+          </a:fillRef>
+          <a:effectRef idx="0">
+            <a:schemeClr val="accent1"/>
+          </a:effectRef>
+          <a:fontRef idx="minor">
+            <a:schemeClr val="lt1"/>
+          </a:fontRef>
+        </p:style>
+        <p:txBody>
+          <a:bodyPr rtlCol="0" anchor="ctr"/>
+          <a:lstStyle/>
+          <a:p>
+            <a:pPr algn="ctr"/>
+            <a:r>
+              <a:rPr lang="en-US" altLang="ko-KR"/>
+              <a:t>BNC</a:t>
+            </a:r>
+          </a:p>
+          <a:p>
+            <a:pPr algn="ctr"/>
+            <a:r>
+              <a:rPr lang="en-US" altLang="ko-KR"/>
+              <a:t>(031-6575)</a:t>
+            </a:r>
+            <a:endParaRPr lang="ko-KR" altLang="en-US"/>
+          </a:p>
+        </p:txBody>
+      </p:sp>
+      <p:sp>
+        <p:nvSpPr>
+          <p:cNvPr id="26" name="직사각형 25">
+            <a:extLst>
+              <a:ext uri="{FF2B5EF4-FFF2-40B4-BE49-F238E27FC236}">
+                <a16:creationId xmlns:a16="http://schemas.microsoft.com/office/drawing/2014/main" id="{DFF76C1E-FFE1-6A66-27BF-FADD68F4584E}"/>
+              </a:ext>
+            </a:extLst>
+          </p:cNvPr>
+          <p:cNvSpPr/>
+          <p:nvPr/>
+        </p:nvSpPr>
+        <p:spPr>
+          <a:xfrm>
+            <a:off x="1527859" y="4024319"/>
+            <a:ext cx="1886674" cy="860200"/>
+          </a:xfrm>
+          <a:prstGeom prst="rect">
+            <a:avLst/>
+          </a:prstGeom>
+        </p:spPr>
+        <p:style>
+          <a:lnRef idx="2">
+            <a:schemeClr val="accent1">
+              <a:shade val="15000"/>
+            </a:schemeClr>
+          </a:lnRef>
+          <a:fillRef idx="1">
+            <a:schemeClr val="accent1"/>
+          </a:fillRef>
+          <a:effectRef idx="0">
+            <a:schemeClr val="accent1"/>
+          </a:effectRef>
+          <a:fontRef idx="minor">
+            <a:schemeClr val="lt1"/>
+          </a:fontRef>
+        </p:style>
+        <p:txBody>
+          <a:bodyPr rtlCol="0" anchor="ctr"/>
+          <a:lstStyle/>
+          <a:p>
+            <a:pPr algn="ctr"/>
+            <a:r>
+              <a:rPr lang="en-US" altLang="ko-KR"/>
+              <a:t>Isolator</a:t>
+            </a:r>
+          </a:p>
+          <a:p>
+            <a:pPr algn="ctr"/>
+            <a:r>
+              <a:rPr lang="en-US" altLang="ko-KR"/>
+              <a:t>2-&gt;2</a:t>
+            </a:r>
+          </a:p>
+          <a:p>
+            <a:pPr algn="ctr"/>
+            <a:r>
+              <a:rPr lang="en-US" altLang="ko-KR"/>
+              <a:t>(SI8620BB-B-IS)</a:t>
+            </a:r>
+            <a:endParaRPr lang="ko-KR" altLang="en-US"/>
+          </a:p>
+        </p:txBody>
+      </p:sp>
+      <p:sp>
+        <p:nvSpPr>
+          <p:cNvPr id="28" name="직사각형 27">
+            <a:extLst>
+              <a:ext uri="{FF2B5EF4-FFF2-40B4-BE49-F238E27FC236}">
+                <a16:creationId xmlns:a16="http://schemas.microsoft.com/office/drawing/2014/main" id="{552281ED-A2F1-1CEB-670C-F89A058C8BEA}"/>
+              </a:ext>
+            </a:extLst>
+          </p:cNvPr>
+          <p:cNvSpPr/>
+          <p:nvPr/>
+        </p:nvSpPr>
+        <p:spPr>
+          <a:xfrm>
+            <a:off x="1527859" y="5016981"/>
+            <a:ext cx="1886674" cy="860200"/>
+          </a:xfrm>
+          <a:prstGeom prst="rect">
+            <a:avLst/>
+          </a:prstGeom>
+        </p:spPr>
+        <p:style>
+          <a:lnRef idx="2">
+            <a:schemeClr val="accent1">
+              <a:shade val="15000"/>
+            </a:schemeClr>
+          </a:lnRef>
+          <a:fillRef idx="1">
+            <a:schemeClr val="accent1"/>
+          </a:fillRef>
+          <a:effectRef idx="0">
+            <a:schemeClr val="accent1"/>
+          </a:effectRef>
+          <a:fontRef idx="minor">
+            <a:schemeClr val="lt1"/>
+          </a:fontRef>
+        </p:style>
+        <p:txBody>
+          <a:bodyPr rtlCol="0" anchor="ctr"/>
+          <a:lstStyle/>
+          <a:p>
+            <a:pPr algn="ctr"/>
+            <a:r>
+              <a:rPr lang="en-US" altLang="ko-KR"/>
+              <a:t>Isolator</a:t>
+            </a:r>
+          </a:p>
+          <a:p>
+            <a:pPr algn="ctr"/>
+            <a:r>
+              <a:rPr lang="en-US" altLang="ko-KR"/>
+              <a:t>2&lt;-2</a:t>
+            </a:r>
+          </a:p>
+          <a:p>
+            <a:pPr algn="ctr"/>
+            <a:r>
+              <a:rPr lang="en-US" altLang="ko-KR"/>
+              <a:t>(SI8620BB-B-IS)</a:t>
+            </a:r>
+            <a:endParaRPr lang="ko-KR" altLang="en-US"/>
+          </a:p>
+        </p:txBody>
+      </p:sp>
+      <p:sp>
+        <p:nvSpPr>
+          <p:cNvPr id="29" name="직사각형 28">
+            <a:extLst>
+              <a:ext uri="{FF2B5EF4-FFF2-40B4-BE49-F238E27FC236}">
+                <a16:creationId xmlns:a16="http://schemas.microsoft.com/office/drawing/2014/main" id="{F9B0EB72-DFA2-831C-AF86-B8EC617CA0B2}"/>
+              </a:ext>
+            </a:extLst>
+          </p:cNvPr>
+          <p:cNvSpPr/>
+          <p:nvPr/>
+        </p:nvSpPr>
+        <p:spPr>
+          <a:xfrm>
+            <a:off x="1527859" y="6005692"/>
+            <a:ext cx="1886674" cy="860200"/>
+          </a:xfrm>
+          <a:prstGeom prst="rect">
+            <a:avLst/>
+          </a:prstGeom>
+        </p:spPr>
+        <p:style>
+          <a:lnRef idx="2">
+            <a:schemeClr val="accent1">
+              <a:shade val="15000"/>
+            </a:schemeClr>
+          </a:lnRef>
+          <a:fillRef idx="1">
+            <a:schemeClr val="accent1"/>
+          </a:fillRef>
+          <a:effectRef idx="0">
+            <a:schemeClr val="accent1"/>
+          </a:effectRef>
+          <a:fontRef idx="minor">
+            <a:schemeClr val="lt1"/>
+          </a:fontRef>
+        </p:style>
+        <p:txBody>
+          <a:bodyPr rtlCol="0" anchor="ctr"/>
+          <a:lstStyle/>
+          <a:p>
+            <a:pPr algn="ctr"/>
+            <a:r>
+              <a:rPr lang="en-US" altLang="ko-KR"/>
+              <a:t>Isolator</a:t>
+            </a:r>
+          </a:p>
+          <a:p>
+            <a:pPr algn="ctr"/>
+            <a:r>
+              <a:rPr lang="en-US" altLang="ko-KR"/>
+              <a:t>2&lt;-2</a:t>
+            </a:r>
+          </a:p>
+          <a:p>
+            <a:pPr algn="ctr"/>
+            <a:r>
+              <a:rPr lang="en-US" altLang="ko-KR"/>
+              <a:t>(SI8620BB-B-IS)</a:t>
+            </a:r>
+            <a:endParaRPr lang="ko-KR" altLang="en-US"/>
+          </a:p>
+        </p:txBody>
+      </p:sp>
+      <p:cxnSp>
+        <p:nvCxnSpPr>
+          <p:cNvPr id="32" name="연결선: 꺾임 31">
+            <a:extLst>
+              <a:ext uri="{FF2B5EF4-FFF2-40B4-BE49-F238E27FC236}">
+                <a16:creationId xmlns:a16="http://schemas.microsoft.com/office/drawing/2014/main" id="{027E0520-EBA4-FC33-538E-18DB78416316}"/>
+              </a:ext>
+            </a:extLst>
+          </p:cNvPr>
+          <p:cNvCxnSpPr>
+            <a:cxnSpLocks/>
+            <a:stCxn id="26" idx="3"/>
+            <a:endCxn id="15" idx="2"/>
+          </p:cNvCxnSpPr>
+          <p:nvPr/>
+        </p:nvCxnSpPr>
+        <p:spPr>
+          <a:xfrm flipV="1">
+            <a:off x="3414533" y="2789498"/>
+            <a:ext cx="2060289" cy="1664921"/>
+          </a:xfrm>
+          <a:prstGeom prst="bentConnector2">
+            <a:avLst/>
+          </a:prstGeom>
+        </p:spPr>
+        <p:style>
+          <a:lnRef idx="1">
+            <a:schemeClr val="accent1"/>
+          </a:lnRef>
+          <a:fillRef idx="0">
+            <a:schemeClr val="accent1"/>
+          </a:fillRef>
+          <a:effectRef idx="0">
+            <a:schemeClr val="accent1"/>
+          </a:effectRef>
+          <a:fontRef idx="minor">
+            <a:schemeClr val="tx1"/>
+          </a:fontRef>
+        </p:style>
+      </p:cxnSp>
+      <p:cxnSp>
+        <p:nvCxnSpPr>
+          <p:cNvPr id="37" name="연결선: 꺾임 36">
+            <a:extLst>
+              <a:ext uri="{FF2B5EF4-FFF2-40B4-BE49-F238E27FC236}">
+                <a16:creationId xmlns:a16="http://schemas.microsoft.com/office/drawing/2014/main" id="{07580EDA-79E2-C9CB-3187-C3B882D27473}"/>
+              </a:ext>
+            </a:extLst>
+          </p:cNvPr>
+          <p:cNvCxnSpPr>
+            <a:cxnSpLocks/>
+            <a:stCxn id="28" idx="3"/>
+            <a:endCxn id="15" idx="2"/>
+          </p:cNvCxnSpPr>
+          <p:nvPr/>
+        </p:nvCxnSpPr>
+        <p:spPr>
+          <a:xfrm flipV="1">
+            <a:off x="3414533" y="2789498"/>
+            <a:ext cx="2060289" cy="2657583"/>
+          </a:xfrm>
+          <a:prstGeom prst="bentConnector2">
+            <a:avLst/>
+          </a:prstGeom>
+        </p:spPr>
+        <p:style>
+          <a:lnRef idx="1">
+            <a:schemeClr val="accent1"/>
+          </a:lnRef>
+          <a:fillRef idx="0">
+            <a:schemeClr val="accent1"/>
+          </a:fillRef>
+          <a:effectRef idx="0">
+            <a:schemeClr val="accent1"/>
+          </a:effectRef>
+          <a:fontRef idx="minor">
+            <a:schemeClr val="tx1"/>
+          </a:fontRef>
+        </p:style>
+      </p:cxnSp>
+      <p:sp>
+        <p:nvSpPr>
+          <p:cNvPr id="40" name="직사각형 39">
+            <a:extLst>
+              <a:ext uri="{FF2B5EF4-FFF2-40B4-BE49-F238E27FC236}">
+                <a16:creationId xmlns:a16="http://schemas.microsoft.com/office/drawing/2014/main" id="{F1A393F2-F9FA-039F-D48C-B271A7F6C212}"/>
+              </a:ext>
+            </a:extLst>
+          </p:cNvPr>
+          <p:cNvSpPr/>
+          <p:nvPr/>
+        </p:nvSpPr>
+        <p:spPr>
+          <a:xfrm>
+            <a:off x="5694743" y="4838217"/>
+            <a:ext cx="1504710" cy="1785238"/>
+          </a:xfrm>
+          <a:prstGeom prst="rect">
+            <a:avLst/>
+          </a:prstGeom>
+        </p:spPr>
+        <p:style>
+          <a:lnRef idx="2">
+            <a:schemeClr val="accent1">
+              <a:shade val="15000"/>
+            </a:schemeClr>
+          </a:lnRef>
+          <a:fillRef idx="1">
+            <a:schemeClr val="accent1"/>
+          </a:fillRef>
+          <a:effectRef idx="0">
+            <a:schemeClr val="accent1"/>
+          </a:effectRef>
+          <a:fontRef idx="minor">
+            <a:schemeClr val="lt1"/>
+          </a:fontRef>
+        </p:style>
+        <p:txBody>
+          <a:bodyPr rtlCol="0" anchor="ctr"/>
+          <a:lstStyle/>
+          <a:p>
+            <a:pPr algn="ctr"/>
+            <a:r>
+              <a:rPr lang="en-US" altLang="ko-KR"/>
+              <a:t>Transciever</a:t>
+            </a:r>
+          </a:p>
+          <a:p>
+            <a:pPr algn="ctr"/>
+            <a:r>
+              <a:rPr lang="en-US" altLang="ko-KR"/>
+              <a:t>2&lt;-&gt;2</a:t>
+            </a:r>
+          </a:p>
+          <a:p>
+            <a:pPr algn="ctr"/>
+            <a:r>
+              <a:rPr lang="en-US" altLang="ko-KR"/>
+              <a:t>(74LVCH2T45DC-Q100H)</a:t>
+            </a:r>
+            <a:endParaRPr lang="ko-KR" altLang="en-US"/>
+          </a:p>
+        </p:txBody>
+      </p:sp>
+      <p:sp>
+        <p:nvSpPr>
+          <p:cNvPr id="47" name="직사각형 46">
+            <a:extLst>
+              <a:ext uri="{FF2B5EF4-FFF2-40B4-BE49-F238E27FC236}">
+                <a16:creationId xmlns:a16="http://schemas.microsoft.com/office/drawing/2014/main" id="{DDF47B13-403E-1F4E-8500-B50036A3172B}"/>
+              </a:ext>
+            </a:extLst>
+          </p:cNvPr>
+          <p:cNvSpPr/>
+          <p:nvPr/>
+        </p:nvSpPr>
+        <p:spPr>
+          <a:xfrm>
+            <a:off x="7616142" y="5845215"/>
+            <a:ext cx="1280514" cy="778240"/>
+          </a:xfrm>
+          <a:prstGeom prst="rect">
+            <a:avLst/>
+          </a:prstGeom>
+        </p:spPr>
+        <p:style>
+          <a:lnRef idx="2">
+            <a:schemeClr val="accent1">
+              <a:shade val="15000"/>
+            </a:schemeClr>
+          </a:lnRef>
+          <a:fillRef idx="1">
+            <a:schemeClr val="accent1"/>
+          </a:fillRef>
+          <a:effectRef idx="0">
+            <a:schemeClr val="accent1"/>
+          </a:effectRef>
+          <a:fontRef idx="minor">
+            <a:schemeClr val="lt1"/>
+          </a:fontRef>
+        </p:style>
+        <p:txBody>
+          <a:bodyPr rtlCol="0" anchor="ctr"/>
+          <a:lstStyle/>
+          <a:p>
+            <a:pPr algn="ctr"/>
+            <a:r>
+              <a:rPr lang="en-US" altLang="ko-KR"/>
+              <a:t>Invertor</a:t>
+            </a:r>
+          </a:p>
+          <a:p>
+            <a:pPr algn="ctr"/>
+            <a:r>
+              <a:rPr lang="en-US" altLang="ko-KR"/>
+              <a:t>(NLVHC1G14DFT1G)</a:t>
+            </a:r>
+            <a:endParaRPr lang="ko-KR" altLang="en-US"/>
+          </a:p>
+        </p:txBody>
+      </p:sp>
+      <p:sp>
+        <p:nvSpPr>
+          <p:cNvPr id="49" name="직사각형 48">
+            <a:extLst>
+              <a:ext uri="{FF2B5EF4-FFF2-40B4-BE49-F238E27FC236}">
+                <a16:creationId xmlns:a16="http://schemas.microsoft.com/office/drawing/2014/main" id="{BB3FB795-B72C-C3AB-84CE-893D362E6F06}"/>
+              </a:ext>
+            </a:extLst>
+          </p:cNvPr>
+          <p:cNvSpPr/>
+          <p:nvPr/>
+        </p:nvSpPr>
+        <p:spPr>
+          <a:xfrm>
+            <a:off x="124859" y="862315"/>
+            <a:ext cx="1881739" cy="769715"/>
+          </a:xfrm>
+          <a:prstGeom prst="rect">
+            <a:avLst/>
+          </a:prstGeom>
+        </p:spPr>
+        <p:style>
+          <a:lnRef idx="2">
+            <a:schemeClr val="accent1">
+              <a:shade val="15000"/>
+            </a:schemeClr>
+          </a:lnRef>
+          <a:fillRef idx="1">
+            <a:schemeClr val="accent1"/>
+          </a:fillRef>
+          <a:effectRef idx="0">
+            <a:schemeClr val="accent1"/>
+          </a:effectRef>
+          <a:fontRef idx="minor">
+            <a:schemeClr val="lt1"/>
+          </a:fontRef>
+        </p:style>
+        <p:txBody>
+          <a:bodyPr rtlCol="0" anchor="ctr"/>
+          <a:lstStyle/>
+          <a:p>
+            <a:pPr algn="ctr"/>
+            <a:r>
+              <a:rPr lang="en-US" altLang="ko-KR"/>
+              <a:t>EXT PWR PIN</a:t>
+            </a:r>
+          </a:p>
+          <a:p>
+            <a:pPr algn="ctr"/>
+            <a:r>
+              <a:rPr lang="en-US" altLang="ko-KR"/>
+              <a:t>(462071104)</a:t>
+            </a:r>
+            <a:endParaRPr lang="ko-KR" altLang="en-US"/>
+          </a:p>
+        </p:txBody>
+      </p:sp>
+      <p:cxnSp>
+        <p:nvCxnSpPr>
+          <p:cNvPr id="14" name="직선 연결선 13">
+            <a:extLst>
+              <a:ext uri="{FF2B5EF4-FFF2-40B4-BE49-F238E27FC236}">
+                <a16:creationId xmlns:a16="http://schemas.microsoft.com/office/drawing/2014/main" id="{DED6AF49-8900-1FC6-E1AE-C3BAEC916655}"/>
+              </a:ext>
+            </a:extLst>
+          </p:cNvPr>
+          <p:cNvCxnSpPr/>
+          <p:nvPr/>
+        </p:nvCxnSpPr>
+        <p:spPr>
+          <a:xfrm>
+            <a:off x="2476983" y="196770"/>
+            <a:ext cx="0" cy="6661230"/>
+          </a:xfrm>
+          <a:prstGeom prst="line">
+            <a:avLst/>
+          </a:prstGeom>
+          <a:ln w="19050">
+            <a:solidFill>
+              <a:srgbClr val="FF0000"/>
+            </a:solidFill>
+            <a:prstDash val="lgDash"/>
+          </a:ln>
+        </p:spPr>
+        <p:style>
+          <a:lnRef idx="1">
+            <a:schemeClr val="dk1"/>
+          </a:lnRef>
+          <a:fillRef idx="0">
+            <a:schemeClr val="dk1"/>
+          </a:fillRef>
+          <a:effectRef idx="0">
+            <a:schemeClr val="dk1"/>
+          </a:effectRef>
+          <a:fontRef idx="minor">
+            <a:schemeClr val="tx1"/>
+          </a:fontRef>
+        </p:style>
+      </p:cxnSp>
+      <p:sp>
+        <p:nvSpPr>
+          <p:cNvPr id="50" name="직사각형 49">
+            <a:extLst>
+              <a:ext uri="{FF2B5EF4-FFF2-40B4-BE49-F238E27FC236}">
+                <a16:creationId xmlns:a16="http://schemas.microsoft.com/office/drawing/2014/main" id="{2F6F67B9-F4E3-DC45-634C-5A1D8BBC2C26}"/>
+              </a:ext>
+            </a:extLst>
+          </p:cNvPr>
+          <p:cNvSpPr/>
+          <p:nvPr/>
+        </p:nvSpPr>
+        <p:spPr>
+          <a:xfrm>
+            <a:off x="124859" y="1930719"/>
+            <a:ext cx="937550" cy="769715"/>
+          </a:xfrm>
+          <a:prstGeom prst="rect">
+            <a:avLst/>
+          </a:prstGeom>
+        </p:spPr>
+        <p:style>
+          <a:lnRef idx="2">
+            <a:schemeClr val="accent1">
+              <a:shade val="15000"/>
+            </a:schemeClr>
+          </a:lnRef>
+          <a:fillRef idx="1">
+            <a:schemeClr val="accent1"/>
+          </a:fillRef>
+          <a:effectRef idx="0">
+            <a:schemeClr val="accent1"/>
+          </a:effectRef>
+          <a:fontRef idx="minor">
+            <a:schemeClr val="lt1"/>
+          </a:fontRef>
+        </p:style>
+        <p:txBody>
+          <a:bodyPr rtlCol="0" anchor="ctr"/>
+          <a:lstStyle/>
+          <a:p>
+            <a:pPr algn="ctr"/>
+            <a:r>
+              <a:rPr lang="en-US" altLang="ko-KR"/>
+              <a:t>Diode</a:t>
+            </a:r>
+            <a:endParaRPr lang="ko-KR" altLang="en-US"/>
+          </a:p>
+        </p:txBody>
+      </p:sp>
+      <p:sp>
+        <p:nvSpPr>
+          <p:cNvPr id="4" name="TextBox 3">
+            <a:extLst>
+              <a:ext uri="{FF2B5EF4-FFF2-40B4-BE49-F238E27FC236}">
+                <a16:creationId xmlns:a16="http://schemas.microsoft.com/office/drawing/2014/main" id="{51106236-ED71-D394-2569-7EA1FCA90113}"/>
+              </a:ext>
+            </a:extLst>
+          </p:cNvPr>
+          <p:cNvSpPr txBox="1"/>
+          <p:nvPr/>
+        </p:nvSpPr>
+        <p:spPr>
+          <a:xfrm>
+            <a:off x="3513942" y="2897218"/>
+            <a:ext cx="2078005" cy="646331"/>
+          </a:xfrm>
+          <a:prstGeom prst="rect">
+            <a:avLst/>
+          </a:prstGeom>
+          <a:noFill/>
+        </p:spPr>
+        <p:txBody>
+          <a:bodyPr wrap="none" rtlCol="0">
+            <a:spAutoFit/>
+          </a:bodyPr>
+          <a:lstStyle/>
+          <a:p>
+            <a:r>
+              <a:rPr lang="en-US" altLang="ko-KR"/>
+              <a:t>2.2+5.3+3.1+8.8</a:t>
+            </a:r>
+          </a:p>
+          <a:p>
+            <a:r>
+              <a:rPr lang="en-US" altLang="ko-KR"/>
+              <a:t>=19.4mA, 150mW</a:t>
+            </a:r>
+            <a:endParaRPr lang="ko-KR" altLang="en-US"/>
+          </a:p>
+        </p:txBody>
+      </p:sp>
+      <p:sp>
+        <p:nvSpPr>
+          <p:cNvPr id="21" name="TextBox 20">
+            <a:extLst>
+              <a:ext uri="{FF2B5EF4-FFF2-40B4-BE49-F238E27FC236}">
+                <a16:creationId xmlns:a16="http://schemas.microsoft.com/office/drawing/2014/main" id="{2E23F7EC-B0A5-D556-ADC8-F9DAB6BDA2B7}"/>
+              </a:ext>
+            </a:extLst>
+          </p:cNvPr>
+          <p:cNvSpPr txBox="1"/>
+          <p:nvPr/>
+        </p:nvSpPr>
+        <p:spPr>
+          <a:xfrm>
+            <a:off x="7302249" y="2897218"/>
+            <a:ext cx="1864806" cy="369332"/>
+          </a:xfrm>
+          <a:prstGeom prst="rect">
+            <a:avLst/>
+          </a:prstGeom>
+          <a:noFill/>
+        </p:spPr>
+        <p:txBody>
+          <a:bodyPr wrap="none" rtlCol="0">
+            <a:spAutoFit/>
+          </a:bodyPr>
+          <a:lstStyle/>
+          <a:p>
+            <a:r>
+              <a:rPr lang="en-US" altLang="ko-KR"/>
+              <a:t>100mA, 250mW</a:t>
+            </a:r>
+            <a:endParaRPr lang="ko-KR" altLang="en-US"/>
+          </a:p>
+        </p:txBody>
+      </p:sp>
+      <p:sp>
+        <p:nvSpPr>
+          <p:cNvPr id="10" name="직사각형 9">
+            <a:extLst>
+              <a:ext uri="{FF2B5EF4-FFF2-40B4-BE49-F238E27FC236}">
+                <a16:creationId xmlns:a16="http://schemas.microsoft.com/office/drawing/2014/main" id="{9C9F58A9-7071-6AEB-8A03-76955F79E2B6}"/>
+              </a:ext>
+            </a:extLst>
+          </p:cNvPr>
+          <p:cNvSpPr/>
+          <p:nvPr/>
+        </p:nvSpPr>
+        <p:spPr>
+          <a:xfrm>
+            <a:off x="1270000" y="1739900"/>
+            <a:ext cx="10797141" cy="5125992"/>
+          </a:xfrm>
+          <a:prstGeom prst="rect">
+            <a:avLst/>
+          </a:prstGeom>
+          <a:noFill/>
+          <a:ln w="38100">
+            <a:solidFill>
+              <a:schemeClr val="tx1"/>
+            </a:solidFill>
+            <a:prstDash val="lgDash"/>
+          </a:ln>
+        </p:spPr>
+        <p:style>
+          <a:lnRef idx="2">
+            <a:schemeClr val="accent1">
+              <a:shade val="15000"/>
+            </a:schemeClr>
+          </a:lnRef>
+          <a:fillRef idx="1">
+            <a:schemeClr val="accent1"/>
+          </a:fillRef>
+          <a:effectRef idx="0">
+            <a:schemeClr val="accent1"/>
+          </a:effectRef>
+          <a:fontRef idx="minor">
+            <a:schemeClr val="lt1"/>
+          </a:fontRef>
+        </p:style>
+        <p:txBody>
+          <a:bodyPr rtlCol="0" anchor="ctr"/>
+          <a:lstStyle/>
+          <a:p>
+            <a:pPr algn="ctr"/>
+            <a:endParaRPr lang="ko-KR" altLang="en-US"/>
+          </a:p>
+        </p:txBody>
+      </p:sp>
+      <p:sp>
+        <p:nvSpPr>
+          <p:cNvPr id="17" name="TextBox 16">
+            <a:extLst>
+              <a:ext uri="{FF2B5EF4-FFF2-40B4-BE49-F238E27FC236}">
+                <a16:creationId xmlns:a16="http://schemas.microsoft.com/office/drawing/2014/main" id="{F9F28159-6A97-D866-A6B5-24952333CC68}"/>
+              </a:ext>
+            </a:extLst>
+          </p:cNvPr>
+          <p:cNvSpPr txBox="1"/>
+          <p:nvPr/>
+        </p:nvSpPr>
+        <p:spPr>
+          <a:xfrm>
+            <a:off x="8718115" y="1163348"/>
+            <a:ext cx="450764" cy="369332"/>
+          </a:xfrm>
+          <a:prstGeom prst="rect">
+            <a:avLst/>
+          </a:prstGeom>
+          <a:noFill/>
+        </p:spPr>
+        <p:txBody>
+          <a:bodyPr wrap="none" rtlCol="0">
+            <a:spAutoFit/>
+          </a:bodyPr>
+          <a:lstStyle/>
+          <a:p>
+            <a:r>
+              <a:rPr lang="en-US" altLang="ko-KR"/>
+              <a:t>X2</a:t>
+            </a:r>
+            <a:endParaRPr lang="ko-KR" altLang="en-US"/>
+          </a:p>
+        </p:txBody>
+      </p:sp>
+    </p:spTree>
+    <p:extLst>
+      <p:ext uri="{BB962C8B-B14F-4D97-AF65-F5344CB8AC3E}">
+        <p14:creationId xmlns:p14="http://schemas.microsoft.com/office/powerpoint/2010/main" val="1392740087"/>
       </p:ext>
     </p:extLst>
   </p:cSld>
@@ -14098,6 +16106,14 @@
 <file path=ppt/slides/slide9.xml><?xml version="1.0" encoding="utf-8"?>
 <p:sld xmlns:a="http://schemas.openxmlformats.org/drawingml/2006/main" xmlns:r="http://schemas.openxmlformats.org/officeDocument/2006/relationships" xmlns:p="http://schemas.openxmlformats.org/presentationml/2006/main">
   <p:cSld>
+    <p:bg>
+      <p:bgPr>
+        <a:solidFill>
+          <a:schemeClr val="bg1"/>
+        </a:solidFill>
+        <a:effectLst/>
+      </p:bgPr>
+    </p:bg>
     <p:spTree>
       <p:nvGrpSpPr>
         <p:cNvPr id="1" name=""/>
@@ -14114,129 +16130,143 @@
       </p:grpSpPr>
       <p:sp>
         <p:nvSpPr>
-          <p:cNvPr id="2" name="제목 1">
+          <p:cNvPr id="10" name="Rectangle 9">
             <a:extLst>
               <a:ext uri="{FF2B5EF4-FFF2-40B4-BE49-F238E27FC236}">
-                <a16:creationId xmlns:a16="http://schemas.microsoft.com/office/drawing/2014/main" id="{33DC8AF4-47E2-493C-758A-280868EB3FEF}"/>
+                <a16:creationId xmlns:a16="http://schemas.microsoft.com/office/drawing/2014/main" id="{01D0AF59-99C3-4251-AB9A-C966C6AD4400}"/>
+              </a:ext>
+              <a:ext uri="{C183D7F6-B498-43B3-948B-1728B52AA6E4}">
+                <adec:decorative xmlns:adec="http://schemas.microsoft.com/office/drawing/2017/decorative" val="1"/>
               </a:ext>
             </a:extLst>
           </p:cNvPr>
           <p:cNvSpPr>
-            <a:spLocks noGrp="1"/>
+            <a:spLocks noGrp="1" noRot="1" noChangeAspect="1" noMove="1" noResize="1" noEditPoints="1" noAdjustHandles="1" noChangeArrowheads="1" noChangeShapeType="1" noTextEdit="1"/>
           </p:cNvSpPr>
           <p:nvPr>
-            <p:ph type="title"/>
+            <p:extLst>
+              <p:ext uri="{386F3935-93C4-4BCD-93E2-E3B085C9AB24}">
+                <p16:designElem xmlns:p16="http://schemas.microsoft.com/office/powerpoint/2015/main" val="1"/>
+              </p:ext>
+            </p:extLst>
           </p:nvPr>
         </p:nvSpPr>
-        <p:spPr/>
+        <p:spPr>
+          <a:xfrm>
+            <a:off x="0" y="0"/>
+            <a:ext cx="12192000" cy="6858000"/>
+          </a:xfrm>
+          <a:prstGeom prst="rect">
+            <a:avLst/>
+          </a:prstGeom>
+          <a:solidFill>
+            <a:schemeClr val="bg2"/>
+          </a:solidFill>
+          <a:ln>
+            <a:noFill/>
+          </a:ln>
+        </p:spPr>
+        <p:style>
+          <a:lnRef idx="2">
+            <a:schemeClr val="accent1">
+              <a:shade val="50000"/>
+            </a:schemeClr>
+          </a:lnRef>
+          <a:fillRef idx="1">
+            <a:schemeClr val="accent1"/>
+          </a:fillRef>
+          <a:effectRef idx="0">
+            <a:schemeClr val="accent1"/>
+          </a:effectRef>
+          <a:fontRef idx="minor">
+            <a:schemeClr val="lt1"/>
+          </a:fontRef>
+        </p:style>
         <p:txBody>
-          <a:bodyPr>
-            <a:normAutofit/>
-          </a:bodyPr>
+          <a:bodyPr rtlCol="0" anchor="ctr"/>
           <a:lstStyle/>
           <a:p>
-            <a:r>
-              <a:rPr lang="en-US" altLang="ko-KR" b="0" i="0" u="none" strike="noStrike" baseline="0">
-                <a:solidFill>
-                  <a:srgbClr val="000000"/>
-                </a:solidFill>
-                <a:latin typeface="HelveticaNeue-Medium"/>
-              </a:rPr>
-              <a:t> CONBNC001</a:t>
-            </a:r>
-            <a:endParaRPr lang="ko-KR" altLang="en-US" b="1"/>
+            <a:pPr algn="ctr"/>
+            <a:endParaRPr lang="en-US"/>
+          </a:p>
+        </p:txBody>
+      </p:sp>
+      <p:sp>
+        <p:nvSpPr>
+          <p:cNvPr id="12" name="Rectangle 11">
+            <a:extLst>
+              <a:ext uri="{FF2B5EF4-FFF2-40B4-BE49-F238E27FC236}">
+                <a16:creationId xmlns:a16="http://schemas.microsoft.com/office/drawing/2014/main" id="{1855405F-37A2-4869-9154-F8BE3BECE6C3}"/>
+              </a:ext>
+              <a:ext uri="{C183D7F6-B498-43B3-948B-1728B52AA6E4}">
+                <adec:decorative xmlns:adec="http://schemas.microsoft.com/office/drawing/2017/decorative" val="1"/>
+              </a:ext>
+            </a:extLst>
+          </p:cNvPr>
+          <p:cNvSpPr>
+            <a:spLocks noGrp="1" noRot="1" noChangeAspect="1" noMove="1" noResize="1" noEditPoints="1" noAdjustHandles="1" noChangeArrowheads="1" noChangeShapeType="1" noTextEdit="1"/>
+          </p:cNvSpPr>
+          <p:nvPr>
+            <p:extLst>
+              <p:ext uri="{386F3935-93C4-4BCD-93E2-E3B085C9AB24}">
+                <p16:designElem xmlns:p16="http://schemas.microsoft.com/office/powerpoint/2015/main" val="1"/>
+              </p:ext>
+            </p:extLst>
+          </p:nvPr>
+        </p:nvSpPr>
+        <p:spPr>
+          <a:xfrm>
+            <a:off x="477012" y="480060"/>
+            <a:ext cx="11237976" cy="5897880"/>
+          </a:xfrm>
+          <a:prstGeom prst="rect">
+            <a:avLst/>
+          </a:prstGeom>
+          <a:solidFill>
+            <a:srgbClr val="FFFFFF"/>
+          </a:solidFill>
+          <a:ln w="9525">
+            <a:noFill/>
+          </a:ln>
+          <a:effectLst>
+            <a:outerShdw blurRad="63500" dist="17780" dir="5400000" algn="t" rotWithShape="0">
+              <a:prstClr val="black">
+                <a:alpha val="43000"/>
+              </a:prstClr>
+            </a:outerShdw>
+          </a:effectLst>
+        </p:spPr>
+        <p:style>
+          <a:lnRef idx="2">
+            <a:schemeClr val="accent1">
+              <a:shade val="50000"/>
+            </a:schemeClr>
+          </a:lnRef>
+          <a:fillRef idx="1">
+            <a:schemeClr val="accent1"/>
+          </a:fillRef>
+          <a:effectRef idx="0">
+            <a:schemeClr val="accent1"/>
+          </a:effectRef>
+          <a:fontRef idx="minor">
+            <a:schemeClr val="lt1"/>
+          </a:fontRef>
+        </p:style>
+        <p:txBody>
+          <a:bodyPr rtlCol="0" anchor="ctr"/>
+          <a:lstStyle/>
+          <a:p>
+            <a:pPr algn="ctr"/>
+            <a:endParaRPr lang="en-US"/>
           </a:p>
         </p:txBody>
       </p:sp>
       <p:pic>
         <p:nvPicPr>
-          <p:cNvPr id="3074" name="Picture 2" descr="Linx Technologies CONBNC001 확대된 이미지">
+          <p:cNvPr id="5" name="그림 4" descr="텍스트, 스크린샷, 폰트, 번호이(가) 표시된 사진&#10;&#10;자동 생성된 설명">
             <a:extLst>
               <a:ext uri="{FF2B5EF4-FFF2-40B4-BE49-F238E27FC236}">
-                <a16:creationId xmlns:a16="http://schemas.microsoft.com/office/drawing/2014/main" id="{9681D068-8DB2-78A4-661F-C9162AADD53C}"/>
-              </a:ext>
-            </a:extLst>
-          </p:cNvPr>
-          <p:cNvPicPr>
-            <a:picLocks noChangeAspect="1" noChangeArrowheads="1"/>
-          </p:cNvPicPr>
-          <p:nvPr/>
-        </p:nvPicPr>
-        <p:blipFill>
-          <a:blip r:embed="rId2">
-            <a:extLst>
-              <a:ext uri="{28A0092B-C50C-407E-A947-70E740481C1C}">
-                <a14:useLocalDpi xmlns:a14="http://schemas.microsoft.com/office/drawing/2010/main" val="0"/>
-              </a:ext>
-            </a:extLst>
-          </a:blip>
-          <a:srcRect/>
-          <a:stretch>
-            <a:fillRect/>
-          </a:stretch>
-        </p:blipFill>
-        <p:spPr bwMode="auto">
-          <a:xfrm>
-            <a:off x="5381625" y="2178868"/>
-            <a:ext cx="1428750" cy="1133475"/>
-          </a:xfrm>
-          <a:prstGeom prst="rect">
-            <a:avLst/>
-          </a:prstGeom>
-          <a:noFill/>
-          <a:extLst>
-            <a:ext uri="{909E8E84-426E-40DD-AFC4-6F175D3DCCD1}">
-              <a14:hiddenFill xmlns:a14="http://schemas.microsoft.com/office/drawing/2010/main">
-                <a:solidFill>
-                  <a:srgbClr val="FFFFFF"/>
-                </a:solidFill>
-              </a14:hiddenFill>
-            </a:ext>
-          </a:extLst>
-        </p:spPr>
-      </p:pic>
-      <p:sp>
-        <p:nvSpPr>
-          <p:cNvPr id="4" name="TextBox 3">
-            <a:extLst>
-              <a:ext uri="{FF2B5EF4-FFF2-40B4-BE49-F238E27FC236}">
-                <a16:creationId xmlns:a16="http://schemas.microsoft.com/office/drawing/2014/main" id="{2D96A33E-F4DB-5AF2-B5AC-50092D166CA0}"/>
-              </a:ext>
-            </a:extLst>
-          </p:cNvPr>
-          <p:cNvSpPr txBox="1"/>
-          <p:nvPr/>
-        </p:nvSpPr>
-        <p:spPr>
-          <a:xfrm>
-            <a:off x="3048965" y="3414841"/>
-            <a:ext cx="6094070" cy="923330"/>
-          </a:xfrm>
-          <a:prstGeom prst="rect">
-            <a:avLst/>
-          </a:prstGeom>
-          <a:noFill/>
-        </p:spPr>
-        <p:txBody>
-          <a:bodyPr wrap="square">
-            <a:spAutoFit/>
-          </a:bodyPr>
-          <a:lstStyle/>
-          <a:p>
-            <a:r>
-              <a:rPr lang="en-US" altLang="ko-KR"/>
-              <a:t>https://www.mouser.kr/ProductDetail/Linx-Technologies/CONBNC001?qs=doiCPypUmgHczHAGaJs8Lg%3D%3D</a:t>
-            </a:r>
-            <a:endParaRPr lang="ko-KR" altLang="en-US"/>
-          </a:p>
-        </p:txBody>
-      </p:sp>
-      <p:pic>
-        <p:nvPicPr>
-          <p:cNvPr id="6" name="그림 5" descr="텍스트, 스크린샷, 번호, 폰트이(가) 표시된 사진&#10;&#10;자동 생성된 설명">
-            <a:extLst>
-              <a:ext uri="{FF2B5EF4-FFF2-40B4-BE49-F238E27FC236}">
-                <a16:creationId xmlns:a16="http://schemas.microsoft.com/office/drawing/2014/main" id="{D2838084-FA53-FDC1-7C44-7B1731D29815}"/>
+                <a16:creationId xmlns:a16="http://schemas.microsoft.com/office/drawing/2014/main" id="{6FD95776-D7D3-8459-59C9-02196FA0E1B2}"/>
               </a:ext>
             </a:extLst>
           </p:cNvPr>
@@ -14246,7 +16276,7 @@
           <p:nvPr/>
         </p:nvPicPr>
         <p:blipFill>
-          <a:blip r:embed="rId3">
+          <a:blip r:embed="rId2">
             <a:extLst>
               <a:ext uri="{28A0092B-C50C-407E-A947-70E740481C1C}">
                 <a14:useLocalDpi xmlns:a14="http://schemas.microsoft.com/office/drawing/2010/main" val="0"/>
@@ -14259,8 +16289,8 @@
         </p:blipFill>
         <p:spPr>
           <a:xfrm>
-            <a:off x="2457263" y="4338171"/>
-            <a:ext cx="7277474" cy="2317869"/>
+            <a:off x="643467" y="1506982"/>
+            <a:ext cx="10905066" cy="3844035"/>
           </a:xfrm>
           <a:prstGeom prst="rect">
             <a:avLst/>
@@ -14270,7 +16300,7 @@
     </p:spTree>
     <p:extLst>
       <p:ext uri="{BB962C8B-B14F-4D97-AF65-F5344CB8AC3E}">
-        <p14:creationId xmlns:p14="http://schemas.microsoft.com/office/powerpoint/2010/main" val="2537934965"/>
+        <p14:creationId xmlns:p14="http://schemas.microsoft.com/office/powerpoint/2010/main" val="1566511033"/>
       </p:ext>
     </p:extLst>
   </p:cSld>

</xml_diff>

<commit_message>
LED and new PIN added
</commit_message>
<xml_diff>
--- a/Meeting/PMOD2BNC.pptx
+++ b/Meeting/PMOD2BNC.pptx
@@ -9,15 +9,16 @@
     <p:sldId id="258" r:id="rId3"/>
     <p:sldId id="259" r:id="rId4"/>
     <p:sldId id="257" r:id="rId5"/>
-    <p:sldId id="260" r:id="rId6"/>
-    <p:sldId id="261" r:id="rId7"/>
-    <p:sldId id="262" r:id="rId8"/>
-    <p:sldId id="263" r:id="rId9"/>
-    <p:sldId id="267" r:id="rId10"/>
-    <p:sldId id="269" r:id="rId11"/>
-    <p:sldId id="268" r:id="rId12"/>
-    <p:sldId id="265" r:id="rId13"/>
-    <p:sldId id="266" r:id="rId14"/>
+    <p:sldId id="270" r:id="rId6"/>
+    <p:sldId id="260" r:id="rId7"/>
+    <p:sldId id="261" r:id="rId8"/>
+    <p:sldId id="262" r:id="rId9"/>
+    <p:sldId id="263" r:id="rId10"/>
+    <p:sldId id="267" r:id="rId11"/>
+    <p:sldId id="269" r:id="rId12"/>
+    <p:sldId id="268" r:id="rId13"/>
+    <p:sldId id="265" r:id="rId14"/>
+    <p:sldId id="266" r:id="rId15"/>
   </p:sldIdLst>
   <p:sldSz cx="12192000" cy="6858000"/>
   <p:notesSz cx="6858000" cy="9144000"/>
@@ -3383,6 +3384,213 @@
 <file path=ppt/slides/slide10.xml><?xml version="1.0" encoding="utf-8"?>
 <p:sld xmlns:a="http://schemas.openxmlformats.org/drawingml/2006/main" xmlns:r="http://schemas.openxmlformats.org/officeDocument/2006/relationships" xmlns:p="http://schemas.openxmlformats.org/presentationml/2006/main">
   <p:cSld>
+    <p:bg>
+      <p:bgPr>
+        <a:solidFill>
+          <a:schemeClr val="bg1"/>
+        </a:solidFill>
+        <a:effectLst/>
+      </p:bgPr>
+    </p:bg>
+    <p:spTree>
+      <p:nvGrpSpPr>
+        <p:cNvPr id="1" name=""/>
+        <p:cNvGrpSpPr/>
+        <p:nvPr/>
+      </p:nvGrpSpPr>
+      <p:grpSpPr>
+        <a:xfrm>
+          <a:off x="0" y="0"/>
+          <a:ext cx="0" cy="0"/>
+          <a:chOff x="0" y="0"/>
+          <a:chExt cx="0" cy="0"/>
+        </a:xfrm>
+      </p:grpSpPr>
+      <p:sp>
+        <p:nvSpPr>
+          <p:cNvPr id="10" name="Rectangle 9">
+            <a:extLst>
+              <a:ext uri="{FF2B5EF4-FFF2-40B4-BE49-F238E27FC236}">
+                <a16:creationId xmlns:a16="http://schemas.microsoft.com/office/drawing/2014/main" id="{01D0AF59-99C3-4251-AB9A-C966C6AD4400}"/>
+              </a:ext>
+              <a:ext uri="{C183D7F6-B498-43B3-948B-1728B52AA6E4}">
+                <adec:decorative xmlns:adec="http://schemas.microsoft.com/office/drawing/2017/decorative" val="1"/>
+              </a:ext>
+            </a:extLst>
+          </p:cNvPr>
+          <p:cNvSpPr>
+            <a:spLocks noGrp="1" noRot="1" noChangeAspect="1" noMove="1" noResize="1" noEditPoints="1" noAdjustHandles="1" noChangeArrowheads="1" noChangeShapeType="1" noTextEdit="1"/>
+          </p:cNvSpPr>
+          <p:nvPr>
+            <p:extLst>
+              <p:ext uri="{386F3935-93C4-4BCD-93E2-E3B085C9AB24}">
+                <p16:designElem xmlns:p16="http://schemas.microsoft.com/office/powerpoint/2015/main" val="1"/>
+              </p:ext>
+            </p:extLst>
+          </p:nvPr>
+        </p:nvSpPr>
+        <p:spPr>
+          <a:xfrm>
+            <a:off x="0" y="0"/>
+            <a:ext cx="12192000" cy="6858000"/>
+          </a:xfrm>
+          <a:prstGeom prst="rect">
+            <a:avLst/>
+          </a:prstGeom>
+          <a:solidFill>
+            <a:schemeClr val="bg2"/>
+          </a:solidFill>
+          <a:ln>
+            <a:noFill/>
+          </a:ln>
+        </p:spPr>
+        <p:style>
+          <a:lnRef idx="2">
+            <a:schemeClr val="accent1">
+              <a:shade val="50000"/>
+            </a:schemeClr>
+          </a:lnRef>
+          <a:fillRef idx="1">
+            <a:schemeClr val="accent1"/>
+          </a:fillRef>
+          <a:effectRef idx="0">
+            <a:schemeClr val="accent1"/>
+          </a:effectRef>
+          <a:fontRef idx="minor">
+            <a:schemeClr val="lt1"/>
+          </a:fontRef>
+        </p:style>
+        <p:txBody>
+          <a:bodyPr rtlCol="0" anchor="ctr"/>
+          <a:lstStyle/>
+          <a:p>
+            <a:pPr algn="ctr"/>
+            <a:endParaRPr lang="en-US"/>
+          </a:p>
+        </p:txBody>
+      </p:sp>
+      <p:sp>
+        <p:nvSpPr>
+          <p:cNvPr id="12" name="Rectangle 11">
+            <a:extLst>
+              <a:ext uri="{FF2B5EF4-FFF2-40B4-BE49-F238E27FC236}">
+                <a16:creationId xmlns:a16="http://schemas.microsoft.com/office/drawing/2014/main" id="{1855405F-37A2-4869-9154-F8BE3BECE6C3}"/>
+              </a:ext>
+              <a:ext uri="{C183D7F6-B498-43B3-948B-1728B52AA6E4}">
+                <adec:decorative xmlns:adec="http://schemas.microsoft.com/office/drawing/2017/decorative" val="1"/>
+              </a:ext>
+            </a:extLst>
+          </p:cNvPr>
+          <p:cNvSpPr>
+            <a:spLocks noGrp="1" noRot="1" noChangeAspect="1" noMove="1" noResize="1" noEditPoints="1" noAdjustHandles="1" noChangeArrowheads="1" noChangeShapeType="1" noTextEdit="1"/>
+          </p:cNvSpPr>
+          <p:nvPr>
+            <p:extLst>
+              <p:ext uri="{386F3935-93C4-4BCD-93E2-E3B085C9AB24}">
+                <p16:designElem xmlns:p16="http://schemas.microsoft.com/office/powerpoint/2015/main" val="1"/>
+              </p:ext>
+            </p:extLst>
+          </p:nvPr>
+        </p:nvSpPr>
+        <p:spPr>
+          <a:xfrm>
+            <a:off x="477012" y="480060"/>
+            <a:ext cx="11237976" cy="5897880"/>
+          </a:xfrm>
+          <a:prstGeom prst="rect">
+            <a:avLst/>
+          </a:prstGeom>
+          <a:solidFill>
+            <a:srgbClr val="FFFFFF"/>
+          </a:solidFill>
+          <a:ln w="9525">
+            <a:noFill/>
+          </a:ln>
+          <a:effectLst>
+            <a:outerShdw blurRad="63500" dist="17780" dir="5400000" algn="t" rotWithShape="0">
+              <a:prstClr val="black">
+                <a:alpha val="43000"/>
+              </a:prstClr>
+            </a:outerShdw>
+          </a:effectLst>
+        </p:spPr>
+        <p:style>
+          <a:lnRef idx="2">
+            <a:schemeClr val="accent1">
+              <a:shade val="50000"/>
+            </a:schemeClr>
+          </a:lnRef>
+          <a:fillRef idx="1">
+            <a:schemeClr val="accent1"/>
+          </a:fillRef>
+          <a:effectRef idx="0">
+            <a:schemeClr val="accent1"/>
+          </a:effectRef>
+          <a:fontRef idx="minor">
+            <a:schemeClr val="lt1"/>
+          </a:fontRef>
+        </p:style>
+        <p:txBody>
+          <a:bodyPr rtlCol="0" anchor="ctr"/>
+          <a:lstStyle/>
+          <a:p>
+            <a:pPr algn="ctr"/>
+            <a:endParaRPr lang="en-US"/>
+          </a:p>
+        </p:txBody>
+      </p:sp>
+      <p:pic>
+        <p:nvPicPr>
+          <p:cNvPr id="5" name="그림 4" descr="텍스트, 스크린샷, 폰트, 번호이(가) 표시된 사진&#10;&#10;자동 생성된 설명">
+            <a:extLst>
+              <a:ext uri="{FF2B5EF4-FFF2-40B4-BE49-F238E27FC236}">
+                <a16:creationId xmlns:a16="http://schemas.microsoft.com/office/drawing/2014/main" id="{6FD95776-D7D3-8459-59C9-02196FA0E1B2}"/>
+              </a:ext>
+            </a:extLst>
+          </p:cNvPr>
+          <p:cNvPicPr>
+            <a:picLocks noChangeAspect="1"/>
+          </p:cNvPicPr>
+          <p:nvPr/>
+        </p:nvPicPr>
+        <p:blipFill>
+          <a:blip r:embed="rId2">
+            <a:extLst>
+              <a:ext uri="{28A0092B-C50C-407E-A947-70E740481C1C}">
+                <a14:useLocalDpi xmlns:a14="http://schemas.microsoft.com/office/drawing/2010/main" val="0"/>
+              </a:ext>
+            </a:extLst>
+          </a:blip>
+          <a:stretch>
+            <a:fillRect/>
+          </a:stretch>
+        </p:blipFill>
+        <p:spPr>
+          <a:xfrm>
+            <a:off x="643467" y="1506982"/>
+            <a:ext cx="10905066" cy="3844035"/>
+          </a:xfrm>
+          <a:prstGeom prst="rect">
+            <a:avLst/>
+          </a:prstGeom>
+        </p:spPr>
+      </p:pic>
+    </p:spTree>
+    <p:extLst>
+      <p:ext uri="{BB962C8B-B14F-4D97-AF65-F5344CB8AC3E}">
+        <p14:creationId xmlns:p14="http://schemas.microsoft.com/office/powerpoint/2010/main" val="1566511033"/>
+      </p:ext>
+    </p:extLst>
+  </p:cSld>
+  <p:clrMapOvr>
+    <a:masterClrMapping/>
+  </p:clrMapOvr>
+</p:sld>
+</file>
+
+<file path=ppt/slides/slide11.xml><?xml version="1.0" encoding="utf-8"?>
+<p:sld xmlns:a="http://schemas.openxmlformats.org/drawingml/2006/main" xmlns:r="http://schemas.openxmlformats.org/officeDocument/2006/relationships" xmlns:p="http://schemas.openxmlformats.org/presentationml/2006/main">
+  <p:cSld>
     <p:spTree>
       <p:nvGrpSpPr>
         <p:cNvPr id="1" name=""/>
@@ -3446,7 +3654,7 @@
 </p:sld>
 </file>
 
-<file path=ppt/slides/slide11.xml><?xml version="1.0" encoding="utf-8"?>
+<file path=ppt/slides/slide12.xml><?xml version="1.0" encoding="utf-8"?>
 <p:sld xmlns:a="http://schemas.openxmlformats.org/drawingml/2006/main" xmlns:r="http://schemas.openxmlformats.org/officeDocument/2006/relationships" xmlns:p="http://schemas.openxmlformats.org/presentationml/2006/main">
   <p:cSld>
     <p:spTree>
@@ -3512,7 +3720,7 @@
 </p:sld>
 </file>
 
-<file path=ppt/slides/slide12.xml><?xml version="1.0" encoding="utf-8"?>
+<file path=ppt/slides/slide13.xml><?xml version="1.0" encoding="utf-8"?>
 <p:sld xmlns:a="http://schemas.openxmlformats.org/drawingml/2006/main" xmlns:r="http://schemas.openxmlformats.org/officeDocument/2006/relationships" xmlns:p="http://schemas.openxmlformats.org/presentationml/2006/main">
   <p:cSld>
     <p:spTree>
@@ -5261,7 +5469,7 @@
 </p:sld>
 </file>
 
-<file path=ppt/slides/slide13.xml><?xml version="1.0" encoding="utf-8"?>
+<file path=ppt/slides/slide14.xml><?xml version="1.0" encoding="utf-8"?>
 <p:sld xmlns:a="http://schemas.openxmlformats.org/drawingml/2006/main" xmlns:r="http://schemas.openxmlformats.org/officeDocument/2006/relationships" xmlns:p="http://schemas.openxmlformats.org/presentationml/2006/main">
   <p:cSld>
     <p:spTree>
@@ -5356,8 +5564,8 @@
         </p:nvSpPr>
         <p:spPr>
           <a:xfrm>
-            <a:off x="3727040" y="862315"/>
-            <a:ext cx="1713055" cy="769715"/>
+            <a:off x="2687595" y="862315"/>
+            <a:ext cx="2766335" cy="769715"/>
           </a:xfrm>
           <a:prstGeom prst="rect">
             <a:avLst/>
@@ -5386,7 +5594,14 @@
             <a:pPr algn="ctr"/>
             <a:r>
               <a:rPr lang="en-US" altLang="ko-KR"/>
-              <a:t>Regulator</a:t>
+              <a:t>Regulator 12V0 TO 3V3</a:t>
+            </a:r>
+          </a:p>
+          <a:p>
+            <a:pPr algn="ctr"/>
+            <a:r>
+              <a:rPr lang="en-US" altLang="ko-KR"/>
+              <a:t>(LD29150DT33R)</a:t>
             </a:r>
             <a:endParaRPr lang="ko-KR" altLang="en-US"/>
           </a:p>
@@ -5584,7 +5799,7 @@
         </p:nvSpPr>
         <p:spPr>
           <a:xfrm>
-            <a:off x="2569575" y="2019783"/>
+            <a:off x="8554995" y="431841"/>
             <a:ext cx="1713055" cy="769715"/>
           </a:xfrm>
           <a:prstGeom prst="rect">
@@ -5898,11 +6113,13 @@
         </p:nvCxnSpPr>
         <p:spPr>
           <a:xfrm rot="5400000" flipH="1" flipV="1">
-            <a:off x="2824219" y="2436475"/>
-            <a:ext cx="248860" cy="954907"/>
+            <a:off x="5022958" y="-1350206"/>
+            <a:ext cx="1836802" cy="6940327"/>
           </a:xfrm>
           <a:prstGeom prst="bentConnector3">
-            <a:avLst/>
+            <a:avLst>
+              <a:gd name="adj1" fmla="val 50000"/>
+            </a:avLst>
           </a:prstGeom>
         </p:spPr>
         <p:style>
@@ -6140,7 +6357,7 @@
             <a:pPr algn="ctr"/>
             <a:r>
               <a:rPr lang="en-US" altLang="ko-KR"/>
-              <a:t>(87911-1207)</a:t>
+              <a:t>(71764-0112)</a:t>
             </a:r>
             <a:endParaRPr lang="ko-KR" altLang="en-US"/>
           </a:p>
@@ -6912,6 +7129,179 @@
           </a:p>
         </p:txBody>
       </p:sp>
+      <p:sp>
+        <p:nvSpPr>
+          <p:cNvPr id="22" name="직사각형 21">
+            <a:extLst>
+              <a:ext uri="{FF2B5EF4-FFF2-40B4-BE49-F238E27FC236}">
+                <a16:creationId xmlns:a16="http://schemas.microsoft.com/office/drawing/2014/main" id="{5DD3BBA9-F9B3-37AA-36C0-B73637D55E09}"/>
+              </a:ext>
+            </a:extLst>
+          </p:cNvPr>
+          <p:cNvSpPr/>
+          <p:nvPr/>
+        </p:nvSpPr>
+        <p:spPr>
+          <a:xfrm>
+            <a:off x="6680487" y="862314"/>
+            <a:ext cx="1713055" cy="769715"/>
+          </a:xfrm>
+          <a:prstGeom prst="rect">
+            <a:avLst/>
+          </a:prstGeom>
+        </p:spPr>
+        <p:style>
+          <a:lnRef idx="2">
+            <a:schemeClr val="accent1">
+              <a:shade val="15000"/>
+            </a:schemeClr>
+          </a:lnRef>
+          <a:fillRef idx="1">
+            <a:schemeClr val="accent1"/>
+          </a:fillRef>
+          <a:effectRef idx="0">
+            <a:schemeClr val="accent1"/>
+          </a:effectRef>
+          <a:fontRef idx="minor">
+            <a:schemeClr val="lt1"/>
+          </a:fontRef>
+        </p:style>
+        <p:txBody>
+          <a:bodyPr rtlCol="0" anchor="ctr"/>
+          <a:lstStyle/>
+          <a:p>
+            <a:pPr algn="ctr"/>
+            <a:r>
+              <a:rPr lang="en-US" altLang="ko-KR"/>
+              <a:t>LED</a:t>
+            </a:r>
+            <a:r>
+              <a:rPr lang="ko-KR" altLang="en-US"/>
+              <a:t> </a:t>
+            </a:r>
+            <a:r>
+              <a:rPr lang="en-US" altLang="ko-KR"/>
+              <a:t>Diode</a:t>
+            </a:r>
+            <a:endParaRPr lang="ko-KR" altLang="en-US"/>
+          </a:p>
+        </p:txBody>
+      </p:sp>
+      <p:sp>
+        <p:nvSpPr>
+          <p:cNvPr id="23" name="직사각형 22">
+            <a:extLst>
+              <a:ext uri="{FF2B5EF4-FFF2-40B4-BE49-F238E27FC236}">
+                <a16:creationId xmlns:a16="http://schemas.microsoft.com/office/drawing/2014/main" id="{3B49D2FD-9876-605C-9C81-20787340A785}"/>
+              </a:ext>
+            </a:extLst>
+          </p:cNvPr>
+          <p:cNvSpPr/>
+          <p:nvPr/>
+        </p:nvSpPr>
+        <p:spPr>
+          <a:xfrm>
+            <a:off x="2687595" y="46985"/>
+            <a:ext cx="2766335" cy="769715"/>
+          </a:xfrm>
+          <a:prstGeom prst="rect">
+            <a:avLst/>
+          </a:prstGeom>
+        </p:spPr>
+        <p:style>
+          <a:lnRef idx="2">
+            <a:schemeClr val="accent1">
+              <a:shade val="15000"/>
+            </a:schemeClr>
+          </a:lnRef>
+          <a:fillRef idx="1">
+            <a:schemeClr val="accent1"/>
+          </a:fillRef>
+          <a:effectRef idx="0">
+            <a:schemeClr val="accent1"/>
+          </a:effectRef>
+          <a:fontRef idx="minor">
+            <a:schemeClr val="lt1"/>
+          </a:fontRef>
+        </p:style>
+        <p:txBody>
+          <a:bodyPr rtlCol="0" anchor="ctr"/>
+          <a:lstStyle/>
+          <a:p>
+            <a:pPr algn="ctr"/>
+            <a:r>
+              <a:rPr lang="en-US" altLang="ko-KR"/>
+              <a:t>Regulator 12V0 TO 5V0</a:t>
+            </a:r>
+          </a:p>
+          <a:p>
+            <a:pPr algn="ctr"/>
+            <a:r>
+              <a:rPr lang="en-US" altLang="ko-KR"/>
+              <a:t>(LD29150DT50R)</a:t>
+            </a:r>
+            <a:endParaRPr lang="ko-KR" altLang="en-US"/>
+          </a:p>
+        </p:txBody>
+      </p:sp>
+      <p:sp>
+        <p:nvSpPr>
+          <p:cNvPr id="25" name="직사각형 24">
+            <a:extLst>
+              <a:ext uri="{FF2B5EF4-FFF2-40B4-BE49-F238E27FC236}">
+                <a16:creationId xmlns:a16="http://schemas.microsoft.com/office/drawing/2014/main" id="{605086B0-8B1E-7D29-1564-A66B317AABC3}"/>
+              </a:ext>
+            </a:extLst>
+          </p:cNvPr>
+          <p:cNvSpPr/>
+          <p:nvPr/>
+        </p:nvSpPr>
+        <p:spPr>
+          <a:xfrm>
+            <a:off x="6680487" y="46984"/>
+            <a:ext cx="1713055" cy="769715"/>
+          </a:xfrm>
+          <a:prstGeom prst="rect">
+            <a:avLst/>
+          </a:prstGeom>
+        </p:spPr>
+        <p:style>
+          <a:lnRef idx="2">
+            <a:schemeClr val="accent1">
+              <a:shade val="15000"/>
+            </a:schemeClr>
+          </a:lnRef>
+          <a:fillRef idx="1">
+            <a:schemeClr val="accent1"/>
+          </a:fillRef>
+          <a:effectRef idx="0">
+            <a:schemeClr val="accent1"/>
+          </a:effectRef>
+          <a:fontRef idx="minor">
+            <a:schemeClr val="lt1"/>
+          </a:fontRef>
+        </p:style>
+        <p:txBody>
+          <a:bodyPr rtlCol="0" anchor="ctr"/>
+          <a:lstStyle/>
+          <a:p>
+            <a:pPr algn="ctr"/>
+            <a:r>
+              <a:rPr lang="en-US" altLang="ko-KR"/>
+              <a:t>LED</a:t>
+            </a:r>
+            <a:r>
+              <a:rPr lang="ko-KR" altLang="en-US"/>
+              <a:t> </a:t>
+            </a:r>
+            <a:r>
+              <a:rPr lang="en-US" altLang="ko-KR"/>
+              <a:t>Diode</a:t>
+            </a:r>
+            <a:endParaRPr lang="ko-KR" altLang="en-US"/>
+          </a:p>
+        </p:txBody>
+      </p:sp>
     </p:spTree>
     <p:extLst>
       <p:ext uri="{BB962C8B-B14F-4D97-AF65-F5344CB8AC3E}">
@@ -7107,7 +7497,7 @@
         </p:nvSpPr>
         <p:spPr>
           <a:xfrm>
-            <a:off x="226870" y="321276"/>
+            <a:off x="112570" y="366359"/>
             <a:ext cx="1556952" cy="5277696"/>
           </a:xfrm>
           <a:prstGeom prst="rect">
@@ -7168,7 +7558,7 @@
         </p:nvSpPr>
         <p:spPr>
           <a:xfrm>
-            <a:off x="1283372" y="981262"/>
+            <a:off x="1169072" y="1026345"/>
             <a:ext cx="500450" cy="389238"/>
           </a:xfrm>
           <a:prstGeom prst="rect">
@@ -7221,7 +7611,7 @@
         </p:nvSpPr>
         <p:spPr>
           <a:xfrm>
-            <a:off x="1283372" y="3732622"/>
+            <a:off x="1169072" y="3777705"/>
             <a:ext cx="500450" cy="389238"/>
           </a:xfrm>
           <a:prstGeom prst="rect">
@@ -7274,7 +7664,7 @@
         </p:nvSpPr>
         <p:spPr>
           <a:xfrm>
-            <a:off x="1283372" y="2356942"/>
+            <a:off x="1169072" y="2402025"/>
             <a:ext cx="500450" cy="389238"/>
           </a:xfrm>
           <a:prstGeom prst="rect">
@@ -7327,7 +7717,7 @@
         </p:nvSpPr>
         <p:spPr>
           <a:xfrm>
-            <a:off x="1283372" y="5108302"/>
+            <a:off x="1169072" y="5153385"/>
             <a:ext cx="500450" cy="389238"/>
           </a:xfrm>
           <a:prstGeom prst="rect">
@@ -7380,7 +7770,7 @@
         </p:nvGrpSpPr>
         <p:grpSpPr>
           <a:xfrm>
-            <a:off x="1801701" y="-45083"/>
+            <a:off x="1687401" y="0"/>
             <a:ext cx="6275429" cy="1881593"/>
             <a:chOff x="1801701" y="-45083"/>
             <a:chExt cx="6275429" cy="1881593"/>
@@ -9432,7 +9822,7 @@
         </p:nvGrpSpPr>
         <p:grpSpPr>
           <a:xfrm>
-            <a:off x="1801701" y="1340628"/>
+            <a:off x="1687401" y="1385711"/>
             <a:ext cx="6275429" cy="1881593"/>
             <a:chOff x="1801701" y="-45083"/>
             <a:chExt cx="6275429" cy="1881593"/>
@@ -11484,7 +11874,7 @@
         </p:nvGrpSpPr>
         <p:grpSpPr>
           <a:xfrm>
-            <a:off x="1801701" y="2713368"/>
+            <a:off x="1687401" y="2758451"/>
             <a:ext cx="6275429" cy="1881593"/>
             <a:chOff x="1801701" y="-45083"/>
             <a:chExt cx="6275429" cy="1881593"/>
@@ -13536,7 +13926,7 @@
         </p:nvGrpSpPr>
         <p:grpSpPr>
           <a:xfrm>
-            <a:off x="1801701" y="4062600"/>
+            <a:off x="1687401" y="4107683"/>
             <a:ext cx="6275429" cy="1881593"/>
             <a:chOff x="1801701" y="-45083"/>
             <a:chExt cx="6275429" cy="1881593"/>
@@ -15606,6 +15996,496 @@
       </p:grpSpPr>
       <p:sp>
         <p:nvSpPr>
+          <p:cNvPr id="4" name="직사각형 3">
+            <a:extLst>
+              <a:ext uri="{FF2B5EF4-FFF2-40B4-BE49-F238E27FC236}">
+                <a16:creationId xmlns:a16="http://schemas.microsoft.com/office/drawing/2014/main" id="{9114A63D-CCEC-DB21-91C9-E8187027C8B2}"/>
+              </a:ext>
+            </a:extLst>
+          </p:cNvPr>
+          <p:cNvSpPr/>
+          <p:nvPr/>
+        </p:nvSpPr>
+        <p:spPr>
+          <a:xfrm>
+            <a:off x="88900" y="3810000"/>
+            <a:ext cx="2209800" cy="114300"/>
+          </a:xfrm>
+          <a:prstGeom prst="rect">
+            <a:avLst/>
+          </a:prstGeom>
+          <a:solidFill>
+            <a:srgbClr val="00B050"/>
+          </a:solidFill>
+        </p:spPr>
+        <p:style>
+          <a:lnRef idx="2">
+            <a:schemeClr val="accent1">
+              <a:shade val="15000"/>
+            </a:schemeClr>
+          </a:lnRef>
+          <a:fillRef idx="1">
+            <a:schemeClr val="accent1"/>
+          </a:fillRef>
+          <a:effectRef idx="0">
+            <a:schemeClr val="accent1"/>
+          </a:effectRef>
+          <a:fontRef idx="minor">
+            <a:schemeClr val="lt1"/>
+          </a:fontRef>
+        </p:style>
+        <p:txBody>
+          <a:bodyPr rtlCol="0" anchor="ctr"/>
+          <a:lstStyle/>
+          <a:p>
+            <a:pPr algn="ctr"/>
+            <a:endParaRPr lang="ko-KR" altLang="en-US"/>
+          </a:p>
+        </p:txBody>
+      </p:sp>
+      <p:sp>
+        <p:nvSpPr>
+          <p:cNvPr id="5" name="직사각형 4">
+            <a:extLst>
+              <a:ext uri="{FF2B5EF4-FFF2-40B4-BE49-F238E27FC236}">
+                <a16:creationId xmlns:a16="http://schemas.microsoft.com/office/drawing/2014/main" id="{809F2556-66F5-DEB6-8501-7699DA0284CD}"/>
+              </a:ext>
+            </a:extLst>
+          </p:cNvPr>
+          <p:cNvSpPr/>
+          <p:nvPr/>
+        </p:nvSpPr>
+        <p:spPr>
+          <a:xfrm>
+            <a:off x="2425699" y="3810000"/>
+            <a:ext cx="4552951" cy="114300"/>
+          </a:xfrm>
+          <a:prstGeom prst="rect">
+            <a:avLst/>
+          </a:prstGeom>
+          <a:solidFill>
+            <a:srgbClr val="00B050"/>
+          </a:solidFill>
+        </p:spPr>
+        <p:style>
+          <a:lnRef idx="2">
+            <a:schemeClr val="accent1">
+              <a:shade val="15000"/>
+            </a:schemeClr>
+          </a:lnRef>
+          <a:fillRef idx="1">
+            <a:schemeClr val="accent1"/>
+          </a:fillRef>
+          <a:effectRef idx="0">
+            <a:schemeClr val="accent1"/>
+          </a:effectRef>
+          <a:fontRef idx="minor">
+            <a:schemeClr val="lt1"/>
+          </a:fontRef>
+        </p:style>
+        <p:txBody>
+          <a:bodyPr rtlCol="0" anchor="ctr"/>
+          <a:lstStyle/>
+          <a:p>
+            <a:pPr algn="ctr"/>
+            <a:endParaRPr lang="ko-KR" altLang="en-US"/>
+          </a:p>
+        </p:txBody>
+      </p:sp>
+      <p:grpSp>
+        <p:nvGrpSpPr>
+          <p:cNvPr id="9" name="그룹 8">
+            <a:extLst>
+              <a:ext uri="{FF2B5EF4-FFF2-40B4-BE49-F238E27FC236}">
+                <a16:creationId xmlns:a16="http://schemas.microsoft.com/office/drawing/2014/main" id="{096DA45E-3768-B99C-6CC1-DE16E952FAA4}"/>
+              </a:ext>
+            </a:extLst>
+          </p:cNvPr>
+          <p:cNvGrpSpPr/>
+          <p:nvPr/>
+        </p:nvGrpSpPr>
+        <p:grpSpPr>
+          <a:xfrm>
+            <a:off x="5816600" y="2624667"/>
+            <a:ext cx="1760007" cy="1185333"/>
+            <a:chOff x="6096000" y="2548467"/>
+            <a:chExt cx="1760007" cy="1185333"/>
+          </a:xfrm>
+        </p:grpSpPr>
+        <p:sp>
+          <p:nvSpPr>
+            <p:cNvPr id="6" name="직사각형 5">
+              <a:extLst>
+                <a:ext uri="{FF2B5EF4-FFF2-40B4-BE49-F238E27FC236}">
+                  <a16:creationId xmlns:a16="http://schemas.microsoft.com/office/drawing/2014/main" id="{F1A73CB0-4289-7BE0-F59B-8567E449B432}"/>
+                </a:ext>
+              </a:extLst>
+            </p:cNvPr>
+            <p:cNvSpPr/>
+            <p:nvPr/>
+          </p:nvSpPr>
+          <p:spPr>
+            <a:xfrm>
+              <a:off x="6096000" y="2548467"/>
+              <a:ext cx="1162050" cy="1185333"/>
+            </a:xfrm>
+            <a:prstGeom prst="rect">
+              <a:avLst/>
+            </a:prstGeom>
+            <a:solidFill>
+              <a:schemeClr val="bg1"/>
+            </a:solidFill>
+          </p:spPr>
+          <p:style>
+            <a:lnRef idx="2">
+              <a:schemeClr val="accent1">
+                <a:shade val="15000"/>
+              </a:schemeClr>
+            </a:lnRef>
+            <a:fillRef idx="1">
+              <a:schemeClr val="accent1"/>
+            </a:fillRef>
+            <a:effectRef idx="0">
+              <a:schemeClr val="accent1"/>
+            </a:effectRef>
+            <a:fontRef idx="minor">
+              <a:schemeClr val="lt1"/>
+            </a:fontRef>
+          </p:style>
+          <p:txBody>
+            <a:bodyPr rtlCol="0" anchor="ctr"/>
+            <a:lstStyle/>
+            <a:p>
+              <a:pPr algn="ctr"/>
+              <a:endParaRPr lang="ko-KR" altLang="en-US"/>
+            </a:p>
+          </p:txBody>
+        </p:sp>
+        <p:sp>
+          <p:nvSpPr>
+            <p:cNvPr id="7" name="직사각형 6">
+              <a:extLst>
+                <a:ext uri="{FF2B5EF4-FFF2-40B4-BE49-F238E27FC236}">
+                  <a16:creationId xmlns:a16="http://schemas.microsoft.com/office/drawing/2014/main" id="{3E6C5A90-AFC8-29E2-CE47-7AB8B3482542}"/>
+                </a:ext>
+              </a:extLst>
+            </p:cNvPr>
+            <p:cNvSpPr/>
+            <p:nvPr/>
+          </p:nvSpPr>
+          <p:spPr>
+            <a:xfrm>
+              <a:off x="7262282" y="2613354"/>
+              <a:ext cx="593725" cy="375379"/>
+            </a:xfrm>
+            <a:prstGeom prst="rect">
+              <a:avLst/>
+            </a:prstGeom>
+            <a:solidFill>
+              <a:schemeClr val="accent3"/>
+            </a:solidFill>
+          </p:spPr>
+          <p:style>
+            <a:lnRef idx="2">
+              <a:schemeClr val="accent1">
+                <a:shade val="15000"/>
+              </a:schemeClr>
+            </a:lnRef>
+            <a:fillRef idx="1">
+              <a:schemeClr val="accent1"/>
+            </a:fillRef>
+            <a:effectRef idx="0">
+              <a:schemeClr val="accent1"/>
+            </a:effectRef>
+            <a:fontRef idx="minor">
+              <a:schemeClr val="lt1"/>
+            </a:fontRef>
+          </p:style>
+          <p:txBody>
+            <a:bodyPr rtlCol="0" anchor="ctr"/>
+            <a:lstStyle/>
+            <a:p>
+              <a:pPr algn="ctr"/>
+              <a:endParaRPr lang="ko-KR" altLang="en-US"/>
+            </a:p>
+          </p:txBody>
+        </p:sp>
+        <p:sp>
+          <p:nvSpPr>
+            <p:cNvPr id="8" name="직사각형 7">
+              <a:extLst>
+                <a:ext uri="{FF2B5EF4-FFF2-40B4-BE49-F238E27FC236}">
+                  <a16:creationId xmlns:a16="http://schemas.microsoft.com/office/drawing/2014/main" id="{7214B2EF-52F9-EC3C-751B-9C2C6825EE85}"/>
+                </a:ext>
+              </a:extLst>
+            </p:cNvPr>
+            <p:cNvSpPr/>
+            <p:nvPr/>
+          </p:nvSpPr>
+          <p:spPr>
+            <a:xfrm>
+              <a:off x="7262282" y="3241310"/>
+              <a:ext cx="593725" cy="375379"/>
+            </a:xfrm>
+            <a:prstGeom prst="rect">
+              <a:avLst/>
+            </a:prstGeom>
+            <a:solidFill>
+              <a:schemeClr val="accent3"/>
+            </a:solidFill>
+          </p:spPr>
+          <p:style>
+            <a:lnRef idx="2">
+              <a:schemeClr val="accent1">
+                <a:shade val="15000"/>
+              </a:schemeClr>
+            </a:lnRef>
+            <a:fillRef idx="1">
+              <a:schemeClr val="accent1"/>
+            </a:fillRef>
+            <a:effectRef idx="0">
+              <a:schemeClr val="accent1"/>
+            </a:effectRef>
+            <a:fontRef idx="minor">
+              <a:schemeClr val="lt1"/>
+            </a:fontRef>
+          </p:style>
+          <p:txBody>
+            <a:bodyPr rtlCol="0" anchor="ctr"/>
+            <a:lstStyle/>
+            <a:p>
+              <a:pPr algn="ctr"/>
+              <a:endParaRPr lang="ko-KR" altLang="en-US"/>
+            </a:p>
+          </p:txBody>
+        </p:sp>
+      </p:grpSp>
+      <p:sp>
+        <p:nvSpPr>
+          <p:cNvPr id="10" name="직사각형 9">
+            <a:extLst>
+              <a:ext uri="{FF2B5EF4-FFF2-40B4-BE49-F238E27FC236}">
+                <a16:creationId xmlns:a16="http://schemas.microsoft.com/office/drawing/2014/main" id="{E237B80F-2082-970D-47A3-F10DADA1DF5F}"/>
+              </a:ext>
+            </a:extLst>
+          </p:cNvPr>
+          <p:cNvSpPr/>
+          <p:nvPr/>
+        </p:nvSpPr>
+        <p:spPr>
+          <a:xfrm>
+            <a:off x="1800366" y="3597274"/>
+            <a:ext cx="500450" cy="212725"/>
+          </a:xfrm>
+          <a:prstGeom prst="rect">
+            <a:avLst/>
+          </a:prstGeom>
+          <a:solidFill>
+            <a:schemeClr val="tx1"/>
+          </a:solidFill>
+        </p:spPr>
+        <p:style>
+          <a:lnRef idx="2">
+            <a:schemeClr val="accent1">
+              <a:shade val="50000"/>
+            </a:schemeClr>
+          </a:lnRef>
+          <a:fillRef idx="1">
+            <a:schemeClr val="accent1"/>
+          </a:fillRef>
+          <a:effectRef idx="0">
+            <a:schemeClr val="accent1"/>
+          </a:effectRef>
+          <a:fontRef idx="minor">
+            <a:schemeClr val="lt1"/>
+          </a:fontRef>
+        </p:style>
+        <p:txBody>
+          <a:bodyPr rtlCol="0" anchor="ctr"/>
+          <a:lstStyle/>
+          <a:p>
+            <a:pPr algn="ctr"/>
+            <a:r>
+              <a:rPr lang="en-US" altLang="ko-KR" sz="800"/>
+              <a:t>PMOD</a:t>
+            </a:r>
+            <a:endParaRPr lang="ko-KR" altLang="en-US" sz="800"/>
+          </a:p>
+        </p:txBody>
+      </p:sp>
+      <p:sp>
+        <p:nvSpPr>
+          <p:cNvPr id="11" name="직사각형 10">
+            <a:extLst>
+              <a:ext uri="{FF2B5EF4-FFF2-40B4-BE49-F238E27FC236}">
+                <a16:creationId xmlns:a16="http://schemas.microsoft.com/office/drawing/2014/main" id="{B135DB10-37BB-042A-7D9E-F2DA26D8C1C6}"/>
+              </a:ext>
+            </a:extLst>
+          </p:cNvPr>
+          <p:cNvSpPr/>
+          <p:nvPr/>
+        </p:nvSpPr>
+        <p:spPr>
+          <a:xfrm>
+            <a:off x="2346466" y="3597274"/>
+            <a:ext cx="184009" cy="212725"/>
+          </a:xfrm>
+          <a:prstGeom prst="rect">
+            <a:avLst/>
+          </a:prstGeom>
+          <a:solidFill>
+            <a:schemeClr val="tx1"/>
+          </a:solidFill>
+        </p:spPr>
+        <p:style>
+          <a:lnRef idx="2">
+            <a:schemeClr val="accent1">
+              <a:shade val="50000"/>
+            </a:schemeClr>
+          </a:lnRef>
+          <a:fillRef idx="1">
+            <a:schemeClr val="accent1"/>
+          </a:fillRef>
+          <a:effectRef idx="0">
+            <a:schemeClr val="accent1"/>
+          </a:effectRef>
+          <a:fontRef idx="minor">
+            <a:schemeClr val="lt1"/>
+          </a:fontRef>
+        </p:style>
+        <p:txBody>
+          <a:bodyPr rtlCol="0" anchor="ctr"/>
+          <a:lstStyle/>
+          <a:p>
+            <a:pPr algn="ctr"/>
+            <a:endParaRPr lang="ko-KR" altLang="en-US" sz="800"/>
+          </a:p>
+        </p:txBody>
+      </p:sp>
+      <p:sp>
+        <p:nvSpPr>
+          <p:cNvPr id="12" name="직사각형 11">
+            <a:extLst>
+              <a:ext uri="{FF2B5EF4-FFF2-40B4-BE49-F238E27FC236}">
+                <a16:creationId xmlns:a16="http://schemas.microsoft.com/office/drawing/2014/main" id="{3755A458-00B1-E008-48BA-991F6E54E24F}"/>
+              </a:ext>
+            </a:extLst>
+          </p:cNvPr>
+          <p:cNvSpPr/>
+          <p:nvPr/>
+        </p:nvSpPr>
+        <p:spPr>
+          <a:xfrm>
+            <a:off x="2298700" y="3679825"/>
+            <a:ext cx="45719" cy="60325"/>
+          </a:xfrm>
+          <a:prstGeom prst="rect">
+            <a:avLst/>
+          </a:prstGeom>
+          <a:solidFill>
+            <a:srgbClr val="FFFF00"/>
+          </a:solidFill>
+        </p:spPr>
+        <p:style>
+          <a:lnRef idx="2">
+            <a:schemeClr val="accent1">
+              <a:shade val="15000"/>
+            </a:schemeClr>
+          </a:lnRef>
+          <a:fillRef idx="1">
+            <a:schemeClr val="accent1"/>
+          </a:fillRef>
+          <a:effectRef idx="0">
+            <a:schemeClr val="accent1"/>
+          </a:effectRef>
+          <a:fontRef idx="minor">
+            <a:schemeClr val="lt1"/>
+          </a:fontRef>
+        </p:style>
+        <p:txBody>
+          <a:bodyPr rtlCol="0" anchor="ctr"/>
+          <a:lstStyle/>
+          <a:p>
+            <a:pPr algn="ctr"/>
+            <a:endParaRPr lang="ko-KR" altLang="en-US"/>
+          </a:p>
+        </p:txBody>
+      </p:sp>
+      <p:cxnSp>
+        <p:nvCxnSpPr>
+          <p:cNvPr id="15" name="연결선: 꺾임 14">
+            <a:extLst>
+              <a:ext uri="{FF2B5EF4-FFF2-40B4-BE49-F238E27FC236}">
+                <a16:creationId xmlns:a16="http://schemas.microsoft.com/office/drawing/2014/main" id="{68C7D576-5869-06DC-F6C7-77ACA801BE5D}"/>
+              </a:ext>
+            </a:extLst>
+          </p:cNvPr>
+          <p:cNvCxnSpPr>
+            <a:stCxn id="11" idx="3"/>
+          </p:cNvCxnSpPr>
+          <p:nvPr/>
+        </p:nvCxnSpPr>
+        <p:spPr>
+          <a:xfrm>
+            <a:off x="2530475" y="3703637"/>
+            <a:ext cx="95250" cy="106362"/>
+          </a:xfrm>
+          <a:prstGeom prst="bentConnector2">
+            <a:avLst/>
+          </a:prstGeom>
+          <a:ln w="38100">
+            <a:solidFill>
+              <a:srgbClr val="FFFF00"/>
+            </a:solidFill>
+          </a:ln>
+        </p:spPr>
+        <p:style>
+          <a:lnRef idx="1">
+            <a:schemeClr val="accent1"/>
+          </a:lnRef>
+          <a:fillRef idx="0">
+            <a:schemeClr val="accent1"/>
+          </a:fillRef>
+          <a:effectRef idx="0">
+            <a:schemeClr val="accent1"/>
+          </a:effectRef>
+          <a:fontRef idx="minor">
+            <a:schemeClr val="tx1"/>
+          </a:fontRef>
+        </p:style>
+      </p:cxnSp>
+    </p:spTree>
+    <p:extLst>
+      <p:ext uri="{BB962C8B-B14F-4D97-AF65-F5344CB8AC3E}">
+        <p14:creationId xmlns:p14="http://schemas.microsoft.com/office/powerpoint/2010/main" val="4081739082"/>
+      </p:ext>
+    </p:extLst>
+  </p:cSld>
+  <p:clrMapOvr>
+    <a:masterClrMapping/>
+  </p:clrMapOvr>
+</p:sld>
+</file>
+
+<file path=ppt/slides/slide6.xml><?xml version="1.0" encoding="utf-8"?>
+<p:sld xmlns:a="http://schemas.openxmlformats.org/drawingml/2006/main" xmlns:r="http://schemas.openxmlformats.org/officeDocument/2006/relationships" xmlns:p="http://schemas.openxmlformats.org/presentationml/2006/main">
+  <p:cSld>
+    <p:spTree>
+      <p:nvGrpSpPr>
+        <p:cNvPr id="1" name=""/>
+        <p:cNvGrpSpPr/>
+        <p:nvPr/>
+      </p:nvGrpSpPr>
+      <p:grpSpPr>
+        <a:xfrm>
+          <a:off x="0" y="0"/>
+          <a:ext cx="0" cy="0"/>
+          <a:chOff x="0" y="0"/>
+          <a:chExt cx="0" cy="0"/>
+        </a:xfrm>
+      </p:grpSpPr>
+      <p:sp>
+        <p:nvSpPr>
           <p:cNvPr id="2" name="제목 1">
             <a:extLst>
               <a:ext uri="{FF2B5EF4-FFF2-40B4-BE49-F238E27FC236}">
@@ -15671,7 +16551,7 @@
 </p:sld>
 </file>
 
-<file path=ppt/slides/slide6.xml><?xml version="1.0" encoding="utf-8"?>
+<file path=ppt/slides/slide7.xml><?xml version="1.0" encoding="utf-8"?>
 <p:sld xmlns:a="http://schemas.openxmlformats.org/drawingml/2006/main" xmlns:r="http://schemas.openxmlformats.org/officeDocument/2006/relationships" xmlns:p="http://schemas.openxmlformats.org/presentationml/2006/main">
   <p:cSld>
     <p:spTree>
@@ -15860,7 +16740,7 @@
 </p:sld>
 </file>
 
-<file path=ppt/slides/slide7.xml><?xml version="1.0" encoding="utf-8"?>
+<file path=ppt/slides/slide8.xml><?xml version="1.0" encoding="utf-8"?>
 <p:sld xmlns:a="http://schemas.openxmlformats.org/drawingml/2006/main" xmlns:r="http://schemas.openxmlformats.org/officeDocument/2006/relationships" xmlns:p="http://schemas.openxmlformats.org/presentationml/2006/main">
   <p:cSld>
     <p:spTree>
@@ -16044,7 +16924,7 @@
 </p:sld>
 </file>
 
-<file path=ppt/slides/slide8.xml><?xml version="1.0" encoding="utf-8"?>
+<file path=ppt/slides/slide9.xml><?xml version="1.0" encoding="utf-8"?>
 <p:sld xmlns:a="http://schemas.openxmlformats.org/drawingml/2006/main" xmlns:r="http://schemas.openxmlformats.org/officeDocument/2006/relationships" xmlns:p="http://schemas.openxmlformats.org/presentationml/2006/main">
   <p:cSld>
     <p:spTree>
@@ -16094,213 +16974,6 @@
     <p:extLst>
       <p:ext uri="{BB962C8B-B14F-4D97-AF65-F5344CB8AC3E}">
         <p14:creationId xmlns:p14="http://schemas.microsoft.com/office/powerpoint/2010/main" val="1640941879"/>
-      </p:ext>
-    </p:extLst>
-  </p:cSld>
-  <p:clrMapOvr>
-    <a:masterClrMapping/>
-  </p:clrMapOvr>
-</p:sld>
-</file>
-
-<file path=ppt/slides/slide9.xml><?xml version="1.0" encoding="utf-8"?>
-<p:sld xmlns:a="http://schemas.openxmlformats.org/drawingml/2006/main" xmlns:r="http://schemas.openxmlformats.org/officeDocument/2006/relationships" xmlns:p="http://schemas.openxmlformats.org/presentationml/2006/main">
-  <p:cSld>
-    <p:bg>
-      <p:bgPr>
-        <a:solidFill>
-          <a:schemeClr val="bg1"/>
-        </a:solidFill>
-        <a:effectLst/>
-      </p:bgPr>
-    </p:bg>
-    <p:spTree>
-      <p:nvGrpSpPr>
-        <p:cNvPr id="1" name=""/>
-        <p:cNvGrpSpPr/>
-        <p:nvPr/>
-      </p:nvGrpSpPr>
-      <p:grpSpPr>
-        <a:xfrm>
-          <a:off x="0" y="0"/>
-          <a:ext cx="0" cy="0"/>
-          <a:chOff x="0" y="0"/>
-          <a:chExt cx="0" cy="0"/>
-        </a:xfrm>
-      </p:grpSpPr>
-      <p:sp>
-        <p:nvSpPr>
-          <p:cNvPr id="10" name="Rectangle 9">
-            <a:extLst>
-              <a:ext uri="{FF2B5EF4-FFF2-40B4-BE49-F238E27FC236}">
-                <a16:creationId xmlns:a16="http://schemas.microsoft.com/office/drawing/2014/main" id="{01D0AF59-99C3-4251-AB9A-C966C6AD4400}"/>
-              </a:ext>
-              <a:ext uri="{C183D7F6-B498-43B3-948B-1728B52AA6E4}">
-                <adec:decorative xmlns:adec="http://schemas.microsoft.com/office/drawing/2017/decorative" val="1"/>
-              </a:ext>
-            </a:extLst>
-          </p:cNvPr>
-          <p:cNvSpPr>
-            <a:spLocks noGrp="1" noRot="1" noChangeAspect="1" noMove="1" noResize="1" noEditPoints="1" noAdjustHandles="1" noChangeArrowheads="1" noChangeShapeType="1" noTextEdit="1"/>
-          </p:cNvSpPr>
-          <p:nvPr>
-            <p:extLst>
-              <p:ext uri="{386F3935-93C4-4BCD-93E2-E3B085C9AB24}">
-                <p16:designElem xmlns:p16="http://schemas.microsoft.com/office/powerpoint/2015/main" val="1"/>
-              </p:ext>
-            </p:extLst>
-          </p:nvPr>
-        </p:nvSpPr>
-        <p:spPr>
-          <a:xfrm>
-            <a:off x="0" y="0"/>
-            <a:ext cx="12192000" cy="6858000"/>
-          </a:xfrm>
-          <a:prstGeom prst="rect">
-            <a:avLst/>
-          </a:prstGeom>
-          <a:solidFill>
-            <a:schemeClr val="bg2"/>
-          </a:solidFill>
-          <a:ln>
-            <a:noFill/>
-          </a:ln>
-        </p:spPr>
-        <p:style>
-          <a:lnRef idx="2">
-            <a:schemeClr val="accent1">
-              <a:shade val="50000"/>
-            </a:schemeClr>
-          </a:lnRef>
-          <a:fillRef idx="1">
-            <a:schemeClr val="accent1"/>
-          </a:fillRef>
-          <a:effectRef idx="0">
-            <a:schemeClr val="accent1"/>
-          </a:effectRef>
-          <a:fontRef idx="minor">
-            <a:schemeClr val="lt1"/>
-          </a:fontRef>
-        </p:style>
-        <p:txBody>
-          <a:bodyPr rtlCol="0" anchor="ctr"/>
-          <a:lstStyle/>
-          <a:p>
-            <a:pPr algn="ctr"/>
-            <a:endParaRPr lang="en-US"/>
-          </a:p>
-        </p:txBody>
-      </p:sp>
-      <p:sp>
-        <p:nvSpPr>
-          <p:cNvPr id="12" name="Rectangle 11">
-            <a:extLst>
-              <a:ext uri="{FF2B5EF4-FFF2-40B4-BE49-F238E27FC236}">
-                <a16:creationId xmlns:a16="http://schemas.microsoft.com/office/drawing/2014/main" id="{1855405F-37A2-4869-9154-F8BE3BECE6C3}"/>
-              </a:ext>
-              <a:ext uri="{C183D7F6-B498-43B3-948B-1728B52AA6E4}">
-                <adec:decorative xmlns:adec="http://schemas.microsoft.com/office/drawing/2017/decorative" val="1"/>
-              </a:ext>
-            </a:extLst>
-          </p:cNvPr>
-          <p:cNvSpPr>
-            <a:spLocks noGrp="1" noRot="1" noChangeAspect="1" noMove="1" noResize="1" noEditPoints="1" noAdjustHandles="1" noChangeArrowheads="1" noChangeShapeType="1" noTextEdit="1"/>
-          </p:cNvSpPr>
-          <p:nvPr>
-            <p:extLst>
-              <p:ext uri="{386F3935-93C4-4BCD-93E2-E3B085C9AB24}">
-                <p16:designElem xmlns:p16="http://schemas.microsoft.com/office/powerpoint/2015/main" val="1"/>
-              </p:ext>
-            </p:extLst>
-          </p:nvPr>
-        </p:nvSpPr>
-        <p:spPr>
-          <a:xfrm>
-            <a:off x="477012" y="480060"/>
-            <a:ext cx="11237976" cy="5897880"/>
-          </a:xfrm>
-          <a:prstGeom prst="rect">
-            <a:avLst/>
-          </a:prstGeom>
-          <a:solidFill>
-            <a:srgbClr val="FFFFFF"/>
-          </a:solidFill>
-          <a:ln w="9525">
-            <a:noFill/>
-          </a:ln>
-          <a:effectLst>
-            <a:outerShdw blurRad="63500" dist="17780" dir="5400000" algn="t" rotWithShape="0">
-              <a:prstClr val="black">
-                <a:alpha val="43000"/>
-              </a:prstClr>
-            </a:outerShdw>
-          </a:effectLst>
-        </p:spPr>
-        <p:style>
-          <a:lnRef idx="2">
-            <a:schemeClr val="accent1">
-              <a:shade val="50000"/>
-            </a:schemeClr>
-          </a:lnRef>
-          <a:fillRef idx="1">
-            <a:schemeClr val="accent1"/>
-          </a:fillRef>
-          <a:effectRef idx="0">
-            <a:schemeClr val="accent1"/>
-          </a:effectRef>
-          <a:fontRef idx="minor">
-            <a:schemeClr val="lt1"/>
-          </a:fontRef>
-        </p:style>
-        <p:txBody>
-          <a:bodyPr rtlCol="0" anchor="ctr"/>
-          <a:lstStyle/>
-          <a:p>
-            <a:pPr algn="ctr"/>
-            <a:endParaRPr lang="en-US"/>
-          </a:p>
-        </p:txBody>
-      </p:sp>
-      <p:pic>
-        <p:nvPicPr>
-          <p:cNvPr id="5" name="그림 4" descr="텍스트, 스크린샷, 폰트, 번호이(가) 표시된 사진&#10;&#10;자동 생성된 설명">
-            <a:extLst>
-              <a:ext uri="{FF2B5EF4-FFF2-40B4-BE49-F238E27FC236}">
-                <a16:creationId xmlns:a16="http://schemas.microsoft.com/office/drawing/2014/main" id="{6FD95776-D7D3-8459-59C9-02196FA0E1B2}"/>
-              </a:ext>
-            </a:extLst>
-          </p:cNvPr>
-          <p:cNvPicPr>
-            <a:picLocks noChangeAspect="1"/>
-          </p:cNvPicPr>
-          <p:nvPr/>
-        </p:nvPicPr>
-        <p:blipFill>
-          <a:blip r:embed="rId2">
-            <a:extLst>
-              <a:ext uri="{28A0092B-C50C-407E-A947-70E740481C1C}">
-                <a14:useLocalDpi xmlns:a14="http://schemas.microsoft.com/office/drawing/2010/main" val="0"/>
-              </a:ext>
-            </a:extLst>
-          </a:blip>
-          <a:stretch>
-            <a:fillRect/>
-          </a:stretch>
-        </p:blipFill>
-        <p:spPr>
-          <a:xfrm>
-            <a:off x="643467" y="1506982"/>
-            <a:ext cx="10905066" cy="3844035"/>
-          </a:xfrm>
-          <a:prstGeom prst="rect">
-            <a:avLst/>
-          </a:prstGeom>
-        </p:spPr>
-      </p:pic>
-    </p:spTree>
-    <p:extLst>
-      <p:ext uri="{BB962C8B-B14F-4D97-AF65-F5344CB8AC3E}">
-        <p14:creationId xmlns:p14="http://schemas.microsoft.com/office/powerpoint/2010/main" val="1566511033"/>
       </p:ext>
     </p:extLst>
   </p:cSld>

</xml_diff>

<commit_message>
Capacitors, SPDT, Switch added
</commit_message>
<xml_diff>
--- a/Meeting/PMOD2BNC.pptx
+++ b/Meeting/PMOD2BNC.pptx
@@ -19,6 +19,10 @@
     <p:sldId id="268" r:id="rId13"/>
     <p:sldId id="265" r:id="rId14"/>
     <p:sldId id="266" r:id="rId15"/>
+    <p:sldId id="271" r:id="rId16"/>
+    <p:sldId id="272" r:id="rId17"/>
+    <p:sldId id="273" r:id="rId18"/>
+    <p:sldId id="274" r:id="rId19"/>
   </p:sldIdLst>
   <p:sldSz cx="12192000" cy="6858000"/>
   <p:notesSz cx="6858000" cy="9144000"/>
@@ -272,7 +276,7 @@
           <a:p>
             <a:fld id="{0B49B01E-FC7D-42C9-BEBD-6EBDB349EAEF}" type="datetimeFigureOut">
               <a:rPr lang="ko-KR" altLang="en-US" smtClean="0"/>
-              <a:t>2023-06-22</a:t>
+              <a:t>2023-06-23</a:t>
             </a:fld>
             <a:endParaRPr lang="ko-KR" altLang="en-US"/>
           </a:p>
@@ -470,7 +474,7 @@
           <a:p>
             <a:fld id="{0B49B01E-FC7D-42C9-BEBD-6EBDB349EAEF}" type="datetimeFigureOut">
               <a:rPr lang="ko-KR" altLang="en-US" smtClean="0"/>
-              <a:t>2023-06-22</a:t>
+              <a:t>2023-06-23</a:t>
             </a:fld>
             <a:endParaRPr lang="ko-KR" altLang="en-US"/>
           </a:p>
@@ -678,7 +682,7 @@
           <a:p>
             <a:fld id="{0B49B01E-FC7D-42C9-BEBD-6EBDB349EAEF}" type="datetimeFigureOut">
               <a:rPr lang="ko-KR" altLang="en-US" smtClean="0"/>
-              <a:t>2023-06-22</a:t>
+              <a:t>2023-06-23</a:t>
             </a:fld>
             <a:endParaRPr lang="ko-KR" altLang="en-US"/>
           </a:p>
@@ -876,7 +880,7 @@
           <a:p>
             <a:fld id="{0B49B01E-FC7D-42C9-BEBD-6EBDB349EAEF}" type="datetimeFigureOut">
               <a:rPr lang="ko-KR" altLang="en-US" smtClean="0"/>
-              <a:t>2023-06-22</a:t>
+              <a:t>2023-06-23</a:t>
             </a:fld>
             <a:endParaRPr lang="ko-KR" altLang="en-US"/>
           </a:p>
@@ -1151,7 +1155,7 @@
           <a:p>
             <a:fld id="{0B49B01E-FC7D-42C9-BEBD-6EBDB349EAEF}" type="datetimeFigureOut">
               <a:rPr lang="ko-KR" altLang="en-US" smtClean="0"/>
-              <a:t>2023-06-22</a:t>
+              <a:t>2023-06-23</a:t>
             </a:fld>
             <a:endParaRPr lang="ko-KR" altLang="en-US"/>
           </a:p>
@@ -1416,7 +1420,7 @@
           <a:p>
             <a:fld id="{0B49B01E-FC7D-42C9-BEBD-6EBDB349EAEF}" type="datetimeFigureOut">
               <a:rPr lang="ko-KR" altLang="en-US" smtClean="0"/>
-              <a:t>2023-06-22</a:t>
+              <a:t>2023-06-23</a:t>
             </a:fld>
             <a:endParaRPr lang="ko-KR" altLang="en-US"/>
           </a:p>
@@ -1828,7 +1832,7 @@
           <a:p>
             <a:fld id="{0B49B01E-FC7D-42C9-BEBD-6EBDB349EAEF}" type="datetimeFigureOut">
               <a:rPr lang="ko-KR" altLang="en-US" smtClean="0"/>
-              <a:t>2023-06-22</a:t>
+              <a:t>2023-06-23</a:t>
             </a:fld>
             <a:endParaRPr lang="ko-KR" altLang="en-US"/>
           </a:p>
@@ -1969,7 +1973,7 @@
           <a:p>
             <a:fld id="{0B49B01E-FC7D-42C9-BEBD-6EBDB349EAEF}" type="datetimeFigureOut">
               <a:rPr lang="ko-KR" altLang="en-US" smtClean="0"/>
-              <a:t>2023-06-22</a:t>
+              <a:t>2023-06-23</a:t>
             </a:fld>
             <a:endParaRPr lang="ko-KR" altLang="en-US"/>
           </a:p>
@@ -2082,7 +2086,7 @@
           <a:p>
             <a:fld id="{0B49B01E-FC7D-42C9-BEBD-6EBDB349EAEF}" type="datetimeFigureOut">
               <a:rPr lang="ko-KR" altLang="en-US" smtClean="0"/>
-              <a:t>2023-06-22</a:t>
+              <a:t>2023-06-23</a:t>
             </a:fld>
             <a:endParaRPr lang="ko-KR" altLang="en-US"/>
           </a:p>
@@ -2393,7 +2397,7 @@
           <a:p>
             <a:fld id="{0B49B01E-FC7D-42C9-BEBD-6EBDB349EAEF}" type="datetimeFigureOut">
               <a:rPr lang="ko-KR" altLang="en-US" smtClean="0"/>
-              <a:t>2023-06-22</a:t>
+              <a:t>2023-06-23</a:t>
             </a:fld>
             <a:endParaRPr lang="ko-KR" altLang="en-US"/>
           </a:p>
@@ -2681,7 +2685,7 @@
           <a:p>
             <a:fld id="{0B49B01E-FC7D-42C9-BEBD-6EBDB349EAEF}" type="datetimeFigureOut">
               <a:rPr lang="ko-KR" altLang="en-US" smtClean="0"/>
-              <a:t>2023-06-22</a:t>
+              <a:t>2023-06-23</a:t>
             </a:fld>
             <a:endParaRPr lang="ko-KR" altLang="en-US"/>
           </a:p>
@@ -2922,7 +2926,7 @@
           <a:p>
             <a:fld id="{0B49B01E-FC7D-42C9-BEBD-6EBDB349EAEF}" type="datetimeFigureOut">
               <a:rPr lang="ko-KR" altLang="en-US" smtClean="0"/>
-              <a:t>2023-06-22</a:t>
+              <a:t>2023-06-23</a:t>
             </a:fld>
             <a:endParaRPr lang="ko-KR" altLang="en-US"/>
           </a:p>
@@ -6827,7 +6831,7 @@
         </p:nvSpPr>
         <p:spPr>
           <a:xfrm>
-            <a:off x="124859" y="862315"/>
+            <a:off x="10310261" y="-11252"/>
             <a:ext cx="1881739" cy="769715"/>
           </a:xfrm>
           <a:prstGeom prst="rect">
@@ -6926,7 +6930,7 @@
         </p:nvSpPr>
         <p:spPr>
           <a:xfrm>
-            <a:off x="124859" y="1930719"/>
+            <a:off x="11196254" y="866575"/>
             <a:ext cx="937550" cy="769715"/>
           </a:xfrm>
           <a:prstGeom prst="rect">
@@ -6956,7 +6960,7 @@
             <a:pPr algn="ctr"/>
             <a:r>
               <a:rPr lang="en-US" altLang="ko-KR"/>
-              <a:t>Diode</a:t>
+              <a:t>Zener Diode</a:t>
             </a:r>
             <a:endParaRPr lang="ko-KR" altLang="en-US"/>
           </a:p>
@@ -7183,6 +7187,13 @@
               <a:rPr lang="en-US" altLang="ko-KR"/>
               <a:t>Diode</a:t>
             </a:r>
+          </a:p>
+          <a:p>
+            <a:pPr algn="ctr"/>
+            <a:r>
+              <a:rPr lang="en-US" altLang="ko-KR"/>
+              <a:t>(598-8260-107F)</a:t>
+            </a:r>
             <a:endParaRPr lang="ko-KR" altLang="en-US"/>
           </a:p>
         </p:txBody>
@@ -7298,6 +7309,72 @@
               <a:rPr lang="en-US" altLang="ko-KR"/>
               <a:t>Diode</a:t>
             </a:r>
+          </a:p>
+          <a:p>
+            <a:pPr algn="ctr"/>
+            <a:r>
+              <a:rPr lang="en-US" altLang="ko-KR"/>
+              <a:t>(598-8260-107F)</a:t>
+            </a:r>
+            <a:endParaRPr lang="ko-KR" altLang="en-US"/>
+          </a:p>
+        </p:txBody>
+      </p:sp>
+      <p:sp>
+        <p:nvSpPr>
+          <p:cNvPr id="7" name="TextBox 6">
+            <a:extLst>
+              <a:ext uri="{FF2B5EF4-FFF2-40B4-BE49-F238E27FC236}">
+                <a16:creationId xmlns:a16="http://schemas.microsoft.com/office/drawing/2014/main" id="{CB25DB59-3945-90EC-E789-0AA2A6AB27B8}"/>
+              </a:ext>
+            </a:extLst>
+          </p:cNvPr>
+          <p:cNvSpPr txBox="1"/>
+          <p:nvPr/>
+        </p:nvSpPr>
+        <p:spPr>
+          <a:xfrm>
+            <a:off x="1663156" y="2359398"/>
+            <a:ext cx="1751377" cy="369332"/>
+          </a:xfrm>
+          <a:prstGeom prst="rect">
+            <a:avLst/>
+          </a:prstGeom>
+          <a:noFill/>
+        </p:spPr>
+        <p:txBody>
+          <a:bodyPr wrap="none" rtlCol="0">
+            <a:spAutoFit/>
+          </a:bodyPr>
+          <a:lstStyle/>
+          <a:p>
+            <a:r>
+              <a:rPr lang="en-US" altLang="ko-KR">
+                <a:solidFill>
+                  <a:srgbClr val="374151"/>
+                </a:solidFill>
+                <a:latin typeface="Söhne"/>
+              </a:rPr>
+              <a:t>Ground</a:t>
+            </a:r>
+            <a:r>
+              <a:rPr lang="ko-KR" altLang="en-US">
+                <a:solidFill>
+                  <a:srgbClr val="374151"/>
+                </a:solidFill>
+                <a:latin typeface="Söhne"/>
+              </a:rPr>
+              <a:t> </a:t>
+            </a:r>
+            <a:r>
+              <a:rPr lang="en-US" altLang="ko-KR">
+                <a:solidFill>
+                  <a:srgbClr val="374151"/>
+                </a:solidFill>
+                <a:latin typeface="Söhne"/>
+              </a:rPr>
+              <a:t>Isolation</a:t>
+            </a:r>
             <a:endParaRPr lang="ko-KR" altLang="en-US"/>
           </a:p>
         </p:txBody>
@@ -7306,6 +7383,3081 @@
     <p:extLst>
       <p:ext uri="{BB962C8B-B14F-4D97-AF65-F5344CB8AC3E}">
         <p14:creationId xmlns:p14="http://schemas.microsoft.com/office/powerpoint/2010/main" val="1392740087"/>
+      </p:ext>
+    </p:extLst>
+  </p:cSld>
+  <p:clrMapOvr>
+    <a:masterClrMapping/>
+  </p:clrMapOvr>
+</p:sld>
+</file>
+
+<file path=ppt/slides/slide15.xml><?xml version="1.0" encoding="utf-8"?>
+<p:sld xmlns:a="http://schemas.openxmlformats.org/drawingml/2006/main" xmlns:r="http://schemas.openxmlformats.org/officeDocument/2006/relationships" xmlns:p="http://schemas.openxmlformats.org/presentationml/2006/main">
+  <p:cSld>
+    <p:spTree>
+      <p:nvGrpSpPr>
+        <p:cNvPr id="1" name=""/>
+        <p:cNvGrpSpPr/>
+        <p:nvPr/>
+      </p:nvGrpSpPr>
+      <p:grpSpPr>
+        <a:xfrm>
+          <a:off x="0" y="0"/>
+          <a:ext cx="0" cy="0"/>
+          <a:chOff x="0" y="0"/>
+          <a:chExt cx="0" cy="0"/>
+        </a:xfrm>
+      </p:grpSpPr>
+      <p:sp>
+        <p:nvSpPr>
+          <p:cNvPr id="5" name="직사각형 4">
+            <a:extLst>
+              <a:ext uri="{FF2B5EF4-FFF2-40B4-BE49-F238E27FC236}">
+                <a16:creationId xmlns:a16="http://schemas.microsoft.com/office/drawing/2014/main" id="{8377CC41-5C44-30C2-E9AF-12A349012C29}"/>
+              </a:ext>
+            </a:extLst>
+          </p:cNvPr>
+          <p:cNvSpPr/>
+          <p:nvPr/>
+        </p:nvSpPr>
+        <p:spPr>
+          <a:xfrm>
+            <a:off x="3198932" y="3038358"/>
+            <a:ext cx="1751378" cy="860200"/>
+          </a:xfrm>
+          <a:prstGeom prst="rect">
+            <a:avLst/>
+          </a:prstGeom>
+        </p:spPr>
+        <p:style>
+          <a:lnRef idx="2">
+            <a:schemeClr val="accent1">
+              <a:shade val="15000"/>
+            </a:schemeClr>
+          </a:lnRef>
+          <a:fillRef idx="1">
+            <a:schemeClr val="accent1"/>
+          </a:fillRef>
+          <a:effectRef idx="0">
+            <a:schemeClr val="accent1"/>
+          </a:effectRef>
+          <a:fontRef idx="minor">
+            <a:schemeClr val="lt1"/>
+          </a:fontRef>
+        </p:style>
+        <p:txBody>
+          <a:bodyPr rtlCol="0" anchor="ctr"/>
+          <a:lstStyle/>
+          <a:p>
+            <a:pPr algn="ctr"/>
+            <a:r>
+              <a:rPr lang="en-US" altLang="ko-KR"/>
+              <a:t>Isolator</a:t>
+            </a:r>
+          </a:p>
+          <a:p>
+            <a:pPr algn="ctr"/>
+            <a:r>
+              <a:rPr lang="en-US" altLang="ko-KR"/>
+              <a:t>2-&gt;2</a:t>
+            </a:r>
+          </a:p>
+          <a:p>
+            <a:pPr algn="ctr"/>
+            <a:r>
+              <a:rPr lang="en-US" altLang="ko-KR"/>
+              <a:t>(SI8620BC-B-IS)</a:t>
+            </a:r>
+            <a:endParaRPr lang="ko-KR" altLang="en-US"/>
+          </a:p>
+        </p:txBody>
+      </p:sp>
+      <p:sp>
+        <p:nvSpPr>
+          <p:cNvPr id="8" name="직사각형 7">
+            <a:extLst>
+              <a:ext uri="{FF2B5EF4-FFF2-40B4-BE49-F238E27FC236}">
+                <a16:creationId xmlns:a16="http://schemas.microsoft.com/office/drawing/2014/main" id="{F88D2E9D-DFC2-AF14-E3EE-CAFD1316598E}"/>
+              </a:ext>
+            </a:extLst>
+          </p:cNvPr>
+          <p:cNvSpPr/>
+          <p:nvPr/>
+        </p:nvSpPr>
+        <p:spPr>
+          <a:xfrm>
+            <a:off x="3853958" y="37350"/>
+            <a:ext cx="2766335" cy="769715"/>
+          </a:xfrm>
+          <a:prstGeom prst="rect">
+            <a:avLst/>
+          </a:prstGeom>
+        </p:spPr>
+        <p:style>
+          <a:lnRef idx="2">
+            <a:schemeClr val="accent1">
+              <a:shade val="15000"/>
+            </a:schemeClr>
+          </a:lnRef>
+          <a:fillRef idx="1">
+            <a:schemeClr val="accent1"/>
+          </a:fillRef>
+          <a:effectRef idx="0">
+            <a:schemeClr val="accent1"/>
+          </a:effectRef>
+          <a:fontRef idx="minor">
+            <a:schemeClr val="lt1"/>
+          </a:fontRef>
+        </p:style>
+        <p:txBody>
+          <a:bodyPr rtlCol="0" anchor="ctr"/>
+          <a:lstStyle/>
+          <a:p>
+            <a:pPr algn="ctr"/>
+            <a:r>
+              <a:rPr lang="en-US" altLang="ko-KR"/>
+              <a:t>Regulator 12V0 TO 3V3</a:t>
+            </a:r>
+          </a:p>
+          <a:p>
+            <a:pPr algn="ctr"/>
+            <a:r>
+              <a:rPr lang="en-US" altLang="ko-KR"/>
+              <a:t>(LD29150DT33R)</a:t>
+            </a:r>
+            <a:endParaRPr lang="ko-KR" altLang="en-US"/>
+          </a:p>
+        </p:txBody>
+      </p:sp>
+      <p:sp>
+        <p:nvSpPr>
+          <p:cNvPr id="9" name="직사각형 8">
+            <a:extLst>
+              <a:ext uri="{FF2B5EF4-FFF2-40B4-BE49-F238E27FC236}">
+                <a16:creationId xmlns:a16="http://schemas.microsoft.com/office/drawing/2014/main" id="{CD1CFA86-85F9-95BA-6C95-ADF6A287087C}"/>
+              </a:ext>
+            </a:extLst>
+          </p:cNvPr>
+          <p:cNvSpPr/>
+          <p:nvPr/>
+        </p:nvSpPr>
+        <p:spPr>
+          <a:xfrm>
+            <a:off x="5694743" y="2961752"/>
+            <a:ext cx="1504710" cy="1785238"/>
+          </a:xfrm>
+          <a:prstGeom prst="rect">
+            <a:avLst/>
+          </a:prstGeom>
+        </p:spPr>
+        <p:style>
+          <a:lnRef idx="2">
+            <a:schemeClr val="accent1">
+              <a:shade val="15000"/>
+            </a:schemeClr>
+          </a:lnRef>
+          <a:fillRef idx="1">
+            <a:schemeClr val="accent1"/>
+          </a:fillRef>
+          <a:effectRef idx="0">
+            <a:schemeClr val="accent1"/>
+          </a:effectRef>
+          <a:fontRef idx="minor">
+            <a:schemeClr val="lt1"/>
+          </a:fontRef>
+        </p:style>
+        <p:txBody>
+          <a:bodyPr rtlCol="0" anchor="ctr"/>
+          <a:lstStyle/>
+          <a:p>
+            <a:pPr algn="ctr"/>
+            <a:r>
+              <a:rPr lang="en-US" altLang="ko-KR"/>
+              <a:t>Transciever</a:t>
+            </a:r>
+          </a:p>
+          <a:p>
+            <a:pPr algn="ctr"/>
+            <a:r>
+              <a:rPr lang="en-US" altLang="ko-KR"/>
+              <a:t>2&lt;-&gt;2</a:t>
+            </a:r>
+          </a:p>
+          <a:p>
+            <a:pPr algn="ctr"/>
+            <a:r>
+              <a:rPr lang="en-US" altLang="ko-KR"/>
+              <a:t>(74LVCH2T45DC-Q100H)</a:t>
+            </a:r>
+            <a:endParaRPr lang="ko-KR" altLang="en-US"/>
+          </a:p>
+        </p:txBody>
+      </p:sp>
+      <p:sp>
+        <p:nvSpPr>
+          <p:cNvPr id="11" name="직사각형 10">
+            <a:extLst>
+              <a:ext uri="{FF2B5EF4-FFF2-40B4-BE49-F238E27FC236}">
+                <a16:creationId xmlns:a16="http://schemas.microsoft.com/office/drawing/2014/main" id="{D6308E8B-2C6F-A68F-549A-61992A6E9999}"/>
+              </a:ext>
+            </a:extLst>
+          </p:cNvPr>
+          <p:cNvSpPr/>
+          <p:nvPr/>
+        </p:nvSpPr>
+        <p:spPr>
+          <a:xfrm>
+            <a:off x="9035245" y="5200087"/>
+            <a:ext cx="2368984" cy="578733"/>
+          </a:xfrm>
+          <a:prstGeom prst="rect">
+            <a:avLst/>
+          </a:prstGeom>
+        </p:spPr>
+        <p:style>
+          <a:lnRef idx="2">
+            <a:schemeClr val="accent1">
+              <a:shade val="15000"/>
+            </a:schemeClr>
+          </a:lnRef>
+          <a:fillRef idx="1">
+            <a:schemeClr val="accent1"/>
+          </a:fillRef>
+          <a:effectRef idx="0">
+            <a:schemeClr val="accent1"/>
+          </a:effectRef>
+          <a:fontRef idx="minor">
+            <a:schemeClr val="lt1"/>
+          </a:fontRef>
+        </p:style>
+        <p:txBody>
+          <a:bodyPr rtlCol="0" anchor="ctr"/>
+          <a:lstStyle/>
+          <a:p>
+            <a:pPr algn="ctr"/>
+            <a:r>
+              <a:rPr lang="en-US" altLang="ko-KR"/>
+              <a:t>73.33Ohm</a:t>
+            </a:r>
+          </a:p>
+          <a:p>
+            <a:pPr algn="ctr"/>
+            <a:r>
+              <a:rPr lang="en-US" altLang="ko-KR"/>
+              <a:t>(RP73PF2A73R2BTDF)</a:t>
+            </a:r>
+            <a:endParaRPr lang="ko-KR" altLang="en-US"/>
+          </a:p>
+        </p:txBody>
+      </p:sp>
+      <p:sp>
+        <p:nvSpPr>
+          <p:cNvPr id="12" name="직사각형 11">
+            <a:extLst>
+              <a:ext uri="{FF2B5EF4-FFF2-40B4-BE49-F238E27FC236}">
+                <a16:creationId xmlns:a16="http://schemas.microsoft.com/office/drawing/2014/main" id="{53300F5B-45AE-CD74-8110-BEFF911E2D1F}"/>
+              </a:ext>
+            </a:extLst>
+          </p:cNvPr>
+          <p:cNvSpPr/>
+          <p:nvPr/>
+        </p:nvSpPr>
+        <p:spPr>
+          <a:xfrm>
+            <a:off x="9039148" y="3907986"/>
+            <a:ext cx="2047951" cy="578733"/>
+          </a:xfrm>
+          <a:prstGeom prst="rect">
+            <a:avLst/>
+          </a:prstGeom>
+        </p:spPr>
+        <p:style>
+          <a:lnRef idx="2">
+            <a:schemeClr val="accent1">
+              <a:shade val="15000"/>
+            </a:schemeClr>
+          </a:lnRef>
+          <a:fillRef idx="1">
+            <a:schemeClr val="accent1"/>
+          </a:fillRef>
+          <a:effectRef idx="0">
+            <a:schemeClr val="accent1"/>
+          </a:effectRef>
+          <a:fontRef idx="minor">
+            <a:schemeClr val="lt1"/>
+          </a:fontRef>
+        </p:style>
+        <p:txBody>
+          <a:bodyPr rtlCol="0" anchor="ctr"/>
+          <a:lstStyle/>
+          <a:p>
+            <a:pPr algn="ctr"/>
+            <a:r>
+              <a:rPr lang="en-US" altLang="ko-KR"/>
+              <a:t>157.14Ohm</a:t>
+            </a:r>
+          </a:p>
+          <a:p>
+            <a:pPr algn="ctr"/>
+            <a:r>
+              <a:rPr lang="en-US" altLang="ko-KR"/>
+              <a:t>(ERA-8AEB1580V)</a:t>
+            </a:r>
+            <a:endParaRPr lang="ko-KR" altLang="en-US"/>
+          </a:p>
+        </p:txBody>
+      </p:sp>
+      <p:sp>
+        <p:nvSpPr>
+          <p:cNvPr id="2" name="직사각형 1">
+            <a:extLst>
+              <a:ext uri="{FF2B5EF4-FFF2-40B4-BE49-F238E27FC236}">
+                <a16:creationId xmlns:a16="http://schemas.microsoft.com/office/drawing/2014/main" id="{038501E6-4575-ED4D-19EC-D5C8C76F9446}"/>
+              </a:ext>
+            </a:extLst>
+          </p:cNvPr>
+          <p:cNvSpPr/>
+          <p:nvPr/>
+        </p:nvSpPr>
+        <p:spPr>
+          <a:xfrm>
+            <a:off x="9039148" y="3275638"/>
+            <a:ext cx="2625881" cy="578733"/>
+          </a:xfrm>
+          <a:prstGeom prst="rect">
+            <a:avLst/>
+          </a:prstGeom>
+        </p:spPr>
+        <p:style>
+          <a:lnRef idx="2">
+            <a:schemeClr val="accent1">
+              <a:shade val="15000"/>
+            </a:schemeClr>
+          </a:lnRef>
+          <a:fillRef idx="1">
+            <a:schemeClr val="accent1"/>
+          </a:fillRef>
+          <a:effectRef idx="0">
+            <a:schemeClr val="accent1"/>
+          </a:effectRef>
+          <a:fontRef idx="minor">
+            <a:schemeClr val="lt1"/>
+          </a:fontRef>
+        </p:style>
+        <p:txBody>
+          <a:bodyPr rtlCol="0" anchor="ctr"/>
+          <a:lstStyle/>
+          <a:p>
+            <a:pPr algn="ctr"/>
+            <a:r>
+              <a:rPr lang="en-US" altLang="ko-KR"/>
+              <a:t>Transistor</a:t>
+            </a:r>
+          </a:p>
+          <a:p>
+            <a:pPr algn="ctr"/>
+            <a:r>
+              <a:rPr lang="en-US" altLang="ko-KR"/>
+              <a:t>(LIB_NTGD4167CT1G)</a:t>
+            </a:r>
+            <a:endParaRPr lang="ko-KR" altLang="en-US"/>
+          </a:p>
+        </p:txBody>
+      </p:sp>
+      <p:sp>
+        <p:nvSpPr>
+          <p:cNvPr id="3" name="직사각형 2">
+            <a:extLst>
+              <a:ext uri="{FF2B5EF4-FFF2-40B4-BE49-F238E27FC236}">
+                <a16:creationId xmlns:a16="http://schemas.microsoft.com/office/drawing/2014/main" id="{8DFB32CA-F80C-4378-8C5F-1BE0419ADEB8}"/>
+              </a:ext>
+            </a:extLst>
+          </p:cNvPr>
+          <p:cNvSpPr/>
+          <p:nvPr/>
+        </p:nvSpPr>
+        <p:spPr>
+          <a:xfrm>
+            <a:off x="9039148" y="5845215"/>
+            <a:ext cx="2625881" cy="578733"/>
+          </a:xfrm>
+          <a:prstGeom prst="rect">
+            <a:avLst/>
+          </a:prstGeom>
+        </p:spPr>
+        <p:style>
+          <a:lnRef idx="2">
+            <a:schemeClr val="accent1">
+              <a:shade val="15000"/>
+            </a:schemeClr>
+          </a:lnRef>
+          <a:fillRef idx="1">
+            <a:schemeClr val="accent1"/>
+          </a:fillRef>
+          <a:effectRef idx="0">
+            <a:schemeClr val="accent1"/>
+          </a:effectRef>
+          <a:fontRef idx="minor">
+            <a:schemeClr val="lt1"/>
+          </a:fontRef>
+        </p:style>
+        <p:txBody>
+          <a:bodyPr rtlCol="0" anchor="ctr"/>
+          <a:lstStyle/>
+          <a:p>
+            <a:pPr algn="ctr"/>
+            <a:r>
+              <a:rPr lang="en-US" altLang="ko-KR"/>
+              <a:t>Transistor</a:t>
+            </a:r>
+          </a:p>
+          <a:p>
+            <a:pPr algn="ctr"/>
+            <a:r>
+              <a:rPr lang="en-US" altLang="ko-KR"/>
+              <a:t>(LIB_NTGD4167CT1G)</a:t>
+            </a:r>
+            <a:endParaRPr lang="ko-KR" altLang="en-US"/>
+          </a:p>
+        </p:txBody>
+      </p:sp>
+      <p:sp>
+        <p:nvSpPr>
+          <p:cNvPr id="6" name="직사각형 5">
+            <a:extLst>
+              <a:ext uri="{FF2B5EF4-FFF2-40B4-BE49-F238E27FC236}">
+                <a16:creationId xmlns:a16="http://schemas.microsoft.com/office/drawing/2014/main" id="{3E766F9A-9FBD-5FC5-C330-1425C09744A1}"/>
+              </a:ext>
+            </a:extLst>
+          </p:cNvPr>
+          <p:cNvSpPr/>
+          <p:nvPr/>
+        </p:nvSpPr>
+        <p:spPr>
+          <a:xfrm flipV="1">
+            <a:off x="7354852" y="4791919"/>
+            <a:ext cx="3378236" cy="92600"/>
+          </a:xfrm>
+          <a:prstGeom prst="rect">
+            <a:avLst/>
+          </a:prstGeom>
+        </p:spPr>
+        <p:style>
+          <a:lnRef idx="2">
+            <a:schemeClr val="accent1">
+              <a:shade val="15000"/>
+            </a:schemeClr>
+          </a:lnRef>
+          <a:fillRef idx="1">
+            <a:schemeClr val="accent1"/>
+          </a:fillRef>
+          <a:effectRef idx="0">
+            <a:schemeClr val="accent1"/>
+          </a:effectRef>
+          <a:fontRef idx="minor">
+            <a:schemeClr val="lt1"/>
+          </a:fontRef>
+        </p:style>
+        <p:txBody>
+          <a:bodyPr rtlCol="0" anchor="ctr"/>
+          <a:lstStyle/>
+          <a:p>
+            <a:pPr algn="ctr"/>
+            <a:endParaRPr lang="ko-KR" altLang="en-US"/>
+          </a:p>
+        </p:txBody>
+      </p:sp>
+      <p:sp>
+        <p:nvSpPr>
+          <p:cNvPr id="15" name="직사각형 14">
+            <a:extLst>
+              <a:ext uri="{FF2B5EF4-FFF2-40B4-BE49-F238E27FC236}">
+                <a16:creationId xmlns:a16="http://schemas.microsoft.com/office/drawing/2014/main" id="{A0496A06-A3A9-9452-0BD4-3469213FD77C}"/>
+              </a:ext>
+            </a:extLst>
+          </p:cNvPr>
+          <p:cNvSpPr/>
+          <p:nvPr/>
+        </p:nvSpPr>
+        <p:spPr>
+          <a:xfrm>
+            <a:off x="4618294" y="2019783"/>
+            <a:ext cx="1713055" cy="769715"/>
+          </a:xfrm>
+          <a:prstGeom prst="rect">
+            <a:avLst/>
+          </a:prstGeom>
+        </p:spPr>
+        <p:style>
+          <a:lnRef idx="2">
+            <a:schemeClr val="accent1">
+              <a:shade val="15000"/>
+            </a:schemeClr>
+          </a:lnRef>
+          <a:fillRef idx="1">
+            <a:schemeClr val="accent1"/>
+          </a:fillRef>
+          <a:effectRef idx="0">
+            <a:schemeClr val="accent1"/>
+          </a:effectRef>
+          <a:fontRef idx="minor">
+            <a:schemeClr val="lt1"/>
+          </a:fontRef>
+        </p:style>
+        <p:txBody>
+          <a:bodyPr rtlCol="0" anchor="ctr"/>
+          <a:lstStyle/>
+          <a:p>
+            <a:pPr algn="ctr"/>
+            <a:r>
+              <a:rPr lang="en-US" altLang="ko-KR"/>
+              <a:t>IO SPDT</a:t>
+            </a:r>
+            <a:endParaRPr lang="ko-KR" altLang="en-US"/>
+          </a:p>
+        </p:txBody>
+      </p:sp>
+      <p:sp>
+        <p:nvSpPr>
+          <p:cNvPr id="16" name="직사각형 15">
+            <a:extLst>
+              <a:ext uri="{FF2B5EF4-FFF2-40B4-BE49-F238E27FC236}">
+                <a16:creationId xmlns:a16="http://schemas.microsoft.com/office/drawing/2014/main" id="{098103C6-86AF-5AA1-ECB4-6974E3CF5E45}"/>
+              </a:ext>
+            </a:extLst>
+          </p:cNvPr>
+          <p:cNvSpPr/>
+          <p:nvPr/>
+        </p:nvSpPr>
+        <p:spPr>
+          <a:xfrm>
+            <a:off x="8001962" y="2019783"/>
+            <a:ext cx="1713055" cy="769715"/>
+          </a:xfrm>
+          <a:prstGeom prst="rect">
+            <a:avLst/>
+          </a:prstGeom>
+        </p:spPr>
+        <p:style>
+          <a:lnRef idx="2">
+            <a:schemeClr val="accent1">
+              <a:shade val="15000"/>
+            </a:schemeClr>
+          </a:lnRef>
+          <a:fillRef idx="1">
+            <a:schemeClr val="accent1"/>
+          </a:fillRef>
+          <a:effectRef idx="0">
+            <a:schemeClr val="accent1"/>
+          </a:effectRef>
+          <a:fontRef idx="minor">
+            <a:schemeClr val="lt1"/>
+          </a:fontRef>
+        </p:style>
+        <p:txBody>
+          <a:bodyPr rtlCol="0" anchor="ctr"/>
+          <a:lstStyle/>
+          <a:p>
+            <a:pPr algn="ctr"/>
+            <a:r>
+              <a:rPr lang="en-US" altLang="ko-KR"/>
+              <a:t>Impedance SPDT</a:t>
+            </a:r>
+            <a:endParaRPr lang="ko-KR" altLang="en-US"/>
+          </a:p>
+        </p:txBody>
+      </p:sp>
+      <p:cxnSp>
+        <p:nvCxnSpPr>
+          <p:cNvPr id="20" name="연결선: 꺾임 19">
+            <a:extLst>
+              <a:ext uri="{FF2B5EF4-FFF2-40B4-BE49-F238E27FC236}">
+                <a16:creationId xmlns:a16="http://schemas.microsoft.com/office/drawing/2014/main" id="{4F039163-2642-A70E-D2FD-0C716A05ED5A}"/>
+              </a:ext>
+            </a:extLst>
+          </p:cNvPr>
+          <p:cNvCxnSpPr>
+            <a:cxnSpLocks/>
+            <a:stCxn id="5" idx="3"/>
+            <a:endCxn id="15" idx="2"/>
+          </p:cNvCxnSpPr>
+          <p:nvPr/>
+        </p:nvCxnSpPr>
+        <p:spPr>
+          <a:xfrm flipV="1">
+            <a:off x="4950310" y="2789498"/>
+            <a:ext cx="524512" cy="678960"/>
+          </a:xfrm>
+          <a:prstGeom prst="bentConnector2">
+            <a:avLst/>
+          </a:prstGeom>
+        </p:spPr>
+        <p:style>
+          <a:lnRef idx="1">
+            <a:schemeClr val="accent1"/>
+          </a:lnRef>
+          <a:fillRef idx="0">
+            <a:schemeClr val="accent1"/>
+          </a:fillRef>
+          <a:effectRef idx="0">
+            <a:schemeClr val="accent1"/>
+          </a:effectRef>
+          <a:fontRef idx="minor">
+            <a:schemeClr val="tx1"/>
+          </a:fontRef>
+        </p:style>
+      </p:cxnSp>
+      <p:cxnSp>
+        <p:nvCxnSpPr>
+          <p:cNvPr id="24" name="연결선: 꺾임 23">
+            <a:extLst>
+              <a:ext uri="{FF2B5EF4-FFF2-40B4-BE49-F238E27FC236}">
+                <a16:creationId xmlns:a16="http://schemas.microsoft.com/office/drawing/2014/main" id="{BD51A0B4-E588-5EAB-67E6-7FE9E7F6B5D2}"/>
+              </a:ext>
+            </a:extLst>
+          </p:cNvPr>
+          <p:cNvCxnSpPr>
+            <a:cxnSpLocks/>
+            <a:stCxn id="29" idx="3"/>
+            <a:endCxn id="15" idx="2"/>
+          </p:cNvCxnSpPr>
+          <p:nvPr/>
+        </p:nvCxnSpPr>
+        <p:spPr>
+          <a:xfrm flipV="1">
+            <a:off x="4950310" y="2789498"/>
+            <a:ext cx="524512" cy="3646294"/>
+          </a:xfrm>
+          <a:prstGeom prst="bentConnector2">
+            <a:avLst/>
+          </a:prstGeom>
+        </p:spPr>
+        <p:style>
+          <a:lnRef idx="1">
+            <a:schemeClr val="accent1"/>
+          </a:lnRef>
+          <a:fillRef idx="0">
+            <a:schemeClr val="accent1"/>
+          </a:fillRef>
+          <a:effectRef idx="0">
+            <a:schemeClr val="accent1"/>
+          </a:effectRef>
+          <a:fontRef idx="minor">
+            <a:schemeClr val="tx1"/>
+          </a:fontRef>
+        </p:style>
+      </p:cxnSp>
+      <p:cxnSp>
+        <p:nvCxnSpPr>
+          <p:cNvPr id="27" name="연결선: 꺾임 26">
+            <a:extLst>
+              <a:ext uri="{FF2B5EF4-FFF2-40B4-BE49-F238E27FC236}">
+                <a16:creationId xmlns:a16="http://schemas.microsoft.com/office/drawing/2014/main" id="{8C1FC465-4CD3-DF9C-A088-6030C9431C92}"/>
+              </a:ext>
+            </a:extLst>
+          </p:cNvPr>
+          <p:cNvCxnSpPr>
+            <a:cxnSpLocks/>
+            <a:stCxn id="2" idx="1"/>
+            <a:endCxn id="16" idx="2"/>
+          </p:cNvCxnSpPr>
+          <p:nvPr/>
+        </p:nvCxnSpPr>
+        <p:spPr>
+          <a:xfrm rot="10800000">
+            <a:off x="8858490" y="2789499"/>
+            <a:ext cx="180658" cy="775507"/>
+          </a:xfrm>
+          <a:prstGeom prst="bentConnector2">
+            <a:avLst/>
+          </a:prstGeom>
+        </p:spPr>
+        <p:style>
+          <a:lnRef idx="1">
+            <a:schemeClr val="accent1"/>
+          </a:lnRef>
+          <a:fillRef idx="0">
+            <a:schemeClr val="accent1"/>
+          </a:fillRef>
+          <a:effectRef idx="0">
+            <a:schemeClr val="accent1"/>
+          </a:effectRef>
+          <a:fontRef idx="minor">
+            <a:schemeClr val="tx1"/>
+          </a:fontRef>
+        </p:style>
+      </p:cxnSp>
+      <p:cxnSp>
+        <p:nvCxnSpPr>
+          <p:cNvPr id="30" name="연결선: 꺾임 29">
+            <a:extLst>
+              <a:ext uri="{FF2B5EF4-FFF2-40B4-BE49-F238E27FC236}">
+                <a16:creationId xmlns:a16="http://schemas.microsoft.com/office/drawing/2014/main" id="{BCA8E6DC-EDB6-2141-8B36-5C2D09F741AB}"/>
+              </a:ext>
+            </a:extLst>
+          </p:cNvPr>
+          <p:cNvCxnSpPr>
+            <a:cxnSpLocks/>
+            <a:stCxn id="47" idx="0"/>
+            <a:endCxn id="16" idx="2"/>
+          </p:cNvCxnSpPr>
+          <p:nvPr/>
+        </p:nvCxnSpPr>
+        <p:spPr>
+          <a:xfrm rot="5400000" flipH="1" flipV="1">
+            <a:off x="7068590" y="3955561"/>
+            <a:ext cx="2955963" cy="623838"/>
+          </a:xfrm>
+          <a:prstGeom prst="bentConnector3">
+            <a:avLst>
+              <a:gd name="adj1" fmla="val 50000"/>
+            </a:avLst>
+          </a:prstGeom>
+        </p:spPr>
+        <p:style>
+          <a:lnRef idx="1">
+            <a:schemeClr val="accent1"/>
+          </a:lnRef>
+          <a:fillRef idx="0">
+            <a:schemeClr val="accent1"/>
+          </a:fillRef>
+          <a:effectRef idx="0">
+            <a:schemeClr val="accent1"/>
+          </a:effectRef>
+          <a:fontRef idx="minor">
+            <a:schemeClr val="tx1"/>
+          </a:fontRef>
+        </p:style>
+      </p:cxnSp>
+      <p:sp>
+        <p:nvSpPr>
+          <p:cNvPr id="34" name="직사각형 33">
+            <a:extLst>
+              <a:ext uri="{FF2B5EF4-FFF2-40B4-BE49-F238E27FC236}">
+                <a16:creationId xmlns:a16="http://schemas.microsoft.com/office/drawing/2014/main" id="{8789338B-9781-3E12-A0FC-2E6BCBEB9593}"/>
+              </a:ext>
+            </a:extLst>
+          </p:cNvPr>
+          <p:cNvSpPr/>
+          <p:nvPr/>
+        </p:nvSpPr>
+        <p:spPr>
+          <a:xfrm rot="5400000">
+            <a:off x="-262892" y="4453360"/>
+            <a:ext cx="1713055" cy="769715"/>
+          </a:xfrm>
+          <a:prstGeom prst="rect">
+            <a:avLst/>
+          </a:prstGeom>
+        </p:spPr>
+        <p:style>
+          <a:lnRef idx="2">
+            <a:schemeClr val="accent1">
+              <a:shade val="15000"/>
+            </a:schemeClr>
+          </a:lnRef>
+          <a:fillRef idx="1">
+            <a:schemeClr val="accent1"/>
+          </a:fillRef>
+          <a:effectRef idx="0">
+            <a:schemeClr val="accent1"/>
+          </a:effectRef>
+          <a:fontRef idx="minor">
+            <a:schemeClr val="lt1"/>
+          </a:fontRef>
+        </p:style>
+        <p:txBody>
+          <a:bodyPr rtlCol="0" anchor="ctr"/>
+          <a:lstStyle/>
+          <a:p>
+            <a:pPr algn="ctr"/>
+            <a:r>
+              <a:rPr lang="en-US" altLang="ko-KR"/>
+              <a:t>Molex</a:t>
+            </a:r>
+          </a:p>
+          <a:p>
+            <a:pPr algn="ctr"/>
+            <a:r>
+              <a:rPr lang="en-US" altLang="ko-KR"/>
+              <a:t>Pin Header</a:t>
+            </a:r>
+          </a:p>
+          <a:p>
+            <a:pPr algn="ctr"/>
+            <a:r>
+              <a:rPr lang="en-US" altLang="ko-KR"/>
+              <a:t>(71764-0112)</a:t>
+            </a:r>
+            <a:endParaRPr lang="ko-KR" altLang="en-US"/>
+          </a:p>
+        </p:txBody>
+      </p:sp>
+      <p:sp>
+        <p:nvSpPr>
+          <p:cNvPr id="36" name="직사각형 35">
+            <a:extLst>
+              <a:ext uri="{FF2B5EF4-FFF2-40B4-BE49-F238E27FC236}">
+                <a16:creationId xmlns:a16="http://schemas.microsoft.com/office/drawing/2014/main" id="{06071E10-6C51-88D1-36BE-3AA2C13B4F82}"/>
+              </a:ext>
+            </a:extLst>
+          </p:cNvPr>
+          <p:cNvSpPr/>
+          <p:nvPr/>
+        </p:nvSpPr>
+        <p:spPr>
+          <a:xfrm rot="10800000" flipV="1">
+            <a:off x="10783540" y="4519917"/>
+            <a:ext cx="1241378" cy="636604"/>
+          </a:xfrm>
+          <a:prstGeom prst="rect">
+            <a:avLst/>
+          </a:prstGeom>
+        </p:spPr>
+        <p:style>
+          <a:lnRef idx="2">
+            <a:schemeClr val="accent1">
+              <a:shade val="15000"/>
+            </a:schemeClr>
+          </a:lnRef>
+          <a:fillRef idx="1">
+            <a:schemeClr val="accent1"/>
+          </a:fillRef>
+          <a:effectRef idx="0">
+            <a:schemeClr val="accent1"/>
+          </a:effectRef>
+          <a:fontRef idx="minor">
+            <a:schemeClr val="lt1"/>
+          </a:fontRef>
+        </p:style>
+        <p:txBody>
+          <a:bodyPr rtlCol="0" anchor="ctr"/>
+          <a:lstStyle/>
+          <a:p>
+            <a:pPr algn="ctr"/>
+            <a:r>
+              <a:rPr lang="en-US" altLang="ko-KR"/>
+              <a:t>BNC</a:t>
+            </a:r>
+          </a:p>
+          <a:p>
+            <a:pPr algn="ctr"/>
+            <a:r>
+              <a:rPr lang="en-US" altLang="ko-KR"/>
+              <a:t>(031-6575)</a:t>
+            </a:r>
+            <a:endParaRPr lang="ko-KR" altLang="en-US"/>
+          </a:p>
+        </p:txBody>
+      </p:sp>
+      <p:sp>
+        <p:nvSpPr>
+          <p:cNvPr id="26" name="직사각형 25">
+            <a:extLst>
+              <a:ext uri="{FF2B5EF4-FFF2-40B4-BE49-F238E27FC236}">
+                <a16:creationId xmlns:a16="http://schemas.microsoft.com/office/drawing/2014/main" id="{DFF76C1E-FFE1-6A66-27BF-FADD68F4584E}"/>
+              </a:ext>
+            </a:extLst>
+          </p:cNvPr>
+          <p:cNvSpPr/>
+          <p:nvPr/>
+        </p:nvSpPr>
+        <p:spPr>
+          <a:xfrm>
+            <a:off x="3198932" y="4024319"/>
+            <a:ext cx="1751378" cy="860200"/>
+          </a:xfrm>
+          <a:prstGeom prst="rect">
+            <a:avLst/>
+          </a:prstGeom>
+        </p:spPr>
+        <p:style>
+          <a:lnRef idx="2">
+            <a:schemeClr val="accent1">
+              <a:shade val="15000"/>
+            </a:schemeClr>
+          </a:lnRef>
+          <a:fillRef idx="1">
+            <a:schemeClr val="accent1"/>
+          </a:fillRef>
+          <a:effectRef idx="0">
+            <a:schemeClr val="accent1"/>
+          </a:effectRef>
+          <a:fontRef idx="minor">
+            <a:schemeClr val="lt1"/>
+          </a:fontRef>
+        </p:style>
+        <p:txBody>
+          <a:bodyPr rtlCol="0" anchor="ctr"/>
+          <a:lstStyle/>
+          <a:p>
+            <a:pPr algn="ctr"/>
+            <a:r>
+              <a:rPr lang="en-US" altLang="ko-KR"/>
+              <a:t>Isolator</a:t>
+            </a:r>
+          </a:p>
+          <a:p>
+            <a:pPr algn="ctr"/>
+            <a:r>
+              <a:rPr lang="en-US" altLang="ko-KR"/>
+              <a:t>2-&gt;2</a:t>
+            </a:r>
+          </a:p>
+          <a:p>
+            <a:pPr algn="ctr"/>
+            <a:r>
+              <a:rPr lang="en-US" altLang="ko-KR"/>
+              <a:t>(SI8620BC-B-IS)</a:t>
+            </a:r>
+            <a:endParaRPr lang="ko-KR" altLang="en-US"/>
+          </a:p>
+        </p:txBody>
+      </p:sp>
+      <p:sp>
+        <p:nvSpPr>
+          <p:cNvPr id="28" name="직사각형 27">
+            <a:extLst>
+              <a:ext uri="{FF2B5EF4-FFF2-40B4-BE49-F238E27FC236}">
+                <a16:creationId xmlns:a16="http://schemas.microsoft.com/office/drawing/2014/main" id="{552281ED-A2F1-1CEB-670C-F89A058C8BEA}"/>
+              </a:ext>
+            </a:extLst>
+          </p:cNvPr>
+          <p:cNvSpPr/>
+          <p:nvPr/>
+        </p:nvSpPr>
+        <p:spPr>
+          <a:xfrm>
+            <a:off x="3198932" y="5016981"/>
+            <a:ext cx="1751378" cy="860200"/>
+          </a:xfrm>
+          <a:prstGeom prst="rect">
+            <a:avLst/>
+          </a:prstGeom>
+        </p:spPr>
+        <p:style>
+          <a:lnRef idx="2">
+            <a:schemeClr val="accent1">
+              <a:shade val="15000"/>
+            </a:schemeClr>
+          </a:lnRef>
+          <a:fillRef idx="1">
+            <a:schemeClr val="accent1"/>
+          </a:fillRef>
+          <a:effectRef idx="0">
+            <a:schemeClr val="accent1"/>
+          </a:effectRef>
+          <a:fontRef idx="minor">
+            <a:schemeClr val="lt1"/>
+          </a:fontRef>
+        </p:style>
+        <p:txBody>
+          <a:bodyPr rtlCol="0" anchor="ctr"/>
+          <a:lstStyle/>
+          <a:p>
+            <a:pPr algn="ctr"/>
+            <a:r>
+              <a:rPr lang="en-US" altLang="ko-KR"/>
+              <a:t>Isolator</a:t>
+            </a:r>
+          </a:p>
+          <a:p>
+            <a:pPr algn="ctr"/>
+            <a:r>
+              <a:rPr lang="en-US" altLang="ko-KR"/>
+              <a:t>2&lt;-2</a:t>
+            </a:r>
+          </a:p>
+          <a:p>
+            <a:pPr algn="ctr"/>
+            <a:r>
+              <a:rPr lang="en-US" altLang="ko-KR"/>
+              <a:t>(SI8620BC-B-IS)</a:t>
+            </a:r>
+            <a:endParaRPr lang="ko-KR" altLang="en-US"/>
+          </a:p>
+        </p:txBody>
+      </p:sp>
+      <p:sp>
+        <p:nvSpPr>
+          <p:cNvPr id="29" name="직사각형 28">
+            <a:extLst>
+              <a:ext uri="{FF2B5EF4-FFF2-40B4-BE49-F238E27FC236}">
+                <a16:creationId xmlns:a16="http://schemas.microsoft.com/office/drawing/2014/main" id="{F9B0EB72-DFA2-831C-AF86-B8EC617CA0B2}"/>
+              </a:ext>
+            </a:extLst>
+          </p:cNvPr>
+          <p:cNvSpPr/>
+          <p:nvPr/>
+        </p:nvSpPr>
+        <p:spPr>
+          <a:xfrm>
+            <a:off x="3198932" y="6005692"/>
+            <a:ext cx="1751378" cy="860200"/>
+          </a:xfrm>
+          <a:prstGeom prst="rect">
+            <a:avLst/>
+          </a:prstGeom>
+        </p:spPr>
+        <p:style>
+          <a:lnRef idx="2">
+            <a:schemeClr val="accent1">
+              <a:shade val="15000"/>
+            </a:schemeClr>
+          </a:lnRef>
+          <a:fillRef idx="1">
+            <a:schemeClr val="accent1"/>
+          </a:fillRef>
+          <a:effectRef idx="0">
+            <a:schemeClr val="accent1"/>
+          </a:effectRef>
+          <a:fontRef idx="minor">
+            <a:schemeClr val="lt1"/>
+          </a:fontRef>
+        </p:style>
+        <p:txBody>
+          <a:bodyPr rtlCol="0" anchor="ctr"/>
+          <a:lstStyle/>
+          <a:p>
+            <a:pPr algn="ctr"/>
+            <a:r>
+              <a:rPr lang="en-US" altLang="ko-KR"/>
+              <a:t>Isolator</a:t>
+            </a:r>
+          </a:p>
+          <a:p>
+            <a:pPr algn="ctr"/>
+            <a:r>
+              <a:rPr lang="en-US" altLang="ko-KR"/>
+              <a:t>2&lt;-2</a:t>
+            </a:r>
+          </a:p>
+          <a:p>
+            <a:pPr algn="ctr"/>
+            <a:r>
+              <a:rPr lang="en-US" altLang="ko-KR"/>
+              <a:t>(SI8620BC-B-IS)</a:t>
+            </a:r>
+            <a:endParaRPr lang="ko-KR" altLang="en-US"/>
+          </a:p>
+        </p:txBody>
+      </p:sp>
+      <p:cxnSp>
+        <p:nvCxnSpPr>
+          <p:cNvPr id="32" name="연결선: 꺾임 31">
+            <a:extLst>
+              <a:ext uri="{FF2B5EF4-FFF2-40B4-BE49-F238E27FC236}">
+                <a16:creationId xmlns:a16="http://schemas.microsoft.com/office/drawing/2014/main" id="{027E0520-EBA4-FC33-538E-18DB78416316}"/>
+              </a:ext>
+            </a:extLst>
+          </p:cNvPr>
+          <p:cNvCxnSpPr>
+            <a:cxnSpLocks/>
+            <a:stCxn id="26" idx="3"/>
+            <a:endCxn id="15" idx="2"/>
+          </p:cNvCxnSpPr>
+          <p:nvPr/>
+        </p:nvCxnSpPr>
+        <p:spPr>
+          <a:xfrm flipV="1">
+            <a:off x="4950310" y="2789498"/>
+            <a:ext cx="524512" cy="1664921"/>
+          </a:xfrm>
+          <a:prstGeom prst="bentConnector2">
+            <a:avLst/>
+          </a:prstGeom>
+        </p:spPr>
+        <p:style>
+          <a:lnRef idx="1">
+            <a:schemeClr val="accent1"/>
+          </a:lnRef>
+          <a:fillRef idx="0">
+            <a:schemeClr val="accent1"/>
+          </a:fillRef>
+          <a:effectRef idx="0">
+            <a:schemeClr val="accent1"/>
+          </a:effectRef>
+          <a:fontRef idx="minor">
+            <a:schemeClr val="tx1"/>
+          </a:fontRef>
+        </p:style>
+      </p:cxnSp>
+      <p:cxnSp>
+        <p:nvCxnSpPr>
+          <p:cNvPr id="37" name="연결선: 꺾임 36">
+            <a:extLst>
+              <a:ext uri="{FF2B5EF4-FFF2-40B4-BE49-F238E27FC236}">
+                <a16:creationId xmlns:a16="http://schemas.microsoft.com/office/drawing/2014/main" id="{07580EDA-79E2-C9CB-3187-C3B882D27473}"/>
+              </a:ext>
+            </a:extLst>
+          </p:cNvPr>
+          <p:cNvCxnSpPr>
+            <a:cxnSpLocks/>
+            <a:stCxn id="28" idx="3"/>
+            <a:endCxn id="15" idx="2"/>
+          </p:cNvCxnSpPr>
+          <p:nvPr/>
+        </p:nvCxnSpPr>
+        <p:spPr>
+          <a:xfrm flipV="1">
+            <a:off x="4950310" y="2789498"/>
+            <a:ext cx="524512" cy="2657583"/>
+          </a:xfrm>
+          <a:prstGeom prst="bentConnector2">
+            <a:avLst/>
+          </a:prstGeom>
+        </p:spPr>
+        <p:style>
+          <a:lnRef idx="1">
+            <a:schemeClr val="accent1"/>
+          </a:lnRef>
+          <a:fillRef idx="0">
+            <a:schemeClr val="accent1"/>
+          </a:fillRef>
+          <a:effectRef idx="0">
+            <a:schemeClr val="accent1"/>
+          </a:effectRef>
+          <a:fontRef idx="minor">
+            <a:schemeClr val="tx1"/>
+          </a:fontRef>
+        </p:style>
+      </p:cxnSp>
+      <p:sp>
+        <p:nvSpPr>
+          <p:cNvPr id="40" name="직사각형 39">
+            <a:extLst>
+              <a:ext uri="{FF2B5EF4-FFF2-40B4-BE49-F238E27FC236}">
+                <a16:creationId xmlns:a16="http://schemas.microsoft.com/office/drawing/2014/main" id="{F1A393F2-F9FA-039F-D48C-B271A7F6C212}"/>
+              </a:ext>
+            </a:extLst>
+          </p:cNvPr>
+          <p:cNvSpPr/>
+          <p:nvPr/>
+        </p:nvSpPr>
+        <p:spPr>
+          <a:xfrm>
+            <a:off x="5694743" y="4838217"/>
+            <a:ext cx="1504710" cy="1785238"/>
+          </a:xfrm>
+          <a:prstGeom prst="rect">
+            <a:avLst/>
+          </a:prstGeom>
+        </p:spPr>
+        <p:style>
+          <a:lnRef idx="2">
+            <a:schemeClr val="accent1">
+              <a:shade val="15000"/>
+            </a:schemeClr>
+          </a:lnRef>
+          <a:fillRef idx="1">
+            <a:schemeClr val="accent1"/>
+          </a:fillRef>
+          <a:effectRef idx="0">
+            <a:schemeClr val="accent1"/>
+          </a:effectRef>
+          <a:fontRef idx="minor">
+            <a:schemeClr val="lt1"/>
+          </a:fontRef>
+        </p:style>
+        <p:txBody>
+          <a:bodyPr rtlCol="0" anchor="ctr"/>
+          <a:lstStyle/>
+          <a:p>
+            <a:pPr algn="ctr"/>
+            <a:r>
+              <a:rPr lang="en-US" altLang="ko-KR"/>
+              <a:t>Transciever</a:t>
+            </a:r>
+          </a:p>
+          <a:p>
+            <a:pPr algn="ctr"/>
+            <a:r>
+              <a:rPr lang="en-US" altLang="ko-KR"/>
+              <a:t>2&lt;-&gt;2</a:t>
+            </a:r>
+          </a:p>
+          <a:p>
+            <a:pPr algn="ctr"/>
+            <a:r>
+              <a:rPr lang="en-US" altLang="ko-KR"/>
+              <a:t>(74LVCH2T45DC-Q100H)</a:t>
+            </a:r>
+            <a:endParaRPr lang="ko-KR" altLang="en-US"/>
+          </a:p>
+        </p:txBody>
+      </p:sp>
+      <p:sp>
+        <p:nvSpPr>
+          <p:cNvPr id="47" name="직사각형 46">
+            <a:extLst>
+              <a:ext uri="{FF2B5EF4-FFF2-40B4-BE49-F238E27FC236}">
+                <a16:creationId xmlns:a16="http://schemas.microsoft.com/office/drawing/2014/main" id="{DDF47B13-403E-1F4E-8500-B50036A3172B}"/>
+              </a:ext>
+            </a:extLst>
+          </p:cNvPr>
+          <p:cNvSpPr/>
+          <p:nvPr/>
+        </p:nvSpPr>
+        <p:spPr>
+          <a:xfrm>
+            <a:off x="7594395" y="5745461"/>
+            <a:ext cx="1280514" cy="778240"/>
+          </a:xfrm>
+          <a:prstGeom prst="rect">
+            <a:avLst/>
+          </a:prstGeom>
+        </p:spPr>
+        <p:style>
+          <a:lnRef idx="2">
+            <a:schemeClr val="accent1">
+              <a:shade val="15000"/>
+            </a:schemeClr>
+          </a:lnRef>
+          <a:fillRef idx="1">
+            <a:schemeClr val="accent1"/>
+          </a:fillRef>
+          <a:effectRef idx="0">
+            <a:schemeClr val="accent1"/>
+          </a:effectRef>
+          <a:fontRef idx="minor">
+            <a:schemeClr val="lt1"/>
+          </a:fontRef>
+        </p:style>
+        <p:txBody>
+          <a:bodyPr rtlCol="0" anchor="ctr"/>
+          <a:lstStyle/>
+          <a:p>
+            <a:pPr algn="ctr"/>
+            <a:r>
+              <a:rPr lang="en-US" altLang="ko-KR"/>
+              <a:t>Invertor</a:t>
+            </a:r>
+          </a:p>
+          <a:p>
+            <a:pPr algn="ctr"/>
+            <a:r>
+              <a:rPr lang="en-US" altLang="ko-KR"/>
+              <a:t>(NLVHC1G14DFT1G)</a:t>
+            </a:r>
+            <a:endParaRPr lang="ko-KR" altLang="en-US"/>
+          </a:p>
+        </p:txBody>
+      </p:sp>
+      <p:sp>
+        <p:nvSpPr>
+          <p:cNvPr id="49" name="직사각형 48">
+            <a:extLst>
+              <a:ext uri="{FF2B5EF4-FFF2-40B4-BE49-F238E27FC236}">
+                <a16:creationId xmlns:a16="http://schemas.microsoft.com/office/drawing/2014/main" id="{BB3FB795-B72C-C3AB-84CE-893D362E6F06}"/>
+              </a:ext>
+            </a:extLst>
+          </p:cNvPr>
+          <p:cNvSpPr/>
+          <p:nvPr/>
+        </p:nvSpPr>
+        <p:spPr>
+          <a:xfrm>
+            <a:off x="10310261" y="-11252"/>
+            <a:ext cx="1881739" cy="769715"/>
+          </a:xfrm>
+          <a:prstGeom prst="rect">
+            <a:avLst/>
+          </a:prstGeom>
+        </p:spPr>
+        <p:style>
+          <a:lnRef idx="2">
+            <a:schemeClr val="accent1">
+              <a:shade val="15000"/>
+            </a:schemeClr>
+          </a:lnRef>
+          <a:fillRef idx="1">
+            <a:schemeClr val="accent1"/>
+          </a:fillRef>
+          <a:effectRef idx="0">
+            <a:schemeClr val="accent1"/>
+          </a:effectRef>
+          <a:fontRef idx="minor">
+            <a:schemeClr val="lt1"/>
+          </a:fontRef>
+        </p:style>
+        <p:txBody>
+          <a:bodyPr rtlCol="0" anchor="ctr"/>
+          <a:lstStyle/>
+          <a:p>
+            <a:pPr algn="ctr"/>
+            <a:r>
+              <a:rPr lang="en-US" altLang="ko-KR"/>
+              <a:t>EXT PWR PIN</a:t>
+            </a:r>
+          </a:p>
+          <a:p>
+            <a:pPr algn="ctr"/>
+            <a:r>
+              <a:rPr lang="en-US" altLang="ko-KR"/>
+              <a:t>(462071104)</a:t>
+            </a:r>
+            <a:endParaRPr lang="ko-KR" altLang="en-US"/>
+          </a:p>
+        </p:txBody>
+      </p:sp>
+      <p:cxnSp>
+        <p:nvCxnSpPr>
+          <p:cNvPr id="14" name="직선 연결선 13">
+            <a:extLst>
+              <a:ext uri="{FF2B5EF4-FFF2-40B4-BE49-F238E27FC236}">
+                <a16:creationId xmlns:a16="http://schemas.microsoft.com/office/drawing/2014/main" id="{DED6AF49-8900-1FC6-E1AE-C3BAEC916655}"/>
+              </a:ext>
+            </a:extLst>
+          </p:cNvPr>
+          <p:cNvCxnSpPr/>
+          <p:nvPr/>
+        </p:nvCxnSpPr>
+        <p:spPr>
+          <a:xfrm>
+            <a:off x="3769693" y="196770"/>
+            <a:ext cx="0" cy="6661230"/>
+          </a:xfrm>
+          <a:prstGeom prst="line">
+            <a:avLst/>
+          </a:prstGeom>
+          <a:ln w="19050">
+            <a:solidFill>
+              <a:srgbClr val="FF0000"/>
+            </a:solidFill>
+            <a:prstDash val="lgDash"/>
+          </a:ln>
+        </p:spPr>
+        <p:style>
+          <a:lnRef idx="1">
+            <a:schemeClr val="dk1"/>
+          </a:lnRef>
+          <a:fillRef idx="0">
+            <a:schemeClr val="dk1"/>
+          </a:fillRef>
+          <a:effectRef idx="0">
+            <a:schemeClr val="dk1"/>
+          </a:effectRef>
+          <a:fontRef idx="minor">
+            <a:schemeClr val="tx1"/>
+          </a:fontRef>
+        </p:style>
+      </p:cxnSp>
+      <p:sp>
+        <p:nvSpPr>
+          <p:cNvPr id="50" name="직사각형 49">
+            <a:extLst>
+              <a:ext uri="{FF2B5EF4-FFF2-40B4-BE49-F238E27FC236}">
+                <a16:creationId xmlns:a16="http://schemas.microsoft.com/office/drawing/2014/main" id="{2F6F67B9-F4E3-DC45-634C-5A1D8BBC2C26}"/>
+              </a:ext>
+            </a:extLst>
+          </p:cNvPr>
+          <p:cNvSpPr/>
+          <p:nvPr/>
+        </p:nvSpPr>
+        <p:spPr>
+          <a:xfrm>
+            <a:off x="9560689" y="866575"/>
+            <a:ext cx="2631311" cy="769715"/>
+          </a:xfrm>
+          <a:prstGeom prst="rect">
+            <a:avLst/>
+          </a:prstGeom>
+        </p:spPr>
+        <p:style>
+          <a:lnRef idx="2">
+            <a:schemeClr val="accent1">
+              <a:shade val="15000"/>
+            </a:schemeClr>
+          </a:lnRef>
+          <a:fillRef idx="1">
+            <a:schemeClr val="accent1"/>
+          </a:fillRef>
+          <a:effectRef idx="0">
+            <a:schemeClr val="accent1"/>
+          </a:effectRef>
+          <a:fontRef idx="minor">
+            <a:schemeClr val="lt1"/>
+          </a:fontRef>
+        </p:style>
+        <p:txBody>
+          <a:bodyPr rtlCol="0" anchor="ctr"/>
+          <a:lstStyle/>
+          <a:p>
+            <a:pPr algn="ctr"/>
+            <a:r>
+              <a:rPr lang="en-US" altLang="ko-KR"/>
+              <a:t>12V0 ESD</a:t>
+            </a:r>
+          </a:p>
+          <a:p>
+            <a:pPr algn="ctr"/>
+            <a:r>
+              <a:rPr lang="en-US" altLang="ko-KR"/>
+              <a:t>(PE3212M1Q-1876672)</a:t>
+            </a:r>
+            <a:endParaRPr lang="ko-KR" altLang="en-US"/>
+          </a:p>
+        </p:txBody>
+      </p:sp>
+      <p:sp>
+        <p:nvSpPr>
+          <p:cNvPr id="4" name="TextBox 3">
+            <a:extLst>
+              <a:ext uri="{FF2B5EF4-FFF2-40B4-BE49-F238E27FC236}">
+                <a16:creationId xmlns:a16="http://schemas.microsoft.com/office/drawing/2014/main" id="{51106236-ED71-D394-2569-7EA1FCA90113}"/>
+              </a:ext>
+            </a:extLst>
+          </p:cNvPr>
+          <p:cNvSpPr txBox="1"/>
+          <p:nvPr/>
+        </p:nvSpPr>
+        <p:spPr>
+          <a:xfrm>
+            <a:off x="2714496" y="1796836"/>
+            <a:ext cx="2078005" cy="646331"/>
+          </a:xfrm>
+          <a:prstGeom prst="rect">
+            <a:avLst/>
+          </a:prstGeom>
+          <a:noFill/>
+        </p:spPr>
+        <p:txBody>
+          <a:bodyPr wrap="none" rtlCol="0">
+            <a:spAutoFit/>
+          </a:bodyPr>
+          <a:lstStyle/>
+          <a:p>
+            <a:r>
+              <a:rPr lang="en-US" altLang="ko-KR"/>
+              <a:t>2.2+5.3+3.1+8.8</a:t>
+            </a:r>
+          </a:p>
+          <a:p>
+            <a:r>
+              <a:rPr lang="en-US" altLang="ko-KR"/>
+              <a:t>=19.4mA, 150mW</a:t>
+            </a:r>
+            <a:endParaRPr lang="ko-KR" altLang="en-US"/>
+          </a:p>
+        </p:txBody>
+      </p:sp>
+      <p:sp>
+        <p:nvSpPr>
+          <p:cNvPr id="21" name="TextBox 20">
+            <a:extLst>
+              <a:ext uri="{FF2B5EF4-FFF2-40B4-BE49-F238E27FC236}">
+                <a16:creationId xmlns:a16="http://schemas.microsoft.com/office/drawing/2014/main" id="{2E23F7EC-B0A5-D556-ADC8-F9DAB6BDA2B7}"/>
+              </a:ext>
+            </a:extLst>
+          </p:cNvPr>
+          <p:cNvSpPr txBox="1"/>
+          <p:nvPr/>
+        </p:nvSpPr>
+        <p:spPr>
+          <a:xfrm>
+            <a:off x="7302249" y="2897218"/>
+            <a:ext cx="1864806" cy="369332"/>
+          </a:xfrm>
+          <a:prstGeom prst="rect">
+            <a:avLst/>
+          </a:prstGeom>
+          <a:noFill/>
+        </p:spPr>
+        <p:txBody>
+          <a:bodyPr wrap="none" rtlCol="0">
+            <a:spAutoFit/>
+          </a:bodyPr>
+          <a:lstStyle/>
+          <a:p>
+            <a:r>
+              <a:rPr lang="en-US" altLang="ko-KR"/>
+              <a:t>100mA, 250mW</a:t>
+            </a:r>
+            <a:endParaRPr lang="ko-KR" altLang="en-US"/>
+          </a:p>
+        </p:txBody>
+      </p:sp>
+      <p:sp>
+        <p:nvSpPr>
+          <p:cNvPr id="10" name="직사각형 9">
+            <a:extLst>
+              <a:ext uri="{FF2B5EF4-FFF2-40B4-BE49-F238E27FC236}">
+                <a16:creationId xmlns:a16="http://schemas.microsoft.com/office/drawing/2014/main" id="{9C9F58A9-7071-6AEB-8A03-76955F79E2B6}"/>
+              </a:ext>
+            </a:extLst>
+          </p:cNvPr>
+          <p:cNvSpPr/>
+          <p:nvPr/>
+        </p:nvSpPr>
+        <p:spPr>
+          <a:xfrm>
+            <a:off x="1270000" y="1739900"/>
+            <a:ext cx="10797141" cy="5125992"/>
+          </a:xfrm>
+          <a:prstGeom prst="rect">
+            <a:avLst/>
+          </a:prstGeom>
+          <a:noFill/>
+          <a:ln w="38100">
+            <a:solidFill>
+              <a:schemeClr val="tx1"/>
+            </a:solidFill>
+            <a:prstDash val="lgDash"/>
+          </a:ln>
+        </p:spPr>
+        <p:style>
+          <a:lnRef idx="2">
+            <a:schemeClr val="accent1">
+              <a:shade val="15000"/>
+            </a:schemeClr>
+          </a:lnRef>
+          <a:fillRef idx="1">
+            <a:schemeClr val="accent1"/>
+          </a:fillRef>
+          <a:effectRef idx="0">
+            <a:schemeClr val="accent1"/>
+          </a:effectRef>
+          <a:fontRef idx="minor">
+            <a:schemeClr val="lt1"/>
+          </a:fontRef>
+        </p:style>
+        <p:txBody>
+          <a:bodyPr rtlCol="0" anchor="ctr"/>
+          <a:lstStyle/>
+          <a:p>
+            <a:pPr algn="ctr"/>
+            <a:endParaRPr lang="ko-KR" altLang="en-US"/>
+          </a:p>
+        </p:txBody>
+      </p:sp>
+      <p:sp>
+        <p:nvSpPr>
+          <p:cNvPr id="17" name="TextBox 16">
+            <a:extLst>
+              <a:ext uri="{FF2B5EF4-FFF2-40B4-BE49-F238E27FC236}">
+                <a16:creationId xmlns:a16="http://schemas.microsoft.com/office/drawing/2014/main" id="{F9F28159-6A97-D866-A6B5-24952333CC68}"/>
+              </a:ext>
+            </a:extLst>
+          </p:cNvPr>
+          <p:cNvSpPr txBox="1"/>
+          <p:nvPr/>
+        </p:nvSpPr>
+        <p:spPr>
+          <a:xfrm>
+            <a:off x="8718115" y="1163348"/>
+            <a:ext cx="450764" cy="369332"/>
+          </a:xfrm>
+          <a:prstGeom prst="rect">
+            <a:avLst/>
+          </a:prstGeom>
+          <a:noFill/>
+        </p:spPr>
+        <p:txBody>
+          <a:bodyPr wrap="none" rtlCol="0">
+            <a:spAutoFit/>
+          </a:bodyPr>
+          <a:lstStyle/>
+          <a:p>
+            <a:r>
+              <a:rPr lang="en-US" altLang="ko-KR"/>
+              <a:t>X2</a:t>
+            </a:r>
+            <a:endParaRPr lang="ko-KR" altLang="en-US"/>
+          </a:p>
+        </p:txBody>
+      </p:sp>
+      <p:sp>
+        <p:nvSpPr>
+          <p:cNvPr id="22" name="직사각형 21">
+            <a:extLst>
+              <a:ext uri="{FF2B5EF4-FFF2-40B4-BE49-F238E27FC236}">
+                <a16:creationId xmlns:a16="http://schemas.microsoft.com/office/drawing/2014/main" id="{5DD3BBA9-F9B3-37AA-36C0-B73637D55E09}"/>
+              </a:ext>
+            </a:extLst>
+          </p:cNvPr>
+          <p:cNvSpPr/>
+          <p:nvPr/>
+        </p:nvSpPr>
+        <p:spPr>
+          <a:xfrm>
+            <a:off x="4907238" y="862314"/>
+            <a:ext cx="1713055" cy="769715"/>
+          </a:xfrm>
+          <a:prstGeom prst="rect">
+            <a:avLst/>
+          </a:prstGeom>
+        </p:spPr>
+        <p:style>
+          <a:lnRef idx="2">
+            <a:schemeClr val="accent1">
+              <a:shade val="15000"/>
+            </a:schemeClr>
+          </a:lnRef>
+          <a:fillRef idx="1">
+            <a:schemeClr val="accent1"/>
+          </a:fillRef>
+          <a:effectRef idx="0">
+            <a:schemeClr val="accent1"/>
+          </a:effectRef>
+          <a:fontRef idx="minor">
+            <a:schemeClr val="lt1"/>
+          </a:fontRef>
+        </p:style>
+        <p:txBody>
+          <a:bodyPr rtlCol="0" anchor="ctr"/>
+          <a:lstStyle/>
+          <a:p>
+            <a:pPr algn="ctr"/>
+            <a:r>
+              <a:rPr lang="en-US" altLang="ko-KR"/>
+              <a:t>LED</a:t>
+            </a:r>
+            <a:r>
+              <a:rPr lang="ko-KR" altLang="en-US"/>
+              <a:t> </a:t>
+            </a:r>
+            <a:r>
+              <a:rPr lang="en-US" altLang="ko-KR"/>
+              <a:t>Diode</a:t>
+            </a:r>
+          </a:p>
+          <a:p>
+            <a:pPr algn="ctr"/>
+            <a:r>
+              <a:rPr lang="en-US" altLang="ko-KR"/>
+              <a:t>(598-8260-107F)</a:t>
+            </a:r>
+            <a:endParaRPr lang="ko-KR" altLang="en-US"/>
+          </a:p>
+        </p:txBody>
+      </p:sp>
+      <p:sp>
+        <p:nvSpPr>
+          <p:cNvPr id="7" name="TextBox 6">
+            <a:extLst>
+              <a:ext uri="{FF2B5EF4-FFF2-40B4-BE49-F238E27FC236}">
+                <a16:creationId xmlns:a16="http://schemas.microsoft.com/office/drawing/2014/main" id="{CB25DB59-3945-90EC-E789-0AA2A6AB27B8}"/>
+              </a:ext>
+            </a:extLst>
+          </p:cNvPr>
+          <p:cNvSpPr txBox="1"/>
+          <p:nvPr/>
+        </p:nvSpPr>
+        <p:spPr>
+          <a:xfrm>
+            <a:off x="1663156" y="2359398"/>
+            <a:ext cx="1751377" cy="369332"/>
+          </a:xfrm>
+          <a:prstGeom prst="rect">
+            <a:avLst/>
+          </a:prstGeom>
+          <a:noFill/>
+        </p:spPr>
+        <p:txBody>
+          <a:bodyPr wrap="none" rtlCol="0">
+            <a:spAutoFit/>
+          </a:bodyPr>
+          <a:lstStyle/>
+          <a:p>
+            <a:r>
+              <a:rPr lang="en-US" altLang="ko-KR">
+                <a:solidFill>
+                  <a:srgbClr val="374151"/>
+                </a:solidFill>
+                <a:latin typeface="Söhne"/>
+              </a:rPr>
+              <a:t>Ground</a:t>
+            </a:r>
+            <a:r>
+              <a:rPr lang="ko-KR" altLang="en-US">
+                <a:solidFill>
+                  <a:srgbClr val="374151"/>
+                </a:solidFill>
+                <a:latin typeface="Söhne"/>
+              </a:rPr>
+              <a:t> </a:t>
+            </a:r>
+            <a:r>
+              <a:rPr lang="en-US" altLang="ko-KR">
+                <a:solidFill>
+                  <a:srgbClr val="374151"/>
+                </a:solidFill>
+                <a:latin typeface="Söhne"/>
+              </a:rPr>
+              <a:t>Isolation</a:t>
+            </a:r>
+            <a:endParaRPr lang="ko-KR" altLang="en-US"/>
+          </a:p>
+        </p:txBody>
+      </p:sp>
+      <p:sp>
+        <p:nvSpPr>
+          <p:cNvPr id="19" name="TextBox 18">
+            <a:extLst>
+              <a:ext uri="{FF2B5EF4-FFF2-40B4-BE49-F238E27FC236}">
+                <a16:creationId xmlns:a16="http://schemas.microsoft.com/office/drawing/2014/main" id="{52CF48B3-F9AE-158E-543A-94636BC1277B}"/>
+              </a:ext>
+            </a:extLst>
+          </p:cNvPr>
+          <p:cNvSpPr txBox="1"/>
+          <p:nvPr/>
+        </p:nvSpPr>
+        <p:spPr>
+          <a:xfrm>
+            <a:off x="98060" y="124722"/>
+            <a:ext cx="1146468" cy="369332"/>
+          </a:xfrm>
+          <a:prstGeom prst="rect">
+            <a:avLst/>
+          </a:prstGeom>
+          <a:noFill/>
+        </p:spPr>
+        <p:txBody>
+          <a:bodyPr wrap="none" rtlCol="0">
+            <a:spAutoFit/>
+          </a:bodyPr>
+          <a:lstStyle/>
+          <a:p>
+            <a:r>
+              <a:rPr lang="en-US" altLang="ko-KR"/>
+              <a:t>Only 3V3</a:t>
+            </a:r>
+            <a:endParaRPr lang="ko-KR" altLang="en-US"/>
+          </a:p>
+        </p:txBody>
+      </p:sp>
+      <p:sp>
+        <p:nvSpPr>
+          <p:cNvPr id="35" name="직사각형 34">
+            <a:extLst>
+              <a:ext uri="{FF2B5EF4-FFF2-40B4-BE49-F238E27FC236}">
+                <a16:creationId xmlns:a16="http://schemas.microsoft.com/office/drawing/2014/main" id="{3173DAA2-BCDA-FBD0-2FA8-504600BA5D6F}"/>
+              </a:ext>
+            </a:extLst>
+          </p:cNvPr>
+          <p:cNvSpPr/>
+          <p:nvPr/>
+        </p:nvSpPr>
+        <p:spPr>
+          <a:xfrm>
+            <a:off x="9960088" y="2025345"/>
+            <a:ext cx="1713055" cy="769715"/>
+          </a:xfrm>
+          <a:prstGeom prst="rect">
+            <a:avLst/>
+          </a:prstGeom>
+        </p:spPr>
+        <p:style>
+          <a:lnRef idx="2">
+            <a:schemeClr val="accent1">
+              <a:shade val="15000"/>
+            </a:schemeClr>
+          </a:lnRef>
+          <a:fillRef idx="1">
+            <a:schemeClr val="accent1"/>
+          </a:fillRef>
+          <a:effectRef idx="0">
+            <a:schemeClr val="accent1"/>
+          </a:effectRef>
+          <a:fontRef idx="minor">
+            <a:schemeClr val="lt1"/>
+          </a:fontRef>
+        </p:style>
+        <p:txBody>
+          <a:bodyPr rtlCol="0" anchor="ctr"/>
+          <a:lstStyle/>
+          <a:p>
+            <a:pPr algn="ctr"/>
+            <a:r>
+              <a:rPr lang="en-US" altLang="ko-KR"/>
+              <a:t>3V3 ESD</a:t>
+            </a:r>
+          </a:p>
+          <a:p>
+            <a:pPr algn="ctr"/>
+            <a:r>
+              <a:rPr lang="en-US" altLang="ko-KR"/>
+              <a:t>(UCLAMP3301H.TCT)</a:t>
+            </a:r>
+            <a:endParaRPr lang="ko-KR" altLang="en-US"/>
+          </a:p>
+        </p:txBody>
+      </p:sp>
+      <p:sp>
+        <p:nvSpPr>
+          <p:cNvPr id="60" name="TextBox 59">
+            <a:extLst>
+              <a:ext uri="{FF2B5EF4-FFF2-40B4-BE49-F238E27FC236}">
+                <a16:creationId xmlns:a16="http://schemas.microsoft.com/office/drawing/2014/main" id="{CDE0E970-D2B4-56D7-6BBE-565BDCD052E9}"/>
+              </a:ext>
+            </a:extLst>
+          </p:cNvPr>
+          <p:cNvSpPr txBox="1"/>
+          <p:nvPr/>
+        </p:nvSpPr>
+        <p:spPr>
+          <a:xfrm>
+            <a:off x="7404224" y="4368652"/>
+            <a:ext cx="952505" cy="369332"/>
+          </a:xfrm>
+          <a:prstGeom prst="rect">
+            <a:avLst/>
+          </a:prstGeom>
+          <a:noFill/>
+        </p:spPr>
+        <p:txBody>
+          <a:bodyPr wrap="none" rtlCol="0">
+            <a:spAutoFit/>
+          </a:bodyPr>
+          <a:lstStyle/>
+          <a:p>
+            <a:r>
+              <a:rPr lang="en-US" altLang="ko-KR"/>
+              <a:t>50Ohm</a:t>
+            </a:r>
+            <a:endParaRPr lang="ko-KR" altLang="en-US"/>
+          </a:p>
+        </p:txBody>
+      </p:sp>
+      <p:sp>
+        <p:nvSpPr>
+          <p:cNvPr id="68" name="직사각형 67">
+            <a:extLst>
+              <a:ext uri="{FF2B5EF4-FFF2-40B4-BE49-F238E27FC236}">
+                <a16:creationId xmlns:a16="http://schemas.microsoft.com/office/drawing/2014/main" id="{B2BA92BE-91DD-671B-71AA-E42F57409A60}"/>
+              </a:ext>
+            </a:extLst>
+          </p:cNvPr>
+          <p:cNvSpPr/>
+          <p:nvPr/>
+        </p:nvSpPr>
+        <p:spPr>
+          <a:xfrm>
+            <a:off x="1404612" y="4027879"/>
+            <a:ext cx="1689212" cy="860200"/>
+          </a:xfrm>
+          <a:prstGeom prst="rect">
+            <a:avLst/>
+          </a:prstGeom>
+        </p:spPr>
+        <p:style>
+          <a:lnRef idx="2">
+            <a:schemeClr val="accent1">
+              <a:shade val="15000"/>
+            </a:schemeClr>
+          </a:lnRef>
+          <a:fillRef idx="1">
+            <a:schemeClr val="accent1"/>
+          </a:fillRef>
+          <a:effectRef idx="0">
+            <a:schemeClr val="accent1"/>
+          </a:effectRef>
+          <a:fontRef idx="minor">
+            <a:schemeClr val="lt1"/>
+          </a:fontRef>
+        </p:style>
+        <p:txBody>
+          <a:bodyPr rtlCol="0" anchor="ctr"/>
+          <a:lstStyle/>
+          <a:p>
+            <a:pPr algn="ctr"/>
+            <a:r>
+              <a:rPr lang="en-US" altLang="ko-KR"/>
+              <a:t>Digital SPDT</a:t>
+            </a:r>
+          </a:p>
+          <a:p>
+            <a:pPr algn="ctr"/>
+            <a:r>
+              <a:rPr lang="en-US" altLang="ko-KR"/>
+              <a:t>(74LVC1G3157)</a:t>
+            </a:r>
+            <a:endParaRPr lang="ko-KR" altLang="en-US"/>
+          </a:p>
+        </p:txBody>
+      </p:sp>
+      <p:sp>
+        <p:nvSpPr>
+          <p:cNvPr id="69" name="직사각형 68">
+            <a:extLst>
+              <a:ext uri="{FF2B5EF4-FFF2-40B4-BE49-F238E27FC236}">
+                <a16:creationId xmlns:a16="http://schemas.microsoft.com/office/drawing/2014/main" id="{7AAD65F9-CC16-4715-E253-C562EB74C7E5}"/>
+              </a:ext>
+            </a:extLst>
+          </p:cNvPr>
+          <p:cNvSpPr/>
+          <p:nvPr/>
+        </p:nvSpPr>
+        <p:spPr>
+          <a:xfrm>
+            <a:off x="1404612" y="5013840"/>
+            <a:ext cx="1689212" cy="860200"/>
+          </a:xfrm>
+          <a:prstGeom prst="rect">
+            <a:avLst/>
+          </a:prstGeom>
+        </p:spPr>
+        <p:style>
+          <a:lnRef idx="2">
+            <a:schemeClr val="accent1">
+              <a:shade val="15000"/>
+            </a:schemeClr>
+          </a:lnRef>
+          <a:fillRef idx="1">
+            <a:schemeClr val="accent1"/>
+          </a:fillRef>
+          <a:effectRef idx="0">
+            <a:schemeClr val="accent1"/>
+          </a:effectRef>
+          <a:fontRef idx="minor">
+            <a:schemeClr val="lt1"/>
+          </a:fontRef>
+        </p:style>
+        <p:txBody>
+          <a:bodyPr rtlCol="0" anchor="ctr"/>
+          <a:lstStyle/>
+          <a:p>
+            <a:pPr algn="ctr"/>
+            <a:r>
+              <a:rPr lang="en-US" altLang="ko-KR"/>
+              <a:t>Digital SPDT</a:t>
+            </a:r>
+          </a:p>
+          <a:p>
+            <a:pPr algn="ctr"/>
+            <a:r>
+              <a:rPr lang="en-US" altLang="ko-KR"/>
+              <a:t>(74LVC1G3157)</a:t>
+            </a:r>
+            <a:endParaRPr lang="ko-KR" altLang="en-US"/>
+          </a:p>
+        </p:txBody>
+      </p:sp>
+      <p:cxnSp>
+        <p:nvCxnSpPr>
+          <p:cNvPr id="71" name="연결선: 꺾임 70">
+            <a:extLst>
+              <a:ext uri="{FF2B5EF4-FFF2-40B4-BE49-F238E27FC236}">
+                <a16:creationId xmlns:a16="http://schemas.microsoft.com/office/drawing/2014/main" id="{9733FAF6-A6FC-7ECB-54A7-42656A337295}"/>
+              </a:ext>
+            </a:extLst>
+          </p:cNvPr>
+          <p:cNvCxnSpPr>
+            <a:stCxn id="34" idx="1"/>
+            <a:endCxn id="5" idx="1"/>
+          </p:cNvCxnSpPr>
+          <p:nvPr/>
+        </p:nvCxnSpPr>
+        <p:spPr>
+          <a:xfrm rot="5400000" flipH="1" flipV="1">
+            <a:off x="1639667" y="2422426"/>
+            <a:ext cx="513232" cy="2605297"/>
+          </a:xfrm>
+          <a:prstGeom prst="bentConnector2">
+            <a:avLst/>
+          </a:prstGeom>
+          <a:ln>
+            <a:tailEnd type="triangle"/>
+          </a:ln>
+        </p:spPr>
+        <p:style>
+          <a:lnRef idx="1">
+            <a:schemeClr val="accent1"/>
+          </a:lnRef>
+          <a:fillRef idx="0">
+            <a:schemeClr val="accent1"/>
+          </a:fillRef>
+          <a:effectRef idx="0">
+            <a:schemeClr val="accent1"/>
+          </a:effectRef>
+          <a:fontRef idx="minor">
+            <a:schemeClr val="tx1"/>
+          </a:fontRef>
+        </p:style>
+      </p:cxnSp>
+      <p:sp>
+        <p:nvSpPr>
+          <p:cNvPr id="72" name="TextBox 71">
+            <a:extLst>
+              <a:ext uri="{FF2B5EF4-FFF2-40B4-BE49-F238E27FC236}">
+                <a16:creationId xmlns:a16="http://schemas.microsoft.com/office/drawing/2014/main" id="{575F9194-3EBD-9343-DAD6-B39CC4E72CA3}"/>
+              </a:ext>
+            </a:extLst>
+          </p:cNvPr>
+          <p:cNvSpPr txBox="1"/>
+          <p:nvPr/>
+        </p:nvSpPr>
+        <p:spPr>
+          <a:xfrm>
+            <a:off x="593634" y="2989838"/>
+            <a:ext cx="1423723" cy="369332"/>
+          </a:xfrm>
+          <a:prstGeom prst="rect">
+            <a:avLst/>
+          </a:prstGeom>
+          <a:noFill/>
+        </p:spPr>
+        <p:txBody>
+          <a:bodyPr wrap="none" rtlCol="0">
+            <a:spAutoFit/>
+          </a:bodyPr>
+          <a:lstStyle/>
+          <a:p>
+            <a:r>
+              <a:rPr lang="en-US" altLang="ko-KR"/>
+              <a:t>3.3V Source</a:t>
+            </a:r>
+            <a:endParaRPr lang="ko-KR" altLang="en-US"/>
+          </a:p>
+        </p:txBody>
+      </p:sp>
+    </p:spTree>
+    <p:extLst>
+      <p:ext uri="{BB962C8B-B14F-4D97-AF65-F5344CB8AC3E}">
+        <p14:creationId xmlns:p14="http://schemas.microsoft.com/office/powerpoint/2010/main" val="3946522509"/>
+      </p:ext>
+    </p:extLst>
+  </p:cSld>
+  <p:clrMapOvr>
+    <a:masterClrMapping/>
+  </p:clrMapOvr>
+</p:sld>
+</file>
+
+<file path=ppt/slides/slide16.xml><?xml version="1.0" encoding="utf-8"?>
+<p:sld xmlns:a="http://schemas.openxmlformats.org/drawingml/2006/main" xmlns:r="http://schemas.openxmlformats.org/officeDocument/2006/relationships" xmlns:p="http://schemas.openxmlformats.org/presentationml/2006/main">
+  <p:cSld>
+    <p:spTree>
+      <p:nvGrpSpPr>
+        <p:cNvPr id="1" name=""/>
+        <p:cNvGrpSpPr/>
+        <p:nvPr/>
+      </p:nvGrpSpPr>
+      <p:grpSpPr>
+        <a:xfrm>
+          <a:off x="0" y="0"/>
+          <a:ext cx="0" cy="0"/>
+          <a:chOff x="0" y="0"/>
+          <a:chExt cx="0" cy="0"/>
+        </a:xfrm>
+      </p:grpSpPr>
+      <p:sp>
+        <p:nvSpPr>
+          <p:cNvPr id="4" name="TextBox 3">
+            <a:extLst>
+              <a:ext uri="{FF2B5EF4-FFF2-40B4-BE49-F238E27FC236}">
+                <a16:creationId xmlns:a16="http://schemas.microsoft.com/office/drawing/2014/main" id="{15F80D0B-AB5F-CCC0-14ED-60F05CF42A3C}"/>
+              </a:ext>
+            </a:extLst>
+          </p:cNvPr>
+          <p:cNvSpPr txBox="1"/>
+          <p:nvPr/>
+        </p:nvSpPr>
+        <p:spPr>
+          <a:xfrm>
+            <a:off x="98060" y="124722"/>
+            <a:ext cx="1736373" cy="369332"/>
+          </a:xfrm>
+          <a:prstGeom prst="rect">
+            <a:avLst/>
+          </a:prstGeom>
+          <a:noFill/>
+        </p:spPr>
+        <p:txBody>
+          <a:bodyPr wrap="none" rtlCol="0">
+            <a:spAutoFit/>
+          </a:bodyPr>
+          <a:lstStyle/>
+          <a:p>
+            <a:r>
+              <a:rPr lang="en-US" altLang="ko-KR"/>
+              <a:t>SPDT Structure</a:t>
+            </a:r>
+            <a:endParaRPr lang="ko-KR" altLang="en-US"/>
+          </a:p>
+        </p:txBody>
+      </p:sp>
+      <p:sp>
+        <p:nvSpPr>
+          <p:cNvPr id="5" name="직사각형 4">
+            <a:extLst>
+              <a:ext uri="{FF2B5EF4-FFF2-40B4-BE49-F238E27FC236}">
+                <a16:creationId xmlns:a16="http://schemas.microsoft.com/office/drawing/2014/main" id="{39C95B59-D69D-77A3-B2E0-06FFC499600B}"/>
+              </a:ext>
+            </a:extLst>
+          </p:cNvPr>
+          <p:cNvSpPr/>
+          <p:nvPr/>
+        </p:nvSpPr>
+        <p:spPr>
+          <a:xfrm>
+            <a:off x="1720635" y="1469907"/>
+            <a:ext cx="2962576" cy="769715"/>
+          </a:xfrm>
+          <a:prstGeom prst="rect">
+            <a:avLst/>
+          </a:prstGeom>
+        </p:spPr>
+        <p:style>
+          <a:lnRef idx="2">
+            <a:schemeClr val="accent1">
+              <a:shade val="15000"/>
+            </a:schemeClr>
+          </a:lnRef>
+          <a:fillRef idx="1">
+            <a:schemeClr val="accent1"/>
+          </a:fillRef>
+          <a:effectRef idx="0">
+            <a:schemeClr val="accent1"/>
+          </a:effectRef>
+          <a:fontRef idx="minor">
+            <a:schemeClr val="lt1"/>
+          </a:fontRef>
+        </p:style>
+        <p:txBody>
+          <a:bodyPr rtlCol="0" anchor="ctr"/>
+          <a:lstStyle/>
+          <a:p>
+            <a:pPr algn="ctr"/>
+            <a:r>
+              <a:rPr lang="en-US" altLang="ko-KR"/>
+              <a:t>SPDT</a:t>
+            </a:r>
+          </a:p>
+          <a:p>
+            <a:pPr algn="ctr"/>
+            <a:r>
+              <a:rPr lang="en-US" altLang="ko-KR"/>
+              <a:t>(DS04-254-2-04BK-SMT)</a:t>
+            </a:r>
+            <a:endParaRPr lang="ko-KR" altLang="en-US"/>
+          </a:p>
+        </p:txBody>
+      </p:sp>
+      <p:sp>
+        <p:nvSpPr>
+          <p:cNvPr id="6" name="직사각형 5">
+            <a:extLst>
+              <a:ext uri="{FF2B5EF4-FFF2-40B4-BE49-F238E27FC236}">
+                <a16:creationId xmlns:a16="http://schemas.microsoft.com/office/drawing/2014/main" id="{37D7E9E6-3E2A-F863-BAB0-6E5C7ED593F9}"/>
+              </a:ext>
+            </a:extLst>
+          </p:cNvPr>
+          <p:cNvSpPr/>
+          <p:nvPr/>
+        </p:nvSpPr>
+        <p:spPr>
+          <a:xfrm>
+            <a:off x="1720635" y="4157502"/>
+            <a:ext cx="2962576" cy="769715"/>
+          </a:xfrm>
+          <a:prstGeom prst="rect">
+            <a:avLst/>
+          </a:prstGeom>
+        </p:spPr>
+        <p:style>
+          <a:lnRef idx="2">
+            <a:schemeClr val="accent1">
+              <a:shade val="15000"/>
+            </a:schemeClr>
+          </a:lnRef>
+          <a:fillRef idx="1">
+            <a:schemeClr val="accent1"/>
+          </a:fillRef>
+          <a:effectRef idx="0">
+            <a:schemeClr val="accent1"/>
+          </a:effectRef>
+          <a:fontRef idx="minor">
+            <a:schemeClr val="lt1"/>
+          </a:fontRef>
+        </p:style>
+        <p:txBody>
+          <a:bodyPr rtlCol="0" anchor="ctr"/>
+          <a:lstStyle/>
+          <a:p>
+            <a:pPr algn="ctr"/>
+            <a:r>
+              <a:rPr lang="en-US" altLang="ko-KR"/>
+              <a:t>10KOhm</a:t>
+            </a:r>
+            <a:endParaRPr lang="ko-KR" altLang="en-US"/>
+          </a:p>
+        </p:txBody>
+      </p:sp>
+      <p:sp>
+        <p:nvSpPr>
+          <p:cNvPr id="7" name="직사각형 6">
+            <a:extLst>
+              <a:ext uri="{FF2B5EF4-FFF2-40B4-BE49-F238E27FC236}">
+                <a16:creationId xmlns:a16="http://schemas.microsoft.com/office/drawing/2014/main" id="{936755EA-861D-6BC0-F0E7-EA9E5210A486}"/>
+              </a:ext>
+            </a:extLst>
+          </p:cNvPr>
+          <p:cNvSpPr/>
+          <p:nvPr/>
+        </p:nvSpPr>
+        <p:spPr>
+          <a:xfrm>
+            <a:off x="5118743" y="4157502"/>
+            <a:ext cx="2962576" cy="769715"/>
+          </a:xfrm>
+          <a:prstGeom prst="rect">
+            <a:avLst/>
+          </a:prstGeom>
+        </p:spPr>
+        <p:style>
+          <a:lnRef idx="2">
+            <a:schemeClr val="accent1">
+              <a:shade val="15000"/>
+            </a:schemeClr>
+          </a:lnRef>
+          <a:fillRef idx="1">
+            <a:schemeClr val="accent1"/>
+          </a:fillRef>
+          <a:effectRef idx="0">
+            <a:schemeClr val="accent1"/>
+          </a:effectRef>
+          <a:fontRef idx="minor">
+            <a:schemeClr val="lt1"/>
+          </a:fontRef>
+        </p:style>
+        <p:txBody>
+          <a:bodyPr rtlCol="0" anchor="ctr"/>
+          <a:lstStyle/>
+          <a:p>
+            <a:pPr algn="ctr"/>
+            <a:r>
+              <a:rPr lang="en-US" altLang="ko-KR"/>
+              <a:t>100nF</a:t>
+            </a:r>
+          </a:p>
+          <a:p>
+            <a:pPr algn="ctr"/>
+            <a:r>
+              <a:rPr lang="en-US" altLang="ko-KR"/>
+              <a:t>(550Z104MTT)</a:t>
+            </a:r>
+            <a:endParaRPr lang="ko-KR" altLang="en-US"/>
+          </a:p>
+        </p:txBody>
+      </p:sp>
+      <p:sp>
+        <p:nvSpPr>
+          <p:cNvPr id="9" name="직사각형 8">
+            <a:extLst>
+              <a:ext uri="{FF2B5EF4-FFF2-40B4-BE49-F238E27FC236}">
+                <a16:creationId xmlns:a16="http://schemas.microsoft.com/office/drawing/2014/main" id="{3E90B3D0-85AE-72BB-AD09-6B9F1F788F67}"/>
+              </a:ext>
+            </a:extLst>
+          </p:cNvPr>
+          <p:cNvSpPr/>
+          <p:nvPr/>
+        </p:nvSpPr>
+        <p:spPr>
+          <a:xfrm>
+            <a:off x="1270000" y="2508532"/>
+            <a:ext cx="10797141" cy="4357359"/>
+          </a:xfrm>
+          <a:prstGeom prst="rect">
+            <a:avLst/>
+          </a:prstGeom>
+          <a:noFill/>
+          <a:ln w="38100">
+            <a:solidFill>
+              <a:schemeClr val="tx1"/>
+            </a:solidFill>
+            <a:prstDash val="lgDash"/>
+          </a:ln>
+        </p:spPr>
+        <p:style>
+          <a:lnRef idx="2">
+            <a:schemeClr val="accent1">
+              <a:shade val="15000"/>
+            </a:schemeClr>
+          </a:lnRef>
+          <a:fillRef idx="1">
+            <a:schemeClr val="accent1"/>
+          </a:fillRef>
+          <a:effectRef idx="0">
+            <a:schemeClr val="accent1"/>
+          </a:effectRef>
+          <a:fontRef idx="minor">
+            <a:schemeClr val="lt1"/>
+          </a:fontRef>
+        </p:style>
+        <p:txBody>
+          <a:bodyPr rtlCol="0" anchor="ctr"/>
+          <a:lstStyle/>
+          <a:p>
+            <a:pPr algn="ctr"/>
+            <a:endParaRPr lang="ko-KR" altLang="en-US"/>
+          </a:p>
+        </p:txBody>
+      </p:sp>
+      <p:sp>
+        <p:nvSpPr>
+          <p:cNvPr id="10" name="TextBox 9">
+            <a:extLst>
+              <a:ext uri="{FF2B5EF4-FFF2-40B4-BE49-F238E27FC236}">
+                <a16:creationId xmlns:a16="http://schemas.microsoft.com/office/drawing/2014/main" id="{CD6589EE-EDBE-CE8B-1378-21B16AB0E9C1}"/>
+              </a:ext>
+            </a:extLst>
+          </p:cNvPr>
+          <p:cNvSpPr txBox="1"/>
+          <p:nvPr/>
+        </p:nvSpPr>
+        <p:spPr>
+          <a:xfrm>
+            <a:off x="8718115" y="2004745"/>
+            <a:ext cx="450764" cy="369332"/>
+          </a:xfrm>
+          <a:prstGeom prst="rect">
+            <a:avLst/>
+          </a:prstGeom>
+          <a:noFill/>
+        </p:spPr>
+        <p:txBody>
+          <a:bodyPr wrap="none" rtlCol="0">
+            <a:spAutoFit/>
+          </a:bodyPr>
+          <a:lstStyle/>
+          <a:p>
+            <a:r>
+              <a:rPr lang="en-US" altLang="ko-KR"/>
+              <a:t>X4</a:t>
+            </a:r>
+            <a:endParaRPr lang="ko-KR" altLang="en-US"/>
+          </a:p>
+        </p:txBody>
+      </p:sp>
+      <p:cxnSp>
+        <p:nvCxnSpPr>
+          <p:cNvPr id="11" name="연결선: 꺾임 10">
+            <a:extLst>
+              <a:ext uri="{FF2B5EF4-FFF2-40B4-BE49-F238E27FC236}">
+                <a16:creationId xmlns:a16="http://schemas.microsoft.com/office/drawing/2014/main" id="{CC8FEADF-401C-5974-41F0-130092947A6E}"/>
+              </a:ext>
+            </a:extLst>
+          </p:cNvPr>
+          <p:cNvCxnSpPr>
+            <a:cxnSpLocks/>
+            <a:stCxn id="6" idx="0"/>
+            <a:endCxn id="5" idx="2"/>
+          </p:cNvCxnSpPr>
+          <p:nvPr/>
+        </p:nvCxnSpPr>
+        <p:spPr>
+          <a:xfrm rot="5400000" flipH="1" flipV="1">
+            <a:off x="2242983" y="3198562"/>
+            <a:ext cx="1917880" cy="12700"/>
+          </a:xfrm>
+          <a:prstGeom prst="bentConnector3">
+            <a:avLst>
+              <a:gd name="adj1" fmla="val 50000"/>
+            </a:avLst>
+          </a:prstGeom>
+        </p:spPr>
+        <p:style>
+          <a:lnRef idx="1">
+            <a:schemeClr val="accent1"/>
+          </a:lnRef>
+          <a:fillRef idx="0">
+            <a:schemeClr val="accent1"/>
+          </a:fillRef>
+          <a:effectRef idx="0">
+            <a:schemeClr val="accent1"/>
+          </a:effectRef>
+          <a:fontRef idx="minor">
+            <a:schemeClr val="tx1"/>
+          </a:fontRef>
+        </p:style>
+      </p:cxnSp>
+      <p:cxnSp>
+        <p:nvCxnSpPr>
+          <p:cNvPr id="14" name="연결선: 꺾임 13">
+            <a:extLst>
+              <a:ext uri="{FF2B5EF4-FFF2-40B4-BE49-F238E27FC236}">
+                <a16:creationId xmlns:a16="http://schemas.microsoft.com/office/drawing/2014/main" id="{670CECC1-A13A-EC29-20FD-0A2CD3237D93}"/>
+              </a:ext>
+            </a:extLst>
+          </p:cNvPr>
+          <p:cNvCxnSpPr>
+            <a:cxnSpLocks/>
+            <a:stCxn id="7" idx="0"/>
+            <a:endCxn id="5" idx="2"/>
+          </p:cNvCxnSpPr>
+          <p:nvPr/>
+        </p:nvCxnSpPr>
+        <p:spPr>
+          <a:xfrm rot="16200000" flipV="1">
+            <a:off x="3942037" y="1499508"/>
+            <a:ext cx="1917880" cy="3398108"/>
+          </a:xfrm>
+          <a:prstGeom prst="bentConnector3">
+            <a:avLst>
+              <a:gd name="adj1" fmla="val 50000"/>
+            </a:avLst>
+          </a:prstGeom>
+        </p:spPr>
+        <p:style>
+          <a:lnRef idx="1">
+            <a:schemeClr val="accent1"/>
+          </a:lnRef>
+          <a:fillRef idx="0">
+            <a:schemeClr val="accent1"/>
+          </a:fillRef>
+          <a:effectRef idx="0">
+            <a:schemeClr val="accent1"/>
+          </a:effectRef>
+          <a:fontRef idx="minor">
+            <a:schemeClr val="tx1"/>
+          </a:fontRef>
+        </p:style>
+      </p:cxnSp>
+    </p:spTree>
+    <p:extLst>
+      <p:ext uri="{BB962C8B-B14F-4D97-AF65-F5344CB8AC3E}">
+        <p14:creationId xmlns:p14="http://schemas.microsoft.com/office/powerpoint/2010/main" val="1664452770"/>
+      </p:ext>
+    </p:extLst>
+  </p:cSld>
+  <p:clrMapOvr>
+    <a:masterClrMapping/>
+  </p:clrMapOvr>
+</p:sld>
+</file>
+
+<file path=ppt/slides/slide17.xml><?xml version="1.0" encoding="utf-8"?>
+<p:sld xmlns:a="http://schemas.openxmlformats.org/drawingml/2006/main" xmlns:r="http://schemas.openxmlformats.org/officeDocument/2006/relationships" xmlns:p="http://schemas.openxmlformats.org/presentationml/2006/main">
+  <p:cSld>
+    <p:spTree>
+      <p:nvGrpSpPr>
+        <p:cNvPr id="1" name=""/>
+        <p:cNvGrpSpPr/>
+        <p:nvPr/>
+      </p:nvGrpSpPr>
+      <p:grpSpPr>
+        <a:xfrm>
+          <a:off x="0" y="0"/>
+          <a:ext cx="0" cy="0"/>
+          <a:chOff x="0" y="0"/>
+          <a:chExt cx="0" cy="0"/>
+        </a:xfrm>
+      </p:grpSpPr>
+      <p:sp>
+        <p:nvSpPr>
+          <p:cNvPr id="4" name="TextBox 3">
+            <a:extLst>
+              <a:ext uri="{FF2B5EF4-FFF2-40B4-BE49-F238E27FC236}">
+                <a16:creationId xmlns:a16="http://schemas.microsoft.com/office/drawing/2014/main" id="{B5AFE9F0-41E6-3195-E465-E2BC30C74B76}"/>
+              </a:ext>
+            </a:extLst>
+          </p:cNvPr>
+          <p:cNvSpPr txBox="1"/>
+          <p:nvPr/>
+        </p:nvSpPr>
+        <p:spPr>
+          <a:xfrm>
+            <a:off x="98060" y="124722"/>
+            <a:ext cx="4096571" cy="369332"/>
+          </a:xfrm>
+          <a:prstGeom prst="rect">
+            <a:avLst/>
+          </a:prstGeom>
+          <a:noFill/>
+        </p:spPr>
+        <p:txBody>
+          <a:bodyPr wrap="none" rtlCol="0">
+            <a:spAutoFit/>
+          </a:bodyPr>
+          <a:lstStyle/>
+          <a:p>
+            <a:r>
+              <a:rPr lang="en-US" altLang="ko-KR"/>
+              <a:t>Decoupling Capacitor (@ IC VCC pin)</a:t>
+            </a:r>
+            <a:endParaRPr lang="ko-KR" altLang="en-US"/>
+          </a:p>
+        </p:txBody>
+      </p:sp>
+      <p:sp>
+        <p:nvSpPr>
+          <p:cNvPr id="5" name="직사각형 4">
+            <a:extLst>
+              <a:ext uri="{FF2B5EF4-FFF2-40B4-BE49-F238E27FC236}">
+                <a16:creationId xmlns:a16="http://schemas.microsoft.com/office/drawing/2014/main" id="{E14F11C6-B005-B4B4-E3DE-5FE87CFF0988}"/>
+              </a:ext>
+            </a:extLst>
+          </p:cNvPr>
+          <p:cNvSpPr/>
+          <p:nvPr/>
+        </p:nvSpPr>
+        <p:spPr>
+          <a:xfrm>
+            <a:off x="725915" y="3631087"/>
+            <a:ext cx="2554803" cy="769715"/>
+          </a:xfrm>
+          <a:prstGeom prst="rect">
+            <a:avLst/>
+          </a:prstGeom>
+        </p:spPr>
+        <p:style>
+          <a:lnRef idx="2">
+            <a:schemeClr val="accent1">
+              <a:shade val="15000"/>
+            </a:schemeClr>
+          </a:lnRef>
+          <a:fillRef idx="1">
+            <a:schemeClr val="accent1"/>
+          </a:fillRef>
+          <a:effectRef idx="0">
+            <a:schemeClr val="accent1"/>
+          </a:effectRef>
+          <a:fontRef idx="minor">
+            <a:schemeClr val="lt1"/>
+          </a:fontRef>
+        </p:style>
+        <p:txBody>
+          <a:bodyPr rtlCol="0" anchor="ctr"/>
+          <a:lstStyle/>
+          <a:p>
+            <a:pPr algn="ctr"/>
+            <a:r>
+              <a:rPr lang="en-US" altLang="ko-KR"/>
+              <a:t>100nF (Ceramic)</a:t>
+            </a:r>
+          </a:p>
+          <a:p>
+            <a:pPr algn="ctr"/>
+            <a:r>
+              <a:rPr lang="en-US" altLang="ko-KR"/>
+              <a:t>(550Z104MTT)</a:t>
+            </a:r>
+            <a:endParaRPr lang="ko-KR" altLang="en-US"/>
+          </a:p>
+        </p:txBody>
+      </p:sp>
+      <p:sp>
+        <p:nvSpPr>
+          <p:cNvPr id="6" name="직사각형 5">
+            <a:extLst>
+              <a:ext uri="{FF2B5EF4-FFF2-40B4-BE49-F238E27FC236}">
+                <a16:creationId xmlns:a16="http://schemas.microsoft.com/office/drawing/2014/main" id="{00905B4E-71C4-9C57-34B7-4C605917D400}"/>
+              </a:ext>
+            </a:extLst>
+          </p:cNvPr>
+          <p:cNvSpPr/>
+          <p:nvPr/>
+        </p:nvSpPr>
+        <p:spPr>
+          <a:xfrm>
+            <a:off x="725915" y="2679618"/>
+            <a:ext cx="2715442" cy="769715"/>
+          </a:xfrm>
+          <a:prstGeom prst="rect">
+            <a:avLst/>
+          </a:prstGeom>
+        </p:spPr>
+        <p:style>
+          <a:lnRef idx="2">
+            <a:schemeClr val="accent1">
+              <a:shade val="15000"/>
+            </a:schemeClr>
+          </a:lnRef>
+          <a:fillRef idx="1">
+            <a:schemeClr val="accent1"/>
+          </a:fillRef>
+          <a:effectRef idx="0">
+            <a:schemeClr val="accent1"/>
+          </a:effectRef>
+          <a:fontRef idx="minor">
+            <a:schemeClr val="lt1"/>
+          </a:fontRef>
+        </p:style>
+        <p:txBody>
+          <a:bodyPr rtlCol="0" anchor="ctr"/>
+          <a:lstStyle/>
+          <a:p>
+            <a:pPr algn="ctr"/>
+            <a:r>
+              <a:rPr lang="en-US" altLang="ko-KR"/>
+              <a:t>1uF (Ceramic)</a:t>
+            </a:r>
+          </a:p>
+          <a:p>
+            <a:pPr algn="ctr"/>
+            <a:r>
+              <a:rPr lang="en-US" altLang="ko-KR"/>
+              <a:t>(KAM03CT70J105KH)</a:t>
+            </a:r>
+            <a:endParaRPr lang="ko-KR" altLang="en-US"/>
+          </a:p>
+        </p:txBody>
+      </p:sp>
+      <p:sp>
+        <p:nvSpPr>
+          <p:cNvPr id="7" name="직사각형 6">
+            <a:extLst>
+              <a:ext uri="{FF2B5EF4-FFF2-40B4-BE49-F238E27FC236}">
+                <a16:creationId xmlns:a16="http://schemas.microsoft.com/office/drawing/2014/main" id="{34F70289-68A0-449A-A224-0C2E615D28D4}"/>
+              </a:ext>
+            </a:extLst>
+          </p:cNvPr>
+          <p:cNvSpPr/>
+          <p:nvPr/>
+        </p:nvSpPr>
+        <p:spPr>
+          <a:xfrm>
+            <a:off x="725915" y="4557847"/>
+            <a:ext cx="3413599" cy="769715"/>
+          </a:xfrm>
+          <a:prstGeom prst="rect">
+            <a:avLst/>
+          </a:prstGeom>
+        </p:spPr>
+        <p:style>
+          <a:lnRef idx="2">
+            <a:schemeClr val="accent1">
+              <a:shade val="15000"/>
+            </a:schemeClr>
+          </a:lnRef>
+          <a:fillRef idx="1">
+            <a:schemeClr val="accent1"/>
+          </a:fillRef>
+          <a:effectRef idx="0">
+            <a:schemeClr val="accent1"/>
+          </a:effectRef>
+          <a:fontRef idx="minor">
+            <a:schemeClr val="lt1"/>
+          </a:fontRef>
+        </p:style>
+        <p:txBody>
+          <a:bodyPr rtlCol="0" anchor="ctr"/>
+          <a:lstStyle/>
+          <a:p>
+            <a:pPr algn="ctr"/>
+            <a:r>
+              <a:rPr lang="en-US" altLang="ko-KR"/>
+              <a:t>10nF (Ceramic)</a:t>
+            </a:r>
+          </a:p>
+          <a:p>
+            <a:pPr algn="ctr"/>
+            <a:r>
+              <a:rPr lang="en-US" altLang="ko-KR"/>
+              <a:t>(MAASL063SB7103MFCA01)</a:t>
+            </a:r>
+            <a:endParaRPr lang="ko-KR" altLang="en-US"/>
+          </a:p>
+        </p:txBody>
+      </p:sp>
+      <p:sp>
+        <p:nvSpPr>
+          <p:cNvPr id="8" name="직사각형 7">
+            <a:extLst>
+              <a:ext uri="{FF2B5EF4-FFF2-40B4-BE49-F238E27FC236}">
+                <a16:creationId xmlns:a16="http://schemas.microsoft.com/office/drawing/2014/main" id="{48FCBA13-E400-B0AF-CBCF-4C9F5B0B24C9}"/>
+              </a:ext>
+            </a:extLst>
+          </p:cNvPr>
+          <p:cNvSpPr/>
+          <p:nvPr/>
+        </p:nvSpPr>
+        <p:spPr>
+          <a:xfrm>
+            <a:off x="725915" y="1726132"/>
+            <a:ext cx="2554803" cy="769715"/>
+          </a:xfrm>
+          <a:prstGeom prst="rect">
+            <a:avLst/>
+          </a:prstGeom>
+        </p:spPr>
+        <p:style>
+          <a:lnRef idx="2">
+            <a:schemeClr val="accent1">
+              <a:shade val="15000"/>
+            </a:schemeClr>
+          </a:lnRef>
+          <a:fillRef idx="1">
+            <a:schemeClr val="accent1"/>
+          </a:fillRef>
+          <a:effectRef idx="0">
+            <a:schemeClr val="accent1"/>
+          </a:effectRef>
+          <a:fontRef idx="minor">
+            <a:schemeClr val="lt1"/>
+          </a:fontRef>
+        </p:style>
+        <p:txBody>
+          <a:bodyPr rtlCol="0" anchor="ctr"/>
+          <a:lstStyle/>
+          <a:p>
+            <a:pPr algn="ctr"/>
+            <a:r>
+              <a:rPr lang="en-US" altLang="ko-KR"/>
+              <a:t>10uF (Electro)</a:t>
+            </a:r>
+          </a:p>
+          <a:p>
+            <a:pPr algn="ctr"/>
+            <a:r>
+              <a:rPr lang="en-US" altLang="ko-KR"/>
+              <a:t>(MAL215375109E3)</a:t>
+            </a:r>
+            <a:endParaRPr lang="ko-KR" altLang="en-US"/>
+          </a:p>
+        </p:txBody>
+      </p:sp>
+      <p:sp>
+        <p:nvSpPr>
+          <p:cNvPr id="9" name="TextBox 8">
+            <a:extLst>
+              <a:ext uri="{FF2B5EF4-FFF2-40B4-BE49-F238E27FC236}">
+                <a16:creationId xmlns:a16="http://schemas.microsoft.com/office/drawing/2014/main" id="{754739B0-533B-7892-0E8E-CCECDF0550D7}"/>
+              </a:ext>
+            </a:extLst>
+          </p:cNvPr>
+          <p:cNvSpPr txBox="1"/>
+          <p:nvPr/>
+        </p:nvSpPr>
+        <p:spPr>
+          <a:xfrm>
+            <a:off x="4194631" y="1681673"/>
+            <a:ext cx="10777309" cy="923330"/>
+          </a:xfrm>
+          <a:prstGeom prst="rect">
+            <a:avLst/>
+          </a:prstGeom>
+          <a:noFill/>
+        </p:spPr>
+        <p:txBody>
+          <a:bodyPr wrap="none" rtlCol="0">
+            <a:spAutoFit/>
+          </a:bodyPr>
+          <a:lstStyle/>
+          <a:p>
+            <a:r>
+              <a:rPr lang="en-US" altLang="ko-KR"/>
+              <a:t>Sizes should considered!!! in 100 nF (8501 ... etc)</a:t>
+            </a:r>
+          </a:p>
+          <a:p>
+            <a:r>
+              <a:rPr lang="en-US" altLang="ko-KR"/>
+              <a:t>Look : </a:t>
+            </a:r>
+            <a:r>
+              <a:rPr lang="en-US" altLang="ko-KR">
+                <a:hlinkClick r:id="rId2"/>
+              </a:rPr>
+              <a:t>https://www.renesas.com/us/en/document/apn/an1325-choosing-and-using-bypass-capacitors</a:t>
+            </a:r>
+            <a:endParaRPr lang="en-US" altLang="ko-KR"/>
+          </a:p>
+          <a:p>
+            <a:endParaRPr lang="ko-KR" altLang="en-US"/>
+          </a:p>
+        </p:txBody>
+      </p:sp>
+    </p:spTree>
+    <p:extLst>
+      <p:ext uri="{BB962C8B-B14F-4D97-AF65-F5344CB8AC3E}">
+        <p14:creationId xmlns:p14="http://schemas.microsoft.com/office/powerpoint/2010/main" val="925979910"/>
+      </p:ext>
+    </p:extLst>
+  </p:cSld>
+  <p:clrMapOvr>
+    <a:masterClrMapping/>
+  </p:clrMapOvr>
+</p:sld>
+</file>
+
+<file path=ppt/slides/slide18.xml><?xml version="1.0" encoding="utf-8"?>
+<p:sld xmlns:a="http://schemas.openxmlformats.org/drawingml/2006/main" xmlns:r="http://schemas.openxmlformats.org/officeDocument/2006/relationships" xmlns:p="http://schemas.openxmlformats.org/presentationml/2006/main">
+  <p:cSld>
+    <p:spTree>
+      <p:nvGrpSpPr>
+        <p:cNvPr id="1" name=""/>
+        <p:cNvGrpSpPr/>
+        <p:nvPr/>
+      </p:nvGrpSpPr>
+      <p:grpSpPr>
+        <a:xfrm>
+          <a:off x="0" y="0"/>
+          <a:ext cx="0" cy="0"/>
+          <a:chOff x="0" y="0"/>
+          <a:chExt cx="0" cy="0"/>
+        </a:xfrm>
+      </p:grpSpPr>
+      <p:sp>
+        <p:nvSpPr>
+          <p:cNvPr id="4" name="TextBox 3">
+            <a:extLst>
+              <a:ext uri="{FF2B5EF4-FFF2-40B4-BE49-F238E27FC236}">
+                <a16:creationId xmlns:a16="http://schemas.microsoft.com/office/drawing/2014/main" id="{EA514489-2E36-E683-3203-48F04C350475}"/>
+              </a:ext>
+            </a:extLst>
+          </p:cNvPr>
+          <p:cNvSpPr txBox="1"/>
+          <p:nvPr/>
+        </p:nvSpPr>
+        <p:spPr>
+          <a:xfrm>
+            <a:off x="98060" y="124722"/>
+            <a:ext cx="3895490" cy="369332"/>
+          </a:xfrm>
+          <a:prstGeom prst="rect">
+            <a:avLst/>
+          </a:prstGeom>
+          <a:noFill/>
+        </p:spPr>
+        <p:txBody>
+          <a:bodyPr wrap="none" rtlCol="0">
+            <a:spAutoFit/>
+          </a:bodyPr>
+          <a:lstStyle/>
+          <a:p>
+            <a:r>
+              <a:rPr lang="en-US" altLang="ko-KR"/>
+              <a:t>Bypass Capacitor (@ power source)</a:t>
+            </a:r>
+            <a:endParaRPr lang="ko-KR" altLang="en-US"/>
+          </a:p>
+        </p:txBody>
+      </p:sp>
+      <p:sp>
+        <p:nvSpPr>
+          <p:cNvPr id="5" name="직사각형 4">
+            <a:extLst>
+              <a:ext uri="{FF2B5EF4-FFF2-40B4-BE49-F238E27FC236}">
+                <a16:creationId xmlns:a16="http://schemas.microsoft.com/office/drawing/2014/main" id="{29E2A314-50B3-873D-454C-7895A7FDDE93}"/>
+              </a:ext>
+            </a:extLst>
+          </p:cNvPr>
+          <p:cNvSpPr/>
+          <p:nvPr/>
+        </p:nvSpPr>
+        <p:spPr>
+          <a:xfrm>
+            <a:off x="725915" y="3631087"/>
+            <a:ext cx="2554803" cy="769715"/>
+          </a:xfrm>
+          <a:prstGeom prst="rect">
+            <a:avLst/>
+          </a:prstGeom>
+        </p:spPr>
+        <p:style>
+          <a:lnRef idx="2">
+            <a:schemeClr val="accent1">
+              <a:shade val="15000"/>
+            </a:schemeClr>
+          </a:lnRef>
+          <a:fillRef idx="1">
+            <a:schemeClr val="accent1"/>
+          </a:fillRef>
+          <a:effectRef idx="0">
+            <a:schemeClr val="accent1"/>
+          </a:effectRef>
+          <a:fontRef idx="minor">
+            <a:schemeClr val="lt1"/>
+          </a:fontRef>
+        </p:style>
+        <p:txBody>
+          <a:bodyPr rtlCol="0" anchor="ctr"/>
+          <a:lstStyle/>
+          <a:p>
+            <a:pPr algn="ctr"/>
+            <a:r>
+              <a:rPr lang="en-US" altLang="ko-KR"/>
+              <a:t>100nF (Ceramic)</a:t>
+            </a:r>
+          </a:p>
+          <a:p>
+            <a:pPr algn="ctr"/>
+            <a:r>
+              <a:rPr lang="en-US" altLang="ko-KR"/>
+              <a:t>(550Z104MTT)</a:t>
+            </a:r>
+            <a:endParaRPr lang="ko-KR" altLang="en-US"/>
+          </a:p>
+        </p:txBody>
+      </p:sp>
+      <p:sp>
+        <p:nvSpPr>
+          <p:cNvPr id="6" name="직사각형 5">
+            <a:extLst>
+              <a:ext uri="{FF2B5EF4-FFF2-40B4-BE49-F238E27FC236}">
+                <a16:creationId xmlns:a16="http://schemas.microsoft.com/office/drawing/2014/main" id="{2C5D06F4-88DF-7BE8-6A1E-9011E0299888}"/>
+              </a:ext>
+            </a:extLst>
+          </p:cNvPr>
+          <p:cNvSpPr/>
+          <p:nvPr/>
+        </p:nvSpPr>
+        <p:spPr>
+          <a:xfrm>
+            <a:off x="725915" y="2679618"/>
+            <a:ext cx="2937863" cy="769715"/>
+          </a:xfrm>
+          <a:prstGeom prst="rect">
+            <a:avLst/>
+          </a:prstGeom>
+        </p:spPr>
+        <p:style>
+          <a:lnRef idx="2">
+            <a:schemeClr val="accent1">
+              <a:shade val="15000"/>
+            </a:schemeClr>
+          </a:lnRef>
+          <a:fillRef idx="1">
+            <a:schemeClr val="accent1"/>
+          </a:fillRef>
+          <a:effectRef idx="0">
+            <a:schemeClr val="accent1"/>
+          </a:effectRef>
+          <a:fontRef idx="minor">
+            <a:schemeClr val="lt1"/>
+          </a:fontRef>
+        </p:style>
+        <p:txBody>
+          <a:bodyPr rtlCol="0" anchor="ctr"/>
+          <a:lstStyle/>
+          <a:p>
+            <a:pPr algn="ctr"/>
+            <a:r>
+              <a:rPr lang="en-US" altLang="ko-KR"/>
+              <a:t>1uF (Ceramic)</a:t>
+            </a:r>
+          </a:p>
+          <a:p>
+            <a:pPr algn="ctr"/>
+            <a:r>
+              <a:rPr lang="en-US" altLang="ko-KR"/>
+              <a:t>(KAM03CT70J105KH)</a:t>
+            </a:r>
+            <a:endParaRPr lang="ko-KR" altLang="en-US"/>
+          </a:p>
+        </p:txBody>
+      </p:sp>
+      <p:sp>
+        <p:nvSpPr>
+          <p:cNvPr id="7" name="직사각형 6">
+            <a:extLst>
+              <a:ext uri="{FF2B5EF4-FFF2-40B4-BE49-F238E27FC236}">
+                <a16:creationId xmlns:a16="http://schemas.microsoft.com/office/drawing/2014/main" id="{886D3B15-6969-ADE3-F00E-3D272607A879}"/>
+              </a:ext>
+            </a:extLst>
+          </p:cNvPr>
+          <p:cNvSpPr/>
+          <p:nvPr/>
+        </p:nvSpPr>
+        <p:spPr>
+          <a:xfrm>
+            <a:off x="725915" y="4557847"/>
+            <a:ext cx="3456847" cy="769715"/>
+          </a:xfrm>
+          <a:prstGeom prst="rect">
+            <a:avLst/>
+          </a:prstGeom>
+        </p:spPr>
+        <p:style>
+          <a:lnRef idx="2">
+            <a:schemeClr val="accent1">
+              <a:shade val="15000"/>
+            </a:schemeClr>
+          </a:lnRef>
+          <a:fillRef idx="1">
+            <a:schemeClr val="accent1"/>
+          </a:fillRef>
+          <a:effectRef idx="0">
+            <a:schemeClr val="accent1"/>
+          </a:effectRef>
+          <a:fontRef idx="minor">
+            <a:schemeClr val="lt1"/>
+          </a:fontRef>
+        </p:style>
+        <p:txBody>
+          <a:bodyPr rtlCol="0" anchor="ctr"/>
+          <a:lstStyle/>
+          <a:p>
+            <a:pPr algn="ctr"/>
+            <a:r>
+              <a:rPr lang="en-US" altLang="ko-KR"/>
+              <a:t>10nF (Ceramic)</a:t>
+            </a:r>
+          </a:p>
+          <a:p>
+            <a:pPr algn="ctr"/>
+            <a:r>
+              <a:rPr lang="en-US" altLang="ko-KR"/>
+              <a:t>(MAASL063SB7103MFCA01)</a:t>
+            </a:r>
+            <a:endParaRPr lang="ko-KR" altLang="en-US"/>
+          </a:p>
+        </p:txBody>
+      </p:sp>
+      <p:sp>
+        <p:nvSpPr>
+          <p:cNvPr id="8" name="직사각형 7">
+            <a:extLst>
+              <a:ext uri="{FF2B5EF4-FFF2-40B4-BE49-F238E27FC236}">
+                <a16:creationId xmlns:a16="http://schemas.microsoft.com/office/drawing/2014/main" id="{2727D732-FCAE-CDE0-1D7B-153DCF686572}"/>
+              </a:ext>
+            </a:extLst>
+          </p:cNvPr>
+          <p:cNvSpPr/>
+          <p:nvPr/>
+        </p:nvSpPr>
+        <p:spPr>
+          <a:xfrm>
+            <a:off x="3280718" y="1752858"/>
+            <a:ext cx="2554803" cy="769715"/>
+          </a:xfrm>
+          <a:prstGeom prst="rect">
+            <a:avLst/>
+          </a:prstGeom>
+        </p:spPr>
+        <p:style>
+          <a:lnRef idx="2">
+            <a:schemeClr val="accent1">
+              <a:shade val="15000"/>
+            </a:schemeClr>
+          </a:lnRef>
+          <a:fillRef idx="1">
+            <a:schemeClr val="accent1"/>
+          </a:fillRef>
+          <a:effectRef idx="0">
+            <a:schemeClr val="accent1"/>
+          </a:effectRef>
+          <a:fontRef idx="minor">
+            <a:schemeClr val="lt1"/>
+          </a:fontRef>
+        </p:style>
+        <p:txBody>
+          <a:bodyPr rtlCol="0" anchor="ctr"/>
+          <a:lstStyle/>
+          <a:p>
+            <a:pPr algn="ctr"/>
+            <a:r>
+              <a:rPr lang="en-US" altLang="ko-KR"/>
+              <a:t>1nH(Ferrite Bead)</a:t>
+            </a:r>
+          </a:p>
+          <a:p>
+            <a:pPr algn="ctr"/>
+            <a:r>
+              <a:rPr lang="en-US" altLang="ko-KR"/>
+              <a:t>(BLM18PG121SN1D)</a:t>
+            </a:r>
+            <a:endParaRPr lang="ko-KR" altLang="en-US"/>
+          </a:p>
+        </p:txBody>
+      </p:sp>
+    </p:spTree>
+    <p:extLst>
+      <p:ext uri="{BB962C8B-B14F-4D97-AF65-F5344CB8AC3E}">
+        <p14:creationId xmlns:p14="http://schemas.microsoft.com/office/powerpoint/2010/main" val="1453241430"/>
       </p:ext>
     </p:extLst>
   </p:cSld>

</xml_diff>